<commit_message>
add template and integrate with template-slides-pptx.pptx
</commit_message>
<xml_diff>
--- a/_site/materials/template-module/template-slides.pptx
+++ b/_site/materials/template-module/template-slides.pptx
@@ -1,66 +1,19 @@
 
 <file path=ppt/presentation.xml><?xml version="1.0" encoding="utf-8"?>
-<p:presentation xmlns:a="http://schemas.openxmlformats.org/drawingml/2006/main" xmlns:p="http://schemas.openxmlformats.org/presentationml/2006/main" xmlns:r="http://schemas.openxmlformats.org/officeDocument/2006/relationships" autoCompressPictures="0" saveSubsetFonts="1">
+<p:presentation xmlns:a="http://schemas.openxmlformats.org/drawingml/2006/main" xmlns:p="http://schemas.openxmlformats.org/presentationml/2006/main" xmlns:r="http://schemas.openxmlformats.org/officeDocument/2006/relationships" saveSubsetFonts="1">
   <p:sldMasterIdLst>
     <p:sldMasterId id="2147483648" r:id="rId1"/>
   </p:sldMasterIdLst>
   <p:notesMasterIdLst>
     <p:notesMasterId r:id="rId47"/>
   </p:notesMasterIdLst>
-  <p:sldIdLst>
-    <p:sldId id="256" r:id="rId2"/>
-    <p:sldId id="257" r:id="rId3"/>
-    <p:sldId id="258" r:id="rId4"/>
-    <p:sldId id="259" r:id="rId5"/>
-    <p:sldId id="260" r:id="rId6"/>
-    <p:sldId id="261" r:id="rId7"/>
-    <p:sldId id="262" r:id="rId8"/>
-    <p:sldId id="263" r:id="rId9"/>
-    <p:sldId id="264" r:id="rId10"/>
-    <p:sldId id="265" r:id="rId11"/>
-    <p:sldId id="266" r:id="rId12"/>
-    <p:sldId id="267" r:id="rId13"/>
-    <p:sldId id="268" r:id="rId14"/>
-    <p:sldId id="269" r:id="rId15"/>
-    <p:sldId id="270" r:id="rId16"/>
-    <p:sldId id="271" r:id="rId17"/>
-    <p:sldId id="272" r:id="rId18"/>
-    <p:sldId id="273" r:id="rId19"/>
-    <p:sldId id="274" r:id="rId20"/>
-    <p:sldId id="275" r:id="rId21"/>
-    <p:sldId id="276" r:id="rId22"/>
-    <p:sldId id="277" r:id="rId23"/>
-    <p:sldId id="278" r:id="rId24"/>
-    <p:sldId id="279" r:id="rId25"/>
-    <p:sldId id="280" r:id="rId26"/>
-    <p:sldId id="281" r:id="rId27"/>
-    <p:sldId id="282" r:id="rId28"/>
-    <p:sldId id="283" r:id="rId29"/>
-    <p:sldId id="284" r:id="rId30"/>
-    <p:sldId id="285" r:id="rId31"/>
-    <p:sldId id="286" r:id="rId32"/>
-    <p:sldId id="287" r:id="rId33"/>
-    <p:sldId id="288" r:id="rId34"/>
-    <p:sldId id="289" r:id="rId35"/>
-    <p:sldId id="290" r:id="rId36"/>
-    <p:sldId id="291" r:id="rId37"/>
-    <p:sldId id="292" r:id="rId38"/>
-    <p:sldId id="293" r:id="rId39"/>
-    <p:sldId id="294" r:id="rId40"/>
-    <p:sldId id="295" r:id="rId41"/>
-    <p:sldId id="296" r:id="rId42"/>
-    <p:sldId id="297" r:id="rId43"/>
-    <p:sldId id="298" r:id="rId44"/>
-    <p:sldId id="299" r:id="rId45"/>
-    <p:sldId id="300" r:id="rId46"/>
-  </p:sldIdLst>
-  <p:sldSz cx="9144000" cy="5143500" type="screen16x9"/>
+  <p:sldSz cx="12192000" cy="6858000"/>
   <p:notesSz cx="6858000" cy="9144000"/>
   <p:defaultTextStyle>
     <a:defPPr>
       <a:defRPr lang="en-US"/>
     </a:defPPr>
-    <a:lvl1pPr algn="l" defTabSz="457200" eaLnBrk="1" hangingPunct="1" latinLnBrk="0" marL="0" rtl="0">
+    <a:lvl1pPr algn="l" defTabSz="914400" eaLnBrk="1" hangingPunct="1" latinLnBrk="0" marL="0" rtl="0">
       <a:defRPr kern="1200" sz="1800">
         <a:solidFill>
           <a:schemeClr val="tx1"/>
@@ -70,7 +23,7 @@
         <a:cs typeface="+mn-cs"/>
       </a:defRPr>
     </a:lvl1pPr>
-    <a:lvl2pPr algn="l" defTabSz="457200" eaLnBrk="1" hangingPunct="1" latinLnBrk="0" marL="457200" rtl="0">
+    <a:lvl2pPr algn="l" defTabSz="914400" eaLnBrk="1" hangingPunct="1" latinLnBrk="0" marL="457200" rtl="0">
       <a:defRPr kern="1200" sz="1800">
         <a:solidFill>
           <a:schemeClr val="tx1"/>
@@ -80,7 +33,7 @@
         <a:cs typeface="+mn-cs"/>
       </a:defRPr>
     </a:lvl2pPr>
-    <a:lvl3pPr algn="l" defTabSz="457200" eaLnBrk="1" hangingPunct="1" latinLnBrk="0" marL="914400" rtl="0">
+    <a:lvl3pPr algn="l" defTabSz="914400" eaLnBrk="1" hangingPunct="1" latinLnBrk="0" marL="914400" rtl="0">
       <a:defRPr kern="1200" sz="1800">
         <a:solidFill>
           <a:schemeClr val="tx1"/>
@@ -90,7 +43,7 @@
         <a:cs typeface="+mn-cs"/>
       </a:defRPr>
     </a:lvl3pPr>
-    <a:lvl4pPr algn="l" defTabSz="457200" eaLnBrk="1" hangingPunct="1" latinLnBrk="0" marL="1371600" rtl="0">
+    <a:lvl4pPr algn="l" defTabSz="914400" eaLnBrk="1" hangingPunct="1" latinLnBrk="0" marL="1371600" rtl="0">
       <a:defRPr kern="1200" sz="1800">
         <a:solidFill>
           <a:schemeClr val="tx1"/>
@@ -100,7 +53,7 @@
         <a:cs typeface="+mn-cs"/>
       </a:defRPr>
     </a:lvl4pPr>
-    <a:lvl5pPr algn="l" defTabSz="457200" eaLnBrk="1" hangingPunct="1" latinLnBrk="0" marL="1828800" rtl="0">
+    <a:lvl5pPr algn="l" defTabSz="914400" eaLnBrk="1" hangingPunct="1" latinLnBrk="0" marL="1828800" rtl="0">
       <a:defRPr kern="1200" sz="1800">
         <a:solidFill>
           <a:schemeClr val="tx1"/>
@@ -110,7 +63,7 @@
         <a:cs typeface="+mn-cs"/>
       </a:defRPr>
     </a:lvl5pPr>
-    <a:lvl6pPr algn="l" defTabSz="457200" eaLnBrk="1" hangingPunct="1" latinLnBrk="0" marL="2286000" rtl="0">
+    <a:lvl6pPr algn="l" defTabSz="914400" eaLnBrk="1" hangingPunct="1" latinLnBrk="0" marL="2286000" rtl="0">
       <a:defRPr kern="1200" sz="1800">
         <a:solidFill>
           <a:schemeClr val="tx1"/>
@@ -120,7 +73,7 @@
         <a:cs typeface="+mn-cs"/>
       </a:defRPr>
     </a:lvl6pPr>
-    <a:lvl7pPr algn="l" defTabSz="457200" eaLnBrk="1" hangingPunct="1" latinLnBrk="0" marL="2743200" rtl="0">
+    <a:lvl7pPr algn="l" defTabSz="914400" eaLnBrk="1" hangingPunct="1" latinLnBrk="0" marL="2743200" rtl="0">
       <a:defRPr kern="1200" sz="1800">
         <a:solidFill>
           <a:schemeClr val="tx1"/>
@@ -130,7 +83,7 @@
         <a:cs typeface="+mn-cs"/>
       </a:defRPr>
     </a:lvl7pPr>
-    <a:lvl8pPr algn="l" defTabSz="457200" eaLnBrk="1" hangingPunct="1" latinLnBrk="0" marL="3200400" rtl="0">
+    <a:lvl8pPr algn="l" defTabSz="914400" eaLnBrk="1" hangingPunct="1" latinLnBrk="0" marL="3200400" rtl="0">
       <a:defRPr kern="1200" sz="1800">
         <a:solidFill>
           <a:schemeClr val="tx1"/>
@@ -140,7 +93,7 @@
         <a:cs typeface="+mn-cs"/>
       </a:defRPr>
     </a:lvl8pPr>
-    <a:lvl9pPr algn="l" defTabSz="457200" eaLnBrk="1" hangingPunct="1" latinLnBrk="0" marL="3657600" rtl="0">
+    <a:lvl9pPr algn="l" defTabSz="914400" eaLnBrk="1" hangingPunct="1" latinLnBrk="0" marL="3657600" rtl="0">
       <a:defRPr kern="1200" sz="1800">
         <a:solidFill>
           <a:schemeClr val="tx1"/>
@@ -153,18 +106,7 @@
   </p:defaultTextStyle>
   <p:extLst>
     <p:ext uri="{EFAFB233-063F-42B5-8137-9DF3F51BA10A}">
-      <p15:sldGuideLst xmlns:p15="http://schemas.microsoft.com/office/powerpoint/2012/main">
-        <p15:guide id="1" orient="horz" pos="1620" userDrawn="1">
-          <p15:clr>
-            <a:srgbClr val="A4A3A4"/>
-          </p15:clr>
-        </p15:guide>
-        <p15:guide id="2" pos="2880" userDrawn="1">
-          <p15:clr>
-            <a:srgbClr val="A4A3A4"/>
-          </p15:clr>
-        </p15:guide>
-      </p15:sldGuideLst>
+      <p15:sldGuideLst xmlns:p15="http://schemas.microsoft.com/office/powerpoint/2012/main"/>
     </p:ext>
   </p:extLst>
 </p:presentation>
@@ -866,7 +808,13 @@
       </p:grpSpPr>
       <p:sp>
         <p:nvSpPr>
-          <p:cNvPr id="2" name="Title 1"/>
+          <p:cNvPr id="2" name="Titel 1">
+            <a:extLst>
+              <a:ext uri="{FF2B5EF4-FFF2-40B4-BE49-F238E27FC236}">
+                <a16:creationId xmlns:a16="http://schemas.microsoft.com/office/drawing/2014/main" id="{5BA8CCF6-F57A-42B5-ECBC-B5D1C9B01F71}"/>
+              </a:ext>
+            </a:extLst>
+          </p:cNvPr>
           <p:cNvSpPr>
             <a:spLocks noGrp="1"/>
           </p:cNvSpPr>
@@ -876,147 +824,121 @@
         </p:nvSpPr>
         <p:spPr>
           <a:xfrm>
-            <a:off x="685800" y="1597819"/>
-            <a:ext cx="7772400" cy="1102519"/>
+            <a:off x="1524000" y="1122363"/>
+            <a:ext cx="9144000" cy="2387600"/>
           </a:xfrm>
+          <a:prstGeom prst="roundRect">
+            <a:avLst/>
+          </a:prstGeom>
+          <a:solidFill>
+            <a:srgbClr val="00883A"/>
+          </a:solidFill>
         </p:spPr>
         <p:txBody>
-          <a:bodyPr/>
-          <a:lstStyle/>
-          <a:p>
-            <a:r>
-              <a:rPr lang="en-US"/>
-              <a:t>Click to edit Master title style</a:t>
-            </a:r>
-          </a:p>
-        </p:txBody>
-      </p:sp>
-      <p:sp>
-        <p:nvSpPr>
-          <p:cNvPr id="3" name="Subtitle 2"/>
-          <p:cNvSpPr>
-            <a:spLocks noGrp="1"/>
-          </p:cNvSpPr>
-          <p:nvPr>
-            <p:ph type="subTitle" idx="1"/>
-          </p:nvPr>
-        </p:nvSpPr>
-        <p:spPr>
-          <a:xfrm>
-            <a:off x="1371600" y="2914650"/>
-            <a:ext cx="6400800" cy="1314450"/>
-          </a:xfrm>
-        </p:spPr>
-        <p:txBody>
-          <a:bodyPr/>
+          <a:bodyPr anchor="b"/>
           <a:lstStyle>
-            <a:lvl1pPr marL="0" indent="0" algn="ctr">
-              <a:buNone/>
-              <a:defRPr>
+            <a:lvl1pPr algn="ctr">
+              <a:defRPr sz="6000">
                 <a:solidFill>
-                  <a:schemeClr val="tx1">
-                    <a:tint val="75000"/>
-                  </a:schemeClr>
+                  <a:schemeClr val="bg1"/>
                 </a:solidFill>
               </a:defRPr>
             </a:lvl1pPr>
-            <a:lvl2pPr marL="342900" indent="0" algn="ctr">
-              <a:buNone/>
-              <a:defRPr>
-                <a:solidFill>
-                  <a:schemeClr val="tx1">
-                    <a:tint val="75000"/>
-                  </a:schemeClr>
-                </a:solidFill>
-              </a:defRPr>
+          </a:lstStyle>
+          <a:p>
+            <a:r>
+              <a:rPr lang="de-DE" dirty="0"/>
+              <a:t>Mastertitelformat bearbeiten</a:t>
+            </a:r>
+            <a:endParaRPr lang="en-US" dirty="0"/>
+          </a:p>
+        </p:txBody>
+      </p:sp>
+      <p:sp>
+        <p:nvSpPr>
+          <p:cNvPr id="3" name="Untertitel 2">
+            <a:extLst>
+              <a:ext uri="{FF2B5EF4-FFF2-40B4-BE49-F238E27FC236}">
+                <a16:creationId xmlns:a16="http://schemas.microsoft.com/office/drawing/2014/main" id="{1CB92922-5421-ED0A-332E-7B0368BD017E}"/>
+              </a:ext>
+            </a:extLst>
+          </p:cNvPr>
+          <p:cNvSpPr>
+            <a:spLocks noGrp="1"/>
+          </p:cNvSpPr>
+          <p:nvPr>
+            <p:ph type="subTitle" idx="1"/>
+          </p:nvPr>
+        </p:nvSpPr>
+        <p:spPr>
+          <a:xfrm>
+            <a:off x="1524000" y="3602038"/>
+            <a:ext cx="9144000" cy="1655762"/>
+          </a:xfrm>
+        </p:spPr>
+        <p:txBody>
+          <a:bodyPr/>
+          <a:lstStyle>
+            <a:lvl1pPr marL="0" indent="0" algn="ctr">
+              <a:buNone/>
+              <a:defRPr sz="2400"/>
+            </a:lvl1pPr>
+            <a:lvl2pPr marL="457200" indent="0" algn="ctr">
+              <a:buNone/>
+              <a:defRPr sz="2000"/>
             </a:lvl2pPr>
-            <a:lvl3pPr marL="685800" indent="0" algn="ctr">
-              <a:buNone/>
-              <a:defRPr>
-                <a:solidFill>
-                  <a:schemeClr val="tx1">
-                    <a:tint val="75000"/>
-                  </a:schemeClr>
-                </a:solidFill>
-              </a:defRPr>
+            <a:lvl3pPr marL="914400" indent="0" algn="ctr">
+              <a:buNone/>
+              <a:defRPr sz="1800"/>
             </a:lvl3pPr>
-            <a:lvl4pPr marL="1028700" indent="0" algn="ctr">
-              <a:buNone/>
-              <a:defRPr>
-                <a:solidFill>
-                  <a:schemeClr val="tx1">
-                    <a:tint val="75000"/>
-                  </a:schemeClr>
-                </a:solidFill>
-              </a:defRPr>
+            <a:lvl4pPr marL="1371600" indent="0" algn="ctr">
+              <a:buNone/>
+              <a:defRPr sz="1600"/>
             </a:lvl4pPr>
-            <a:lvl5pPr marL="1371600" indent="0" algn="ctr">
-              <a:buNone/>
-              <a:defRPr>
-                <a:solidFill>
-                  <a:schemeClr val="tx1">
-                    <a:tint val="75000"/>
-                  </a:schemeClr>
-                </a:solidFill>
-              </a:defRPr>
+            <a:lvl5pPr marL="1828800" indent="0" algn="ctr">
+              <a:buNone/>
+              <a:defRPr sz="1600"/>
             </a:lvl5pPr>
-            <a:lvl6pPr marL="1714500" indent="0" algn="ctr">
-              <a:buNone/>
-              <a:defRPr>
-                <a:solidFill>
-                  <a:schemeClr val="tx1">
-                    <a:tint val="75000"/>
-                  </a:schemeClr>
-                </a:solidFill>
-              </a:defRPr>
+            <a:lvl6pPr marL="2286000" indent="0" algn="ctr">
+              <a:buNone/>
+              <a:defRPr sz="1600"/>
             </a:lvl6pPr>
-            <a:lvl7pPr marL="2057400" indent="0" algn="ctr">
-              <a:buNone/>
-              <a:defRPr>
-                <a:solidFill>
-                  <a:schemeClr val="tx1">
-                    <a:tint val="75000"/>
-                  </a:schemeClr>
-                </a:solidFill>
-              </a:defRPr>
+            <a:lvl7pPr marL="2743200" indent="0" algn="ctr">
+              <a:buNone/>
+              <a:defRPr sz="1600"/>
             </a:lvl7pPr>
-            <a:lvl8pPr marL="2400300" indent="0" algn="ctr">
-              <a:buNone/>
-              <a:defRPr>
-                <a:solidFill>
-                  <a:schemeClr val="tx1">
-                    <a:tint val="75000"/>
-                  </a:schemeClr>
-                </a:solidFill>
-              </a:defRPr>
+            <a:lvl8pPr marL="3200400" indent="0" algn="ctr">
+              <a:buNone/>
+              <a:defRPr sz="1600"/>
             </a:lvl8pPr>
-            <a:lvl9pPr marL="2743200" indent="0" algn="ctr">
-              <a:buNone/>
-              <a:defRPr>
-                <a:solidFill>
-                  <a:schemeClr val="tx1">
-                    <a:tint val="75000"/>
-                  </a:schemeClr>
-                </a:solidFill>
-              </a:defRPr>
+            <a:lvl9pPr marL="3657600" indent="0" algn="ctr">
+              <a:buNone/>
+              <a:defRPr sz="1600"/>
             </a:lvl9pPr>
           </a:lstStyle>
           <a:p>
             <a:r>
-              <a:rPr lang="en-US"/>
-              <a:t>Click to edit Master subtitle style</a:t>
-            </a:r>
-          </a:p>
-        </p:txBody>
-      </p:sp>
-      <p:sp>
-        <p:nvSpPr>
-          <p:cNvPr id="4" name="Date Placeholder 3"/>
-          <p:cNvSpPr>
-            <a:spLocks noGrp="1"/>
-          </p:cNvSpPr>
-          <p:nvPr>
-            <p:ph type="dt" sz="half" idx="10"/>
+              <a:rPr lang="de-DE"/>
+              <a:t>Master-Untertitelformat bearbeiten</a:t>
+            </a:r>
+            <a:endParaRPr lang="en-US"/>
+          </a:p>
+        </p:txBody>
+      </p:sp>
+      <p:sp>
+        <p:nvSpPr>
+          <p:cNvPr id="5" name="Fußzeilenplatzhalter 4">
+            <a:extLst>
+              <a:ext uri="{FF2B5EF4-FFF2-40B4-BE49-F238E27FC236}">
+                <a16:creationId xmlns:a16="http://schemas.microsoft.com/office/drawing/2014/main" id="{A1510323-3C9D-11E8-A2A5-C4CEB6AFA641}"/>
+              </a:ext>
+            </a:extLst>
+          </p:cNvPr>
+          <p:cNvSpPr>
+            <a:spLocks noGrp="1"/>
+          </p:cNvSpPr>
+          <p:nvPr>
+            <p:ph type="ftr" sz="quarter" idx="11"/>
           </p:nvPr>
         </p:nvSpPr>
         <p:spPr/>
@@ -1024,60 +946,92 @@
           <a:bodyPr/>
           <a:lstStyle/>
           <a:p>
-            <a:fld id="{241EB5C9-1307-BA42-ABA2-0BC069CD8E7F}" type="datetimeFigureOut">
+            <a:r>
+              <a:rPr lang="en-US" dirty="0"/>
+              <a:t>LMU Open Science Center</a:t>
+            </a:r>
+          </a:p>
+        </p:txBody>
+      </p:sp>
+      <p:sp>
+        <p:nvSpPr>
+          <p:cNvPr id="6" name="Foliennummernplatzhalter 5">
+            <a:extLst>
+              <a:ext uri="{FF2B5EF4-FFF2-40B4-BE49-F238E27FC236}">
+                <a16:creationId xmlns:a16="http://schemas.microsoft.com/office/drawing/2014/main" id="{C2F487F3-D504-6FB3-7DB3-3FF45D2CC310}"/>
+              </a:ext>
+            </a:extLst>
+          </p:cNvPr>
+          <p:cNvSpPr>
+            <a:spLocks noGrp="1"/>
+          </p:cNvSpPr>
+          <p:nvPr>
+            <p:ph type="sldNum" sz="quarter" idx="12"/>
+          </p:nvPr>
+        </p:nvSpPr>
+        <p:spPr>
+          <a:xfrm>
+            <a:off x="1524000" y="6356350"/>
+            <a:ext cx="2231254" cy="365125"/>
+          </a:xfrm>
+        </p:spPr>
+        <p:txBody>
+          <a:bodyPr/>
+          <a:lstStyle>
+            <a:lvl1pPr algn="l">
+              <a:defRPr/>
+            </a:lvl1pPr>
+          </a:lstStyle>
+          <a:p>
+            <a:fld id="{8B250AD1-D749-4DA0-AC4A-500BF02A1CF6}" type="slidenum">
               <a:rPr lang="en-US" smtClean="0"/>
-              <a:t>1/2/22</a:t>
+              <a:pPr/>
+              <a:t>‹Nr.›</a:t>
             </a:fld>
             <a:endParaRPr lang="en-US"/>
           </a:p>
         </p:txBody>
       </p:sp>
-      <p:sp>
-        <p:nvSpPr>
-          <p:cNvPr id="5" name="Footer Placeholder 4"/>
-          <p:cNvSpPr>
-            <a:spLocks noGrp="1"/>
-          </p:cNvSpPr>
-          <p:nvPr>
-            <p:ph type="ftr" sz="quarter" idx="11"/>
-          </p:nvPr>
-        </p:nvSpPr>
-        <p:spPr/>
-        <p:txBody>
-          <a:bodyPr/>
-          <a:lstStyle/>
-          <a:p>
-            <a:endParaRPr lang="en-US"/>
-          </a:p>
-        </p:txBody>
-      </p:sp>
-      <p:sp>
-        <p:nvSpPr>
-          <p:cNvPr id="6" name="Slide Number Placeholder 5"/>
-          <p:cNvSpPr>
-            <a:spLocks noGrp="1"/>
-          </p:cNvSpPr>
-          <p:nvPr>
-            <p:ph type="sldNum" sz="quarter" idx="12"/>
-          </p:nvPr>
-        </p:nvSpPr>
-        <p:spPr/>
-        <p:txBody>
-          <a:bodyPr/>
-          <a:lstStyle/>
-          <a:p>
-            <a:fld id="{C5EF2332-01BF-834F-8236-50238282D533}" type="slidenum">
-              <a:rPr lang="en-US" smtClean="0"/>
-              <a:t>‹#›</a:t>
-            </a:fld>
-            <a:endParaRPr lang="en-US"/>
-          </a:p>
-        </p:txBody>
-      </p:sp>
+      <p:pic>
+        <p:nvPicPr>
+          <p:cNvPr id="9" name="Grafik 8" descr="Ein Bild, das Text, Schrift, Logo, Grafiken enthält.&#10;&#10;KI-generierte Inhalte können fehlerhaft sein.">
+            <a:extLst>
+              <a:ext uri="{FF2B5EF4-FFF2-40B4-BE49-F238E27FC236}">
+                <a16:creationId xmlns:a16="http://schemas.microsoft.com/office/drawing/2014/main" id="{B437853F-CA93-9AE7-9710-84A4DAA2EE03}"/>
+              </a:ext>
+            </a:extLst>
+          </p:cNvPr>
+          <p:cNvPicPr>
+            <a:picLocks noChangeAspect="1"/>
+          </p:cNvPicPr>
+          <p:nvPr userDrawn="1"/>
+        </p:nvPicPr>
+        <p:blipFill>
+          <a:blip r:embed="rId2">
+            <a:extLst>
+              <a:ext uri="{28A0092B-C50C-407E-A947-70E740481C1C}">
+                <a14:useLocalDpi xmlns:a14="http://schemas.microsoft.com/office/drawing/2010/main" val="0"/>
+              </a:ext>
+            </a:extLst>
+          </a:blip>
+          <a:stretch>
+            <a:fillRect/>
+          </a:stretch>
+        </p:blipFill>
+        <p:spPr>
+          <a:xfrm>
+            <a:off x="10999434" y="6428181"/>
+            <a:ext cx="1091954" cy="346965"/>
+          </a:xfrm>
+          <a:prstGeom prst="rect">
+            <a:avLst/>
+          </a:prstGeom>
+        </p:spPr>
+      </p:pic>
     </p:spTree>
     <p:extLst>
       <p:ext uri="{BB962C8B-B14F-4D97-AF65-F5344CB8AC3E}">
-        <p14:creationId xmlns:p14="http://schemas.microsoft.com/office/powerpoint/2010/main" val="1444357513"/>
+        <p14:creationId xmlns:p14="http://schemas.microsoft.com/office/powerpoint/2010/main" val="1022475913"/>
       </p:ext>
     </p:extLst>
   </p:cSld>
@@ -1452,7 +1406,13 @@
       </p:grpSpPr>
       <p:sp>
         <p:nvSpPr>
-          <p:cNvPr id="2" name="Title 1"/>
+          <p:cNvPr id="2" name="Titel 1">
+            <a:extLst>
+              <a:ext uri="{FF2B5EF4-FFF2-40B4-BE49-F238E27FC236}">
+                <a16:creationId xmlns:a16="http://schemas.microsoft.com/office/drawing/2014/main" id="{34D58E66-C3AC-4E3C-F75B-4EED53F80251}"/>
+              </a:ext>
+            </a:extLst>
+          </p:cNvPr>
           <p:cNvSpPr>
             <a:spLocks noGrp="1"/>
           </p:cNvSpPr>
@@ -1466,15 +1426,22 @@
           <a:lstStyle/>
           <a:p>
             <a:r>
-              <a:rPr lang="en-US"/>
-              <a:t>Click to edit Master title style</a:t>
-            </a:r>
-          </a:p>
-        </p:txBody>
-      </p:sp>
-      <p:sp>
-        <p:nvSpPr>
-          <p:cNvPr id="3" name="Content Placeholder 2"/>
+              <a:rPr lang="de-DE"/>
+              <a:t>Mastertitelformat bearbeiten</a:t>
+            </a:r>
+            <a:endParaRPr lang="en-US"/>
+          </a:p>
+        </p:txBody>
+      </p:sp>
+      <p:sp>
+        <p:nvSpPr>
+          <p:cNvPr id="3" name="Inhaltsplatzhalter 2">
+            <a:extLst>
+              <a:ext uri="{FF2B5EF4-FFF2-40B4-BE49-F238E27FC236}">
+                <a16:creationId xmlns:a16="http://schemas.microsoft.com/office/drawing/2014/main" id="{C0D7E480-32AD-8371-070E-ADF49C060185}"/>
+              </a:ext>
+            </a:extLst>
+          </p:cNvPr>
           <p:cNvSpPr>
             <a:spLocks noGrp="1"/>
           </p:cNvSpPr>
@@ -1489,48 +1456,55 @@
           <a:p>
             <a:pPr lvl="0"/>
             <a:r>
-              <a:rPr lang="en-US"/>
-              <a:t>Click to edit Master text styles</a:t>
+              <a:rPr lang="de-DE"/>
+              <a:t>Mastertextformat bearbeiten</a:t>
             </a:r>
           </a:p>
           <a:p>
             <a:pPr lvl="1"/>
             <a:r>
-              <a:rPr lang="en-US"/>
-              <a:t>Second level</a:t>
+              <a:rPr lang="de-DE"/>
+              <a:t>Zweite Ebene</a:t>
             </a:r>
           </a:p>
           <a:p>
             <a:pPr lvl="2"/>
             <a:r>
-              <a:rPr lang="en-US"/>
-              <a:t>Third level</a:t>
+              <a:rPr lang="de-DE"/>
+              <a:t>Dritte Ebene</a:t>
             </a:r>
           </a:p>
           <a:p>
             <a:pPr lvl="3"/>
             <a:r>
-              <a:rPr lang="en-US"/>
-              <a:t>Fourth level</a:t>
+              <a:rPr lang="de-DE"/>
+              <a:t>Vierte Ebene</a:t>
             </a:r>
           </a:p>
           <a:p>
             <a:pPr lvl="4"/>
             <a:r>
-              <a:rPr lang="en-US"/>
-              <a:t>Fifth level</a:t>
-            </a:r>
-          </a:p>
-        </p:txBody>
-      </p:sp>
-      <p:sp>
-        <p:nvSpPr>
-          <p:cNvPr id="4" name="Date Placeholder 3"/>
-          <p:cNvSpPr>
-            <a:spLocks noGrp="1"/>
-          </p:cNvSpPr>
-          <p:nvPr>
-            <p:ph type="dt" sz="half" idx="10"/>
+              <a:rPr lang="de-DE"/>
+              <a:t>Fünfte Ebene</a:t>
+            </a:r>
+            <a:endParaRPr lang="en-US"/>
+          </a:p>
+        </p:txBody>
+      </p:sp>
+      <p:sp>
+        <p:nvSpPr>
+          <p:cNvPr id="5" name="Fußzeilenplatzhalter 4">
+            <a:extLst>
+              <a:ext uri="{FF2B5EF4-FFF2-40B4-BE49-F238E27FC236}">
+                <a16:creationId xmlns:a16="http://schemas.microsoft.com/office/drawing/2014/main" id="{617BCD7B-94D4-3091-32CB-E1EB06F3967F}"/>
+              </a:ext>
+            </a:extLst>
+          </p:cNvPr>
+          <p:cNvSpPr>
+            <a:spLocks noGrp="1"/>
+          </p:cNvSpPr>
+          <p:nvPr>
+            <p:ph type="ftr" sz="quarter" idx="11"/>
           </p:nvPr>
         </p:nvSpPr>
         <p:spPr/>
@@ -1538,60 +1512,51 @@
           <a:bodyPr/>
           <a:lstStyle/>
           <a:p>
-            <a:fld id="{241EB5C9-1307-BA42-ABA2-0BC069CD8E7F}" type="datetimeFigureOut">
+            <a:r>
+              <a:rPr lang="en-US" dirty="0"/>
+              <a:t>LMU Open Science Center</a:t>
+            </a:r>
+          </a:p>
+        </p:txBody>
+      </p:sp>
+      <p:sp>
+        <p:nvSpPr>
+          <p:cNvPr id="6" name="Foliennummernplatzhalter 5">
+            <a:extLst>
+              <a:ext uri="{FF2B5EF4-FFF2-40B4-BE49-F238E27FC236}">
+                <a16:creationId xmlns:a16="http://schemas.microsoft.com/office/drawing/2014/main" id="{BFD41A93-A5ED-6A2E-88C5-08A30FE02167}"/>
+              </a:ext>
+            </a:extLst>
+          </p:cNvPr>
+          <p:cNvSpPr>
+            <a:spLocks noGrp="1"/>
+          </p:cNvSpPr>
+          <p:nvPr>
+            <p:ph type="sldNum" sz="quarter" idx="12"/>
+          </p:nvPr>
+        </p:nvSpPr>
+        <p:spPr>
+          <a:xfrm>
+            <a:off x="838200" y="6342972"/>
+            <a:ext cx="2743200" cy="365125"/>
+          </a:xfrm>
+        </p:spPr>
+        <p:txBody>
+          <a:bodyPr/>
+          <a:lstStyle/>
+          <a:p>
+            <a:fld id="{8B250AD1-D749-4DA0-AC4A-500BF02A1CF6}" type="slidenum">
               <a:rPr lang="en-US" smtClean="0"/>
-              <a:t>1/2/22</a:t>
+              <a:t>‹Nr.›</a:t>
             </a:fld>
-            <a:endParaRPr lang="en-US"/>
-          </a:p>
-        </p:txBody>
-      </p:sp>
-      <p:sp>
-        <p:nvSpPr>
-          <p:cNvPr id="5" name="Footer Placeholder 4"/>
-          <p:cNvSpPr>
-            <a:spLocks noGrp="1"/>
-          </p:cNvSpPr>
-          <p:nvPr>
-            <p:ph type="ftr" sz="quarter" idx="11"/>
-          </p:nvPr>
-        </p:nvSpPr>
-        <p:spPr/>
-        <p:txBody>
-          <a:bodyPr/>
-          <a:lstStyle/>
-          <a:p>
-            <a:endParaRPr lang="en-US"/>
-          </a:p>
-        </p:txBody>
-      </p:sp>
-      <p:sp>
-        <p:nvSpPr>
-          <p:cNvPr id="6" name="Slide Number Placeholder 5"/>
-          <p:cNvSpPr>
-            <a:spLocks noGrp="1"/>
-          </p:cNvSpPr>
-          <p:nvPr>
-            <p:ph type="sldNum" sz="quarter" idx="12"/>
-          </p:nvPr>
-        </p:nvSpPr>
-        <p:spPr/>
-        <p:txBody>
-          <a:bodyPr/>
-          <a:lstStyle/>
-          <a:p>
-            <a:fld id="{C5EF2332-01BF-834F-8236-50238282D533}" type="slidenum">
-              <a:rPr lang="en-US" smtClean="0"/>
-              <a:t>‹#›</a:t>
-            </a:fld>
-            <a:endParaRPr lang="en-US"/>
+            <a:endParaRPr lang="en-US" dirty="0"/>
           </a:p>
         </p:txBody>
       </p:sp>
     </p:spTree>
     <p:extLst>
       <p:ext uri="{BB962C8B-B14F-4D97-AF65-F5344CB8AC3E}">
-        <p14:creationId xmlns:p14="http://schemas.microsoft.com/office/powerpoint/2010/main" val="338346009"/>
+        <p14:creationId xmlns:p14="http://schemas.microsoft.com/office/powerpoint/2010/main" val="3084089960"/>
       </p:ext>
     </p:extLst>
   </p:cSld>
@@ -1620,7 +1585,13 @@
       </p:grpSpPr>
       <p:sp>
         <p:nvSpPr>
-          <p:cNvPr id="2" name="Title 1"/>
+          <p:cNvPr id="2" name="Titel 1">
+            <a:extLst>
+              <a:ext uri="{FF2B5EF4-FFF2-40B4-BE49-F238E27FC236}">
+                <a16:creationId xmlns:a16="http://schemas.microsoft.com/office/drawing/2014/main" id="{C7661C30-919D-CBBC-C437-3EB22D7CBD40}"/>
+              </a:ext>
+            </a:extLst>
+          </p:cNvPr>
           <p:cNvSpPr>
             <a:spLocks noGrp="1"/>
           </p:cNvSpPr>
@@ -1630,28 +1601,35 @@
         </p:nvSpPr>
         <p:spPr>
           <a:xfrm>
-            <a:off x="722313" y="3305176"/>
-            <a:ext cx="7772400" cy="1021556"/>
+            <a:off x="831850" y="1709738"/>
+            <a:ext cx="10515600" cy="2852737"/>
           </a:xfrm>
         </p:spPr>
         <p:txBody>
-          <a:bodyPr anchor="t"/>
+          <a:bodyPr anchor="b"/>
           <a:lstStyle>
-            <a:lvl1pPr algn="l">
-              <a:defRPr sz="3000" b="1" cap="all"/>
+            <a:lvl1pPr>
+              <a:defRPr sz="6000"/>
             </a:lvl1pPr>
           </a:lstStyle>
           <a:p>
             <a:r>
-              <a:rPr lang="en-US"/>
-              <a:t>Click to edit Master title style</a:t>
-            </a:r>
-          </a:p>
-        </p:txBody>
-      </p:sp>
-      <p:sp>
-        <p:nvSpPr>
-          <p:cNvPr id="3" name="Text Placeholder 2"/>
+              <a:rPr lang="de-DE"/>
+              <a:t>Mastertitelformat bearbeiten</a:t>
+            </a:r>
+            <a:endParaRPr lang="en-US"/>
+          </a:p>
+        </p:txBody>
+      </p:sp>
+      <p:sp>
+        <p:nvSpPr>
+          <p:cNvPr id="3" name="Textplatzhalter 2">
+            <a:extLst>
+              <a:ext uri="{FF2B5EF4-FFF2-40B4-BE49-F238E27FC236}">
+                <a16:creationId xmlns:a16="http://schemas.microsoft.com/office/drawing/2014/main" id="{74190F83-FA10-6325-CB2B-81D5C4324528}"/>
+              </a:ext>
+            </a:extLst>
+          </p:cNvPr>
           <p:cNvSpPr>
             <a:spLocks noGrp="1"/>
           </p:cNvSpPr>
@@ -1661,99 +1639,99 @@
         </p:nvSpPr>
         <p:spPr>
           <a:xfrm>
-            <a:off x="722313" y="2180035"/>
-            <a:ext cx="7772400" cy="1125140"/>
+            <a:off x="831850" y="4589463"/>
+            <a:ext cx="10515600" cy="1500187"/>
           </a:xfrm>
         </p:spPr>
         <p:txBody>
-          <a:bodyPr anchor="b"/>
+          <a:bodyPr/>
           <a:lstStyle>
             <a:lvl1pPr marL="0" indent="0">
               <a:buNone/>
-              <a:defRPr sz="1500">
+              <a:defRPr sz="2400">
                 <a:solidFill>
                   <a:schemeClr val="tx1">
-                    <a:tint val="75000"/>
+                    <a:tint val="82000"/>
                   </a:schemeClr>
                 </a:solidFill>
               </a:defRPr>
             </a:lvl1pPr>
-            <a:lvl2pPr marL="342900" indent="0">
-              <a:buNone/>
-              <a:defRPr sz="1350">
+            <a:lvl2pPr marL="457200" indent="0">
+              <a:buNone/>
+              <a:defRPr sz="2000">
                 <a:solidFill>
                   <a:schemeClr val="tx1">
-                    <a:tint val="75000"/>
+                    <a:tint val="82000"/>
                   </a:schemeClr>
                 </a:solidFill>
               </a:defRPr>
             </a:lvl2pPr>
-            <a:lvl3pPr marL="685800" indent="0">
-              <a:buNone/>
-              <a:defRPr sz="1200">
+            <a:lvl3pPr marL="914400" indent="0">
+              <a:buNone/>
+              <a:defRPr sz="1800">
                 <a:solidFill>
                   <a:schemeClr val="tx1">
-                    <a:tint val="75000"/>
+                    <a:tint val="82000"/>
                   </a:schemeClr>
                 </a:solidFill>
               </a:defRPr>
             </a:lvl3pPr>
-            <a:lvl4pPr marL="1028700" indent="0">
-              <a:buNone/>
-              <a:defRPr sz="1050">
+            <a:lvl4pPr marL="1371600" indent="0">
+              <a:buNone/>
+              <a:defRPr sz="1600">
                 <a:solidFill>
                   <a:schemeClr val="tx1">
-                    <a:tint val="75000"/>
+                    <a:tint val="82000"/>
                   </a:schemeClr>
                 </a:solidFill>
               </a:defRPr>
             </a:lvl4pPr>
-            <a:lvl5pPr marL="1371600" indent="0">
-              <a:buNone/>
-              <a:defRPr sz="1050">
+            <a:lvl5pPr marL="1828800" indent="0">
+              <a:buNone/>
+              <a:defRPr sz="1600">
                 <a:solidFill>
                   <a:schemeClr val="tx1">
-                    <a:tint val="75000"/>
+                    <a:tint val="82000"/>
                   </a:schemeClr>
                 </a:solidFill>
               </a:defRPr>
             </a:lvl5pPr>
-            <a:lvl6pPr marL="1714500" indent="0">
-              <a:buNone/>
-              <a:defRPr sz="1050">
+            <a:lvl6pPr marL="2286000" indent="0">
+              <a:buNone/>
+              <a:defRPr sz="1600">
                 <a:solidFill>
                   <a:schemeClr val="tx1">
-                    <a:tint val="75000"/>
+                    <a:tint val="82000"/>
                   </a:schemeClr>
                 </a:solidFill>
               </a:defRPr>
             </a:lvl6pPr>
-            <a:lvl7pPr marL="2057400" indent="0">
-              <a:buNone/>
-              <a:defRPr sz="1050">
+            <a:lvl7pPr marL="2743200" indent="0">
+              <a:buNone/>
+              <a:defRPr sz="1600">
                 <a:solidFill>
                   <a:schemeClr val="tx1">
-                    <a:tint val="75000"/>
+                    <a:tint val="82000"/>
                   </a:schemeClr>
                 </a:solidFill>
               </a:defRPr>
             </a:lvl7pPr>
-            <a:lvl8pPr marL="2400300" indent="0">
-              <a:buNone/>
-              <a:defRPr sz="1050">
+            <a:lvl8pPr marL="3200400" indent="0">
+              <a:buNone/>
+              <a:defRPr sz="1600">
                 <a:solidFill>
                   <a:schemeClr val="tx1">
-                    <a:tint val="75000"/>
+                    <a:tint val="82000"/>
                   </a:schemeClr>
                 </a:solidFill>
               </a:defRPr>
             </a:lvl8pPr>
-            <a:lvl9pPr marL="2743200" indent="0">
-              <a:buNone/>
-              <a:defRPr sz="1050">
+            <a:lvl9pPr marL="3657600" indent="0">
+              <a:buNone/>
+              <a:defRPr sz="1600">
                 <a:solidFill>
                   <a:schemeClr val="tx1">
-                    <a:tint val="75000"/>
+                    <a:tint val="82000"/>
                   </a:schemeClr>
                 </a:solidFill>
               </a:defRPr>
@@ -1762,20 +1740,26 @@
           <a:p>
             <a:pPr lvl="0"/>
             <a:r>
-              <a:rPr lang="en-US"/>
-              <a:t>Click to edit Master text styles</a:t>
-            </a:r>
-          </a:p>
-        </p:txBody>
-      </p:sp>
-      <p:sp>
-        <p:nvSpPr>
-          <p:cNvPr id="4" name="Date Placeholder 3"/>
-          <p:cNvSpPr>
-            <a:spLocks noGrp="1"/>
-          </p:cNvSpPr>
-          <p:nvPr>
-            <p:ph type="dt" sz="half" idx="10"/>
+              <a:rPr lang="de-DE"/>
+              <a:t>Mastertextformat bearbeiten</a:t>
+            </a:r>
+          </a:p>
+        </p:txBody>
+      </p:sp>
+      <p:sp>
+        <p:nvSpPr>
+          <p:cNvPr id="5" name="Fußzeilenplatzhalter 4">
+            <a:extLst>
+              <a:ext uri="{FF2B5EF4-FFF2-40B4-BE49-F238E27FC236}">
+                <a16:creationId xmlns:a16="http://schemas.microsoft.com/office/drawing/2014/main" id="{0AEEC87B-E3E2-3603-400C-FFA9FD230AC8}"/>
+              </a:ext>
+            </a:extLst>
+          </p:cNvPr>
+          <p:cNvSpPr>
+            <a:spLocks noGrp="1"/>
+          </p:cNvSpPr>
+          <p:nvPr>
+            <p:ph type="ftr" sz="quarter" idx="11"/>
           </p:nvPr>
         </p:nvSpPr>
         <p:spPr/>
@@ -1783,51 +1767,42 @@
           <a:bodyPr/>
           <a:lstStyle/>
           <a:p>
-            <a:fld id="{241EB5C9-1307-BA42-ABA2-0BC069CD8E7F}" type="datetimeFigureOut">
+            <a:r>
+              <a:rPr lang="en-US" dirty="0"/>
+              <a:t>LMU Open Science Center</a:t>
+            </a:r>
+          </a:p>
+        </p:txBody>
+      </p:sp>
+      <p:sp>
+        <p:nvSpPr>
+          <p:cNvPr id="6" name="Foliennummernplatzhalter 5">
+            <a:extLst>
+              <a:ext uri="{FF2B5EF4-FFF2-40B4-BE49-F238E27FC236}">
+                <a16:creationId xmlns:a16="http://schemas.microsoft.com/office/drawing/2014/main" id="{E96EE1A3-6D65-4B66-AFB1-DA7FFD39F988}"/>
+              </a:ext>
+            </a:extLst>
+          </p:cNvPr>
+          <p:cNvSpPr>
+            <a:spLocks noGrp="1"/>
+          </p:cNvSpPr>
+          <p:nvPr>
+            <p:ph type="sldNum" sz="quarter" idx="12"/>
+          </p:nvPr>
+        </p:nvSpPr>
+        <p:spPr>
+          <a:xfrm>
+            <a:off x="831850" y="6356349"/>
+            <a:ext cx="2743200" cy="365125"/>
+          </a:xfrm>
+        </p:spPr>
+        <p:txBody>
+          <a:bodyPr/>
+          <a:lstStyle/>
+          <a:p>
+            <a:fld id="{8B250AD1-D749-4DA0-AC4A-500BF02A1CF6}" type="slidenum">
               <a:rPr lang="en-US" smtClean="0"/>
-              <a:t>1/2/22</a:t>
-            </a:fld>
-            <a:endParaRPr lang="en-US"/>
-          </a:p>
-        </p:txBody>
-      </p:sp>
-      <p:sp>
-        <p:nvSpPr>
-          <p:cNvPr id="5" name="Footer Placeholder 4"/>
-          <p:cNvSpPr>
-            <a:spLocks noGrp="1"/>
-          </p:cNvSpPr>
-          <p:nvPr>
-            <p:ph type="ftr" sz="quarter" idx="11"/>
-          </p:nvPr>
-        </p:nvSpPr>
-        <p:spPr/>
-        <p:txBody>
-          <a:bodyPr/>
-          <a:lstStyle/>
-          <a:p>
-            <a:endParaRPr lang="en-US"/>
-          </a:p>
-        </p:txBody>
-      </p:sp>
-      <p:sp>
-        <p:nvSpPr>
-          <p:cNvPr id="6" name="Slide Number Placeholder 5"/>
-          <p:cNvSpPr>
-            <a:spLocks noGrp="1"/>
-          </p:cNvSpPr>
-          <p:nvPr>
-            <p:ph type="sldNum" sz="quarter" idx="12"/>
-          </p:nvPr>
-        </p:nvSpPr>
-        <p:spPr/>
-        <p:txBody>
-          <a:bodyPr/>
-          <a:lstStyle/>
-          <a:p>
-            <a:fld id="{C5EF2332-01BF-834F-8236-50238282D533}" type="slidenum">
-              <a:rPr lang="en-US" smtClean="0"/>
-              <a:t>‹#›</a:t>
+              <a:t>‹Nr.›</a:t>
             </a:fld>
             <a:endParaRPr lang="en-US"/>
           </a:p>
@@ -1836,7 +1811,7 @@
     </p:spTree>
     <p:extLst>
       <p:ext uri="{BB962C8B-B14F-4D97-AF65-F5344CB8AC3E}">
-        <p14:creationId xmlns:p14="http://schemas.microsoft.com/office/powerpoint/2010/main" val="1073069076"/>
+        <p14:creationId xmlns:p14="http://schemas.microsoft.com/office/powerpoint/2010/main" val="2668464160"/>
       </p:ext>
     </p:extLst>
   </p:cSld>
@@ -1865,7 +1840,13 @@
       </p:grpSpPr>
       <p:sp>
         <p:nvSpPr>
-          <p:cNvPr id="2" name="Title 1"/>
+          <p:cNvPr id="2" name="Titel 1">
+            <a:extLst>
+              <a:ext uri="{FF2B5EF4-FFF2-40B4-BE49-F238E27FC236}">
+                <a16:creationId xmlns:a16="http://schemas.microsoft.com/office/drawing/2014/main" id="{52FE429B-240B-9B81-ABC8-83E3CC85254B}"/>
+              </a:ext>
+            </a:extLst>
+          </p:cNvPr>
           <p:cNvSpPr>
             <a:spLocks noGrp="1"/>
           </p:cNvSpPr>
@@ -1879,15 +1860,22 @@
           <a:lstStyle/>
           <a:p>
             <a:r>
-              <a:rPr lang="en-US"/>
-              <a:t>Click to edit Master title style</a:t>
-            </a:r>
-          </a:p>
-        </p:txBody>
-      </p:sp>
-      <p:sp>
-        <p:nvSpPr>
-          <p:cNvPr id="3" name="Content Placeholder 2"/>
+              <a:rPr lang="de-DE"/>
+              <a:t>Mastertitelformat bearbeiten</a:t>
+            </a:r>
+            <a:endParaRPr lang="en-US"/>
+          </a:p>
+        </p:txBody>
+      </p:sp>
+      <p:sp>
+        <p:nvSpPr>
+          <p:cNvPr id="3" name="Inhaltsplatzhalter 2">
+            <a:extLst>
+              <a:ext uri="{FF2B5EF4-FFF2-40B4-BE49-F238E27FC236}">
+                <a16:creationId xmlns:a16="http://schemas.microsoft.com/office/drawing/2014/main" id="{082852E9-E569-ADFA-2899-01F5F91BE9B7}"/>
+              </a:ext>
+            </a:extLst>
+          </p:cNvPr>
           <p:cNvSpPr>
             <a:spLocks noGrp="1"/>
           </p:cNvSpPr>
@@ -1897,81 +1885,60 @@
         </p:nvSpPr>
         <p:spPr>
           <a:xfrm>
-            <a:off x="457200" y="1200151"/>
-            <a:ext cx="4038600" cy="3394472"/>
+            <a:off x="838200" y="1825625"/>
+            <a:ext cx="5181600" cy="4351338"/>
           </a:xfrm>
         </p:spPr>
         <p:txBody>
           <a:bodyPr/>
-          <a:lstStyle>
-            <a:lvl1pPr>
-              <a:defRPr sz="2100"/>
-            </a:lvl1pPr>
-            <a:lvl2pPr>
-              <a:defRPr sz="1800"/>
-            </a:lvl2pPr>
-            <a:lvl3pPr>
-              <a:defRPr sz="1500"/>
-            </a:lvl3pPr>
-            <a:lvl4pPr>
-              <a:defRPr sz="1350"/>
-            </a:lvl4pPr>
-            <a:lvl5pPr>
-              <a:defRPr sz="1350"/>
-            </a:lvl5pPr>
-            <a:lvl6pPr>
-              <a:defRPr sz="1350"/>
-            </a:lvl6pPr>
-            <a:lvl7pPr>
-              <a:defRPr sz="1350"/>
-            </a:lvl7pPr>
-            <a:lvl8pPr>
-              <a:defRPr sz="1350"/>
-            </a:lvl8pPr>
-            <a:lvl9pPr>
-              <a:defRPr sz="1350"/>
-            </a:lvl9pPr>
-          </a:lstStyle>
+          <a:lstStyle/>
           <a:p>
             <a:pPr lvl="0"/>
             <a:r>
-              <a:rPr lang="en-US"/>
-              <a:t>Click to edit Master text styles</a:t>
+              <a:rPr lang="de-DE"/>
+              <a:t>Mastertextformat bearbeiten</a:t>
             </a:r>
           </a:p>
           <a:p>
             <a:pPr lvl="1"/>
             <a:r>
-              <a:rPr lang="en-US"/>
-              <a:t>Second level</a:t>
+              <a:rPr lang="de-DE"/>
+              <a:t>Zweite Ebene</a:t>
             </a:r>
           </a:p>
           <a:p>
             <a:pPr lvl="2"/>
             <a:r>
-              <a:rPr lang="en-US"/>
-              <a:t>Third level</a:t>
+              <a:rPr lang="de-DE"/>
+              <a:t>Dritte Ebene</a:t>
             </a:r>
           </a:p>
           <a:p>
             <a:pPr lvl="3"/>
             <a:r>
-              <a:rPr lang="en-US"/>
-              <a:t>Fourth level</a:t>
+              <a:rPr lang="de-DE"/>
+              <a:t>Vierte Ebene</a:t>
             </a:r>
           </a:p>
           <a:p>
             <a:pPr lvl="4"/>
             <a:r>
-              <a:rPr lang="en-US"/>
-              <a:t>Fifth level</a:t>
-            </a:r>
-          </a:p>
-        </p:txBody>
-      </p:sp>
-      <p:sp>
-        <p:nvSpPr>
-          <p:cNvPr id="4" name="Content Placeholder 3"/>
+              <a:rPr lang="de-DE"/>
+              <a:t>Fünfte Ebene</a:t>
+            </a:r>
+            <a:endParaRPr lang="en-US"/>
+          </a:p>
+        </p:txBody>
+      </p:sp>
+      <p:sp>
+        <p:nvSpPr>
+          <p:cNvPr id="4" name="Inhaltsplatzhalter 3">
+            <a:extLst>
+              <a:ext uri="{FF2B5EF4-FFF2-40B4-BE49-F238E27FC236}">
+                <a16:creationId xmlns:a16="http://schemas.microsoft.com/office/drawing/2014/main" id="{A1550CCF-9313-CC28-2590-DCA26985A7EC}"/>
+              </a:ext>
+            </a:extLst>
+          </p:cNvPr>
           <p:cNvSpPr>
             <a:spLocks noGrp="1"/>
           </p:cNvSpPr>
@@ -1981,86 +1948,65 @@
         </p:nvSpPr>
         <p:spPr>
           <a:xfrm>
-            <a:off x="4648200" y="1200151"/>
-            <a:ext cx="4038600" cy="3394472"/>
+            <a:off x="6172200" y="1825625"/>
+            <a:ext cx="5181600" cy="4351338"/>
           </a:xfrm>
         </p:spPr>
         <p:txBody>
           <a:bodyPr/>
-          <a:lstStyle>
-            <a:lvl1pPr>
-              <a:defRPr sz="2100"/>
-            </a:lvl1pPr>
-            <a:lvl2pPr>
-              <a:defRPr sz="1800"/>
-            </a:lvl2pPr>
-            <a:lvl3pPr>
-              <a:defRPr sz="1500"/>
-            </a:lvl3pPr>
-            <a:lvl4pPr>
-              <a:defRPr sz="1350"/>
-            </a:lvl4pPr>
-            <a:lvl5pPr>
-              <a:defRPr sz="1350"/>
-            </a:lvl5pPr>
-            <a:lvl6pPr>
-              <a:defRPr sz="1350"/>
-            </a:lvl6pPr>
-            <a:lvl7pPr>
-              <a:defRPr sz="1350"/>
-            </a:lvl7pPr>
-            <a:lvl8pPr>
-              <a:defRPr sz="1350"/>
-            </a:lvl8pPr>
-            <a:lvl9pPr>
-              <a:defRPr sz="1350"/>
-            </a:lvl9pPr>
-          </a:lstStyle>
+          <a:lstStyle/>
           <a:p>
             <a:pPr lvl="0"/>
             <a:r>
-              <a:rPr lang="en-US"/>
-              <a:t>Click to edit Master text styles</a:t>
+              <a:rPr lang="de-DE"/>
+              <a:t>Mastertextformat bearbeiten</a:t>
             </a:r>
           </a:p>
           <a:p>
             <a:pPr lvl="1"/>
             <a:r>
-              <a:rPr lang="en-US"/>
-              <a:t>Second level</a:t>
+              <a:rPr lang="de-DE"/>
+              <a:t>Zweite Ebene</a:t>
             </a:r>
           </a:p>
           <a:p>
             <a:pPr lvl="2"/>
             <a:r>
-              <a:rPr lang="en-US"/>
-              <a:t>Third level</a:t>
+              <a:rPr lang="de-DE"/>
+              <a:t>Dritte Ebene</a:t>
             </a:r>
           </a:p>
           <a:p>
             <a:pPr lvl="3"/>
             <a:r>
-              <a:rPr lang="en-US"/>
-              <a:t>Fourth level</a:t>
+              <a:rPr lang="de-DE"/>
+              <a:t>Vierte Ebene</a:t>
             </a:r>
           </a:p>
           <a:p>
             <a:pPr lvl="4"/>
             <a:r>
-              <a:rPr lang="en-US"/>
-              <a:t>Fifth level</a:t>
-            </a:r>
-          </a:p>
-        </p:txBody>
-      </p:sp>
-      <p:sp>
-        <p:nvSpPr>
-          <p:cNvPr id="5" name="Date Placeholder 4"/>
-          <p:cNvSpPr>
-            <a:spLocks noGrp="1"/>
-          </p:cNvSpPr>
-          <p:nvPr>
-            <p:ph type="dt" sz="half" idx="10"/>
+              <a:rPr lang="de-DE"/>
+              <a:t>Fünfte Ebene</a:t>
+            </a:r>
+            <a:endParaRPr lang="en-US"/>
+          </a:p>
+        </p:txBody>
+      </p:sp>
+      <p:sp>
+        <p:nvSpPr>
+          <p:cNvPr id="6" name="Fußzeilenplatzhalter 5">
+            <a:extLst>
+              <a:ext uri="{FF2B5EF4-FFF2-40B4-BE49-F238E27FC236}">
+                <a16:creationId xmlns:a16="http://schemas.microsoft.com/office/drawing/2014/main" id="{9AA47D34-A95B-DFB1-9948-AF368AB4574F}"/>
+              </a:ext>
+            </a:extLst>
+          </p:cNvPr>
+          <p:cNvSpPr>
+            <a:spLocks noGrp="1"/>
+          </p:cNvSpPr>
+          <p:nvPr>
+            <p:ph type="ftr" sz="quarter" idx="11"/>
           </p:nvPr>
         </p:nvSpPr>
         <p:spPr/>
@@ -2068,51 +2014,37 @@
           <a:bodyPr/>
           <a:lstStyle/>
           <a:p>
-            <a:fld id="{241EB5C9-1307-BA42-ABA2-0BC069CD8E7F}" type="datetimeFigureOut">
+            <a:r>
+              <a:rPr lang="en-US" dirty="0"/>
+              <a:t>LMU Open Science Center</a:t>
+            </a:r>
+          </a:p>
+        </p:txBody>
+      </p:sp>
+      <p:sp>
+        <p:nvSpPr>
+          <p:cNvPr id="7" name="Foliennummernplatzhalter 6">
+            <a:extLst>
+              <a:ext uri="{FF2B5EF4-FFF2-40B4-BE49-F238E27FC236}">
+                <a16:creationId xmlns:a16="http://schemas.microsoft.com/office/drawing/2014/main" id="{53070A87-E342-0FD1-0431-8F1776EAD25B}"/>
+              </a:ext>
+            </a:extLst>
+          </p:cNvPr>
+          <p:cNvSpPr>
+            <a:spLocks noGrp="1"/>
+          </p:cNvSpPr>
+          <p:nvPr>
+            <p:ph type="sldNum" sz="quarter" idx="12"/>
+          </p:nvPr>
+        </p:nvSpPr>
+        <p:spPr/>
+        <p:txBody>
+          <a:bodyPr/>
+          <a:lstStyle/>
+          <a:p>
+            <a:fld id="{8B250AD1-D749-4DA0-AC4A-500BF02A1CF6}" type="slidenum">
               <a:rPr lang="en-US" smtClean="0"/>
-              <a:t>1/2/22</a:t>
-            </a:fld>
-            <a:endParaRPr lang="en-US"/>
-          </a:p>
-        </p:txBody>
-      </p:sp>
-      <p:sp>
-        <p:nvSpPr>
-          <p:cNvPr id="6" name="Footer Placeholder 5"/>
-          <p:cNvSpPr>
-            <a:spLocks noGrp="1"/>
-          </p:cNvSpPr>
-          <p:nvPr>
-            <p:ph type="ftr" sz="quarter" idx="11"/>
-          </p:nvPr>
-        </p:nvSpPr>
-        <p:spPr/>
-        <p:txBody>
-          <a:bodyPr/>
-          <a:lstStyle/>
-          <a:p>
-            <a:endParaRPr lang="en-US"/>
-          </a:p>
-        </p:txBody>
-      </p:sp>
-      <p:sp>
-        <p:nvSpPr>
-          <p:cNvPr id="7" name="Slide Number Placeholder 6"/>
-          <p:cNvSpPr>
-            <a:spLocks noGrp="1"/>
-          </p:cNvSpPr>
-          <p:nvPr>
-            <p:ph type="sldNum" sz="quarter" idx="12"/>
-          </p:nvPr>
-        </p:nvSpPr>
-        <p:spPr/>
-        <p:txBody>
-          <a:bodyPr/>
-          <a:lstStyle/>
-          <a:p>
-            <a:fld id="{C5EF2332-01BF-834F-8236-50238282D533}" type="slidenum">
-              <a:rPr lang="en-US" smtClean="0"/>
-              <a:t>‹#›</a:t>
+              <a:t>‹Nr.›</a:t>
             </a:fld>
             <a:endParaRPr lang="en-US"/>
           </a:p>
@@ -2121,7 +2053,7 @@
     </p:spTree>
     <p:extLst>
       <p:ext uri="{BB962C8B-B14F-4D97-AF65-F5344CB8AC3E}">
-        <p14:creationId xmlns:p14="http://schemas.microsoft.com/office/powerpoint/2010/main" val="2619886245"/>
+        <p14:creationId xmlns:p14="http://schemas.microsoft.com/office/powerpoint/2010/main" val="1330609844"/>
       </p:ext>
     </p:extLst>
   </p:cSld>
@@ -2150,44 +2082,58 @@
       </p:grpSpPr>
       <p:sp>
         <p:nvSpPr>
-          <p:cNvPr id="2" name="Title 1"/>
+          <p:cNvPr id="2" name="Titel 1">
+            <a:extLst>
+              <a:ext uri="{FF2B5EF4-FFF2-40B4-BE49-F238E27FC236}">
+                <a16:creationId xmlns:a16="http://schemas.microsoft.com/office/drawing/2014/main" id="{AC3105E4-6F54-4705-ACEB-0CB091FAC0AF}"/>
+              </a:ext>
+            </a:extLst>
+          </p:cNvPr>
           <p:cNvSpPr>
             <a:spLocks noGrp="1"/>
           </p:cNvSpPr>
           <p:nvPr>
             <p:ph type="title"/>
-          </p:nvPr>
-        </p:nvSpPr>
-        <p:spPr/>
-        <p:txBody>
-          <a:bodyPr/>
-          <a:lstStyle>
-            <a:lvl1pPr>
-              <a:defRPr/>
-            </a:lvl1pPr>
-          </a:lstStyle>
-          <a:p>
-            <a:r>
-              <a:rPr lang="en-US"/>
-              <a:t>Click to edit Master title style</a:t>
-            </a:r>
-          </a:p>
-        </p:txBody>
-      </p:sp>
-      <p:sp>
-        <p:nvSpPr>
-          <p:cNvPr id="3" name="Text Placeholder 2"/>
-          <p:cNvSpPr>
-            <a:spLocks noGrp="1"/>
-          </p:cNvSpPr>
-          <p:nvPr>
-            <p:ph type="body" idx="1"/>
           </p:nvPr>
         </p:nvSpPr>
         <p:spPr>
           <a:xfrm>
-            <a:off x="457200" y="1151335"/>
-            <a:ext cx="4040188" cy="479822"/>
+            <a:off x="839788" y="365125"/>
+            <a:ext cx="10515600" cy="1325563"/>
+          </a:xfrm>
+        </p:spPr>
+        <p:txBody>
+          <a:bodyPr/>
+          <a:lstStyle/>
+          <a:p>
+            <a:r>
+              <a:rPr lang="de-DE"/>
+              <a:t>Mastertitelformat bearbeiten</a:t>
+            </a:r>
+            <a:endParaRPr lang="en-US"/>
+          </a:p>
+        </p:txBody>
+      </p:sp>
+      <p:sp>
+        <p:nvSpPr>
+          <p:cNvPr id="3" name="Textplatzhalter 2">
+            <a:extLst>
+              <a:ext uri="{FF2B5EF4-FFF2-40B4-BE49-F238E27FC236}">
+                <a16:creationId xmlns:a16="http://schemas.microsoft.com/office/drawing/2014/main" id="{0E1F40F4-D4E2-D691-E035-9CC4C6F7D642}"/>
+              </a:ext>
+            </a:extLst>
+          </p:cNvPr>
+          <p:cNvSpPr>
+            <a:spLocks noGrp="1"/>
+          </p:cNvSpPr>
+          <p:nvPr>
+            <p:ph type="body" idx="1"/>
+          </p:nvPr>
+        </p:nvSpPr>
+        <p:spPr>
+          <a:xfrm>
+            <a:off x="839788" y="1681163"/>
+            <a:ext cx="5157787" cy="823912"/>
           </a:xfrm>
         </p:spPr>
         <p:txBody>
@@ -2195,53 +2141,59 @@
           <a:lstStyle>
             <a:lvl1pPr marL="0" indent="0">
               <a:buNone/>
+              <a:defRPr sz="2400" b="1"/>
+            </a:lvl1pPr>
+            <a:lvl2pPr marL="457200" indent="0">
+              <a:buNone/>
+              <a:defRPr sz="2000" b="1"/>
+            </a:lvl2pPr>
+            <a:lvl3pPr marL="914400" indent="0">
+              <a:buNone/>
               <a:defRPr sz="1800" b="1"/>
-            </a:lvl1pPr>
-            <a:lvl2pPr marL="342900" indent="0">
-              <a:buNone/>
-              <a:defRPr sz="1500" b="1"/>
-            </a:lvl2pPr>
-            <a:lvl3pPr marL="685800" indent="0">
-              <a:buNone/>
-              <a:defRPr sz="1350" b="1"/>
             </a:lvl3pPr>
-            <a:lvl4pPr marL="1028700" indent="0">
-              <a:buNone/>
-              <a:defRPr sz="1200" b="1"/>
+            <a:lvl4pPr marL="1371600" indent="0">
+              <a:buNone/>
+              <a:defRPr sz="1600" b="1"/>
             </a:lvl4pPr>
-            <a:lvl5pPr marL="1371600" indent="0">
-              <a:buNone/>
-              <a:defRPr sz="1200" b="1"/>
+            <a:lvl5pPr marL="1828800" indent="0">
+              <a:buNone/>
+              <a:defRPr sz="1600" b="1"/>
             </a:lvl5pPr>
-            <a:lvl6pPr marL="1714500" indent="0">
-              <a:buNone/>
-              <a:defRPr sz="1200" b="1"/>
+            <a:lvl6pPr marL="2286000" indent="0">
+              <a:buNone/>
+              <a:defRPr sz="1600" b="1"/>
             </a:lvl6pPr>
-            <a:lvl7pPr marL="2057400" indent="0">
-              <a:buNone/>
-              <a:defRPr sz="1200" b="1"/>
+            <a:lvl7pPr marL="2743200" indent="0">
+              <a:buNone/>
+              <a:defRPr sz="1600" b="1"/>
             </a:lvl7pPr>
-            <a:lvl8pPr marL="2400300" indent="0">
-              <a:buNone/>
-              <a:defRPr sz="1200" b="1"/>
+            <a:lvl8pPr marL="3200400" indent="0">
+              <a:buNone/>
+              <a:defRPr sz="1600" b="1"/>
             </a:lvl8pPr>
-            <a:lvl9pPr marL="2743200" indent="0">
-              <a:buNone/>
-              <a:defRPr sz="1200" b="1"/>
+            <a:lvl9pPr marL="3657600" indent="0">
+              <a:buNone/>
+              <a:defRPr sz="1600" b="1"/>
             </a:lvl9pPr>
           </a:lstStyle>
           <a:p>
             <a:pPr lvl="0"/>
             <a:r>
-              <a:rPr lang="en-US"/>
-              <a:t>Click to edit Master text styles</a:t>
-            </a:r>
-          </a:p>
-        </p:txBody>
-      </p:sp>
-      <p:sp>
-        <p:nvSpPr>
-          <p:cNvPr id="4" name="Content Placeholder 3"/>
+              <a:rPr lang="de-DE"/>
+              <a:t>Mastertextformat bearbeiten</a:t>
+            </a:r>
+          </a:p>
+        </p:txBody>
+      </p:sp>
+      <p:sp>
+        <p:nvSpPr>
+          <p:cNvPr id="4" name="Inhaltsplatzhalter 3">
+            <a:extLst>
+              <a:ext uri="{FF2B5EF4-FFF2-40B4-BE49-F238E27FC236}">
+                <a16:creationId xmlns:a16="http://schemas.microsoft.com/office/drawing/2014/main" id="{A20A8A89-DF95-8A45-D2FF-45A70B781695}"/>
+              </a:ext>
+            </a:extLst>
+          </p:cNvPr>
           <p:cNvSpPr>
             <a:spLocks noGrp="1"/>
           </p:cNvSpPr>
@@ -2251,81 +2203,60 @@
         </p:nvSpPr>
         <p:spPr>
           <a:xfrm>
-            <a:off x="457200" y="1631156"/>
-            <a:ext cx="4040188" cy="2963466"/>
+            <a:off x="839788" y="2505075"/>
+            <a:ext cx="5157787" cy="3684588"/>
           </a:xfrm>
         </p:spPr>
         <p:txBody>
           <a:bodyPr/>
-          <a:lstStyle>
-            <a:lvl1pPr>
-              <a:defRPr sz="1800"/>
-            </a:lvl1pPr>
-            <a:lvl2pPr>
-              <a:defRPr sz="1500"/>
-            </a:lvl2pPr>
-            <a:lvl3pPr>
-              <a:defRPr sz="1350"/>
-            </a:lvl3pPr>
-            <a:lvl4pPr>
-              <a:defRPr sz="1200"/>
-            </a:lvl4pPr>
-            <a:lvl5pPr>
-              <a:defRPr sz="1200"/>
-            </a:lvl5pPr>
-            <a:lvl6pPr>
-              <a:defRPr sz="1200"/>
-            </a:lvl6pPr>
-            <a:lvl7pPr>
-              <a:defRPr sz="1200"/>
-            </a:lvl7pPr>
-            <a:lvl8pPr>
-              <a:defRPr sz="1200"/>
-            </a:lvl8pPr>
-            <a:lvl9pPr>
-              <a:defRPr sz="1200"/>
-            </a:lvl9pPr>
-          </a:lstStyle>
+          <a:lstStyle/>
           <a:p>
             <a:pPr lvl="0"/>
             <a:r>
-              <a:rPr lang="en-US"/>
-              <a:t>Click to edit Master text styles</a:t>
+              <a:rPr lang="de-DE"/>
+              <a:t>Mastertextformat bearbeiten</a:t>
             </a:r>
           </a:p>
           <a:p>
             <a:pPr lvl="1"/>
             <a:r>
-              <a:rPr lang="en-US"/>
-              <a:t>Second level</a:t>
+              <a:rPr lang="de-DE"/>
+              <a:t>Zweite Ebene</a:t>
             </a:r>
           </a:p>
           <a:p>
             <a:pPr lvl="2"/>
             <a:r>
-              <a:rPr lang="en-US"/>
-              <a:t>Third level</a:t>
+              <a:rPr lang="de-DE"/>
+              <a:t>Dritte Ebene</a:t>
             </a:r>
           </a:p>
           <a:p>
             <a:pPr lvl="3"/>
             <a:r>
-              <a:rPr lang="en-US"/>
-              <a:t>Fourth level</a:t>
+              <a:rPr lang="de-DE"/>
+              <a:t>Vierte Ebene</a:t>
             </a:r>
           </a:p>
           <a:p>
             <a:pPr lvl="4"/>
             <a:r>
-              <a:rPr lang="en-US"/>
-              <a:t>Fifth level</a:t>
-            </a:r>
-          </a:p>
-        </p:txBody>
-      </p:sp>
-      <p:sp>
-        <p:nvSpPr>
-          <p:cNvPr id="5" name="Text Placeholder 4"/>
+              <a:rPr lang="de-DE"/>
+              <a:t>Fünfte Ebene</a:t>
+            </a:r>
+            <a:endParaRPr lang="en-US"/>
+          </a:p>
+        </p:txBody>
+      </p:sp>
+      <p:sp>
+        <p:nvSpPr>
+          <p:cNvPr id="5" name="Textplatzhalter 4">
+            <a:extLst>
+              <a:ext uri="{FF2B5EF4-FFF2-40B4-BE49-F238E27FC236}">
+                <a16:creationId xmlns:a16="http://schemas.microsoft.com/office/drawing/2014/main" id="{733AE4CA-07D5-CFAA-230F-03CABBAE577C}"/>
+              </a:ext>
+            </a:extLst>
+          </p:cNvPr>
           <p:cNvSpPr>
             <a:spLocks noGrp="1"/>
           </p:cNvSpPr>
@@ -2335,8 +2266,8 @@
         </p:nvSpPr>
         <p:spPr>
           <a:xfrm>
-            <a:off x="4645026" y="1151335"/>
-            <a:ext cx="4041775" cy="479822"/>
+            <a:off x="6172200" y="1681163"/>
+            <a:ext cx="5183188" cy="823912"/>
           </a:xfrm>
         </p:spPr>
         <p:txBody>
@@ -2344,53 +2275,59 @@
           <a:lstStyle>
             <a:lvl1pPr marL="0" indent="0">
               <a:buNone/>
+              <a:defRPr sz="2400" b="1"/>
+            </a:lvl1pPr>
+            <a:lvl2pPr marL="457200" indent="0">
+              <a:buNone/>
+              <a:defRPr sz="2000" b="1"/>
+            </a:lvl2pPr>
+            <a:lvl3pPr marL="914400" indent="0">
+              <a:buNone/>
               <a:defRPr sz="1800" b="1"/>
-            </a:lvl1pPr>
-            <a:lvl2pPr marL="342900" indent="0">
-              <a:buNone/>
-              <a:defRPr sz="1500" b="1"/>
-            </a:lvl2pPr>
-            <a:lvl3pPr marL="685800" indent="0">
-              <a:buNone/>
-              <a:defRPr sz="1350" b="1"/>
             </a:lvl3pPr>
-            <a:lvl4pPr marL="1028700" indent="0">
-              <a:buNone/>
-              <a:defRPr sz="1200" b="1"/>
+            <a:lvl4pPr marL="1371600" indent="0">
+              <a:buNone/>
+              <a:defRPr sz="1600" b="1"/>
             </a:lvl4pPr>
-            <a:lvl5pPr marL="1371600" indent="0">
-              <a:buNone/>
-              <a:defRPr sz="1200" b="1"/>
+            <a:lvl5pPr marL="1828800" indent="0">
+              <a:buNone/>
+              <a:defRPr sz="1600" b="1"/>
             </a:lvl5pPr>
-            <a:lvl6pPr marL="1714500" indent="0">
-              <a:buNone/>
-              <a:defRPr sz="1200" b="1"/>
+            <a:lvl6pPr marL="2286000" indent="0">
+              <a:buNone/>
+              <a:defRPr sz="1600" b="1"/>
             </a:lvl6pPr>
-            <a:lvl7pPr marL="2057400" indent="0">
-              <a:buNone/>
-              <a:defRPr sz="1200" b="1"/>
+            <a:lvl7pPr marL="2743200" indent="0">
+              <a:buNone/>
+              <a:defRPr sz="1600" b="1"/>
             </a:lvl7pPr>
-            <a:lvl8pPr marL="2400300" indent="0">
-              <a:buNone/>
-              <a:defRPr sz="1200" b="1"/>
+            <a:lvl8pPr marL="3200400" indent="0">
+              <a:buNone/>
+              <a:defRPr sz="1600" b="1"/>
             </a:lvl8pPr>
-            <a:lvl9pPr marL="2743200" indent="0">
-              <a:buNone/>
-              <a:defRPr sz="1200" b="1"/>
+            <a:lvl9pPr marL="3657600" indent="0">
+              <a:buNone/>
+              <a:defRPr sz="1600" b="1"/>
             </a:lvl9pPr>
           </a:lstStyle>
           <a:p>
             <a:pPr lvl="0"/>
             <a:r>
-              <a:rPr lang="en-US"/>
-              <a:t>Click to edit Master text styles</a:t>
-            </a:r>
-          </a:p>
-        </p:txBody>
-      </p:sp>
-      <p:sp>
-        <p:nvSpPr>
-          <p:cNvPr id="6" name="Content Placeholder 5"/>
+              <a:rPr lang="de-DE"/>
+              <a:t>Mastertextformat bearbeiten</a:t>
+            </a:r>
+          </a:p>
+        </p:txBody>
+      </p:sp>
+      <p:sp>
+        <p:nvSpPr>
+          <p:cNvPr id="6" name="Inhaltsplatzhalter 5">
+            <a:extLst>
+              <a:ext uri="{FF2B5EF4-FFF2-40B4-BE49-F238E27FC236}">
+                <a16:creationId xmlns:a16="http://schemas.microsoft.com/office/drawing/2014/main" id="{08F041F6-BE10-71A9-0959-2B42E2046CEB}"/>
+              </a:ext>
+            </a:extLst>
+          </p:cNvPr>
           <p:cNvSpPr>
             <a:spLocks noGrp="1"/>
           </p:cNvSpPr>
@@ -2400,86 +2337,65 @@
         </p:nvSpPr>
         <p:spPr>
           <a:xfrm>
-            <a:off x="4645026" y="1631156"/>
-            <a:ext cx="4041775" cy="2963466"/>
+            <a:off x="6172200" y="2505075"/>
+            <a:ext cx="5183188" cy="3684588"/>
           </a:xfrm>
         </p:spPr>
         <p:txBody>
           <a:bodyPr/>
-          <a:lstStyle>
-            <a:lvl1pPr>
-              <a:defRPr sz="1800"/>
-            </a:lvl1pPr>
-            <a:lvl2pPr>
-              <a:defRPr sz="1500"/>
-            </a:lvl2pPr>
-            <a:lvl3pPr>
-              <a:defRPr sz="1350"/>
-            </a:lvl3pPr>
-            <a:lvl4pPr>
-              <a:defRPr sz="1200"/>
-            </a:lvl4pPr>
-            <a:lvl5pPr>
-              <a:defRPr sz="1200"/>
-            </a:lvl5pPr>
-            <a:lvl6pPr>
-              <a:defRPr sz="1200"/>
-            </a:lvl6pPr>
-            <a:lvl7pPr>
-              <a:defRPr sz="1200"/>
-            </a:lvl7pPr>
-            <a:lvl8pPr>
-              <a:defRPr sz="1200"/>
-            </a:lvl8pPr>
-            <a:lvl9pPr>
-              <a:defRPr sz="1200"/>
-            </a:lvl9pPr>
-          </a:lstStyle>
+          <a:lstStyle/>
           <a:p>
             <a:pPr lvl="0"/>
             <a:r>
-              <a:rPr lang="en-US"/>
-              <a:t>Click to edit Master text styles</a:t>
+              <a:rPr lang="de-DE"/>
+              <a:t>Mastertextformat bearbeiten</a:t>
             </a:r>
           </a:p>
           <a:p>
             <a:pPr lvl="1"/>
             <a:r>
-              <a:rPr lang="en-US"/>
-              <a:t>Second level</a:t>
+              <a:rPr lang="de-DE"/>
+              <a:t>Zweite Ebene</a:t>
             </a:r>
           </a:p>
           <a:p>
             <a:pPr lvl="2"/>
             <a:r>
-              <a:rPr lang="en-US"/>
-              <a:t>Third level</a:t>
+              <a:rPr lang="de-DE"/>
+              <a:t>Dritte Ebene</a:t>
             </a:r>
           </a:p>
           <a:p>
             <a:pPr lvl="3"/>
             <a:r>
-              <a:rPr lang="en-US"/>
-              <a:t>Fourth level</a:t>
+              <a:rPr lang="de-DE"/>
+              <a:t>Vierte Ebene</a:t>
             </a:r>
           </a:p>
           <a:p>
             <a:pPr lvl="4"/>
             <a:r>
-              <a:rPr lang="en-US"/>
-              <a:t>Fifth level</a:t>
-            </a:r>
-          </a:p>
-        </p:txBody>
-      </p:sp>
-      <p:sp>
-        <p:nvSpPr>
-          <p:cNvPr id="7" name="Date Placeholder 6"/>
-          <p:cNvSpPr>
-            <a:spLocks noGrp="1"/>
-          </p:cNvSpPr>
-          <p:nvPr>
-            <p:ph type="dt" sz="half" idx="10"/>
+              <a:rPr lang="de-DE"/>
+              <a:t>Fünfte Ebene</a:t>
+            </a:r>
+            <a:endParaRPr lang="en-US"/>
+          </a:p>
+        </p:txBody>
+      </p:sp>
+      <p:sp>
+        <p:nvSpPr>
+          <p:cNvPr id="8" name="Fußzeilenplatzhalter 7">
+            <a:extLst>
+              <a:ext uri="{FF2B5EF4-FFF2-40B4-BE49-F238E27FC236}">
+                <a16:creationId xmlns:a16="http://schemas.microsoft.com/office/drawing/2014/main" id="{0EE19061-296C-8711-B26D-69C68C7D80A9}"/>
+              </a:ext>
+            </a:extLst>
+          </p:cNvPr>
+          <p:cNvSpPr>
+            <a:spLocks noGrp="1"/>
+          </p:cNvSpPr>
+          <p:nvPr>
+            <p:ph type="ftr" sz="quarter" idx="11"/>
           </p:nvPr>
         </p:nvSpPr>
         <p:spPr/>
@@ -2487,51 +2403,42 @@
           <a:bodyPr/>
           <a:lstStyle/>
           <a:p>
-            <a:fld id="{241EB5C9-1307-BA42-ABA2-0BC069CD8E7F}" type="datetimeFigureOut">
+            <a:r>
+              <a:rPr lang="en-US" dirty="0"/>
+              <a:t>LMU Open Science Center</a:t>
+            </a:r>
+          </a:p>
+        </p:txBody>
+      </p:sp>
+      <p:sp>
+        <p:nvSpPr>
+          <p:cNvPr id="9" name="Foliennummernplatzhalter 8">
+            <a:extLst>
+              <a:ext uri="{FF2B5EF4-FFF2-40B4-BE49-F238E27FC236}">
+                <a16:creationId xmlns:a16="http://schemas.microsoft.com/office/drawing/2014/main" id="{D33DF354-3606-DC27-BE81-F12416B74667}"/>
+              </a:ext>
+            </a:extLst>
+          </p:cNvPr>
+          <p:cNvSpPr>
+            <a:spLocks noGrp="1"/>
+          </p:cNvSpPr>
+          <p:nvPr>
+            <p:ph type="sldNum" sz="quarter" idx="12"/>
+          </p:nvPr>
+        </p:nvSpPr>
+        <p:spPr>
+          <a:xfrm>
+            <a:off x="839788" y="6356349"/>
+            <a:ext cx="2743200" cy="365125"/>
+          </a:xfrm>
+        </p:spPr>
+        <p:txBody>
+          <a:bodyPr/>
+          <a:lstStyle/>
+          <a:p>
+            <a:fld id="{8B250AD1-D749-4DA0-AC4A-500BF02A1CF6}" type="slidenum">
               <a:rPr lang="en-US" smtClean="0"/>
-              <a:t>1/2/22</a:t>
-            </a:fld>
-            <a:endParaRPr lang="en-US"/>
-          </a:p>
-        </p:txBody>
-      </p:sp>
-      <p:sp>
-        <p:nvSpPr>
-          <p:cNvPr id="8" name="Footer Placeholder 7"/>
-          <p:cNvSpPr>
-            <a:spLocks noGrp="1"/>
-          </p:cNvSpPr>
-          <p:nvPr>
-            <p:ph type="ftr" sz="quarter" idx="11"/>
-          </p:nvPr>
-        </p:nvSpPr>
-        <p:spPr/>
-        <p:txBody>
-          <a:bodyPr/>
-          <a:lstStyle/>
-          <a:p>
-            <a:endParaRPr lang="en-US"/>
-          </a:p>
-        </p:txBody>
-      </p:sp>
-      <p:sp>
-        <p:nvSpPr>
-          <p:cNvPr id="9" name="Slide Number Placeholder 8"/>
-          <p:cNvSpPr>
-            <a:spLocks noGrp="1"/>
-          </p:cNvSpPr>
-          <p:nvPr>
-            <p:ph type="sldNum" sz="quarter" idx="12"/>
-          </p:nvPr>
-        </p:nvSpPr>
-        <p:spPr/>
-        <p:txBody>
-          <a:bodyPr/>
-          <a:lstStyle/>
-          <a:p>
-            <a:fld id="{C5EF2332-01BF-834F-8236-50238282D533}" type="slidenum">
-              <a:rPr lang="en-US" smtClean="0"/>
-              <a:t>‹#›</a:t>
+              <a:t>‹Nr.›</a:t>
             </a:fld>
             <a:endParaRPr lang="en-US"/>
           </a:p>
@@ -2540,7 +2447,7 @@
     </p:spTree>
     <p:extLst>
       <p:ext uri="{BB962C8B-B14F-4D97-AF65-F5344CB8AC3E}">
-        <p14:creationId xmlns:p14="http://schemas.microsoft.com/office/powerpoint/2010/main" val="2535793967"/>
+        <p14:creationId xmlns:p14="http://schemas.microsoft.com/office/powerpoint/2010/main" val="3198332146"/>
       </p:ext>
     </p:extLst>
   </p:cSld>
@@ -2551,123 +2458,6 @@
 </file>
 
 <file path=ppt/slideLayouts/slideLayout6.xml><?xml version="1.0" encoding="utf-8"?>
-<p:sldLayout xmlns:a="http://schemas.openxmlformats.org/drawingml/2006/main" xmlns:r="http://schemas.openxmlformats.org/officeDocument/2006/relationships" xmlns:p="http://schemas.openxmlformats.org/presentationml/2006/main" type="titleOnly" preserve="1">
-  <p:cSld name="Title Only">
-    <p:spTree>
-      <p:nvGrpSpPr>
-        <p:cNvPr id="1" name=""/>
-        <p:cNvGrpSpPr/>
-        <p:nvPr/>
-      </p:nvGrpSpPr>
-      <p:grpSpPr>
-        <a:xfrm>
-          <a:off x="0" y="0"/>
-          <a:ext cx="0" cy="0"/>
-          <a:chOff x="0" y="0"/>
-          <a:chExt cx="0" cy="0"/>
-        </a:xfrm>
-      </p:grpSpPr>
-      <p:sp>
-        <p:nvSpPr>
-          <p:cNvPr id="2" name="Title 1"/>
-          <p:cNvSpPr>
-            <a:spLocks noGrp="1"/>
-          </p:cNvSpPr>
-          <p:nvPr>
-            <p:ph type="title"/>
-          </p:nvPr>
-        </p:nvSpPr>
-        <p:spPr/>
-        <p:txBody>
-          <a:bodyPr/>
-          <a:lstStyle/>
-          <a:p>
-            <a:r>
-              <a:rPr lang="en-US"/>
-              <a:t>Click to edit Master title style</a:t>
-            </a:r>
-          </a:p>
-        </p:txBody>
-      </p:sp>
-      <p:sp>
-        <p:nvSpPr>
-          <p:cNvPr id="3" name="Date Placeholder 2"/>
-          <p:cNvSpPr>
-            <a:spLocks noGrp="1"/>
-          </p:cNvSpPr>
-          <p:nvPr>
-            <p:ph type="dt" sz="half" idx="10"/>
-          </p:nvPr>
-        </p:nvSpPr>
-        <p:spPr/>
-        <p:txBody>
-          <a:bodyPr/>
-          <a:lstStyle/>
-          <a:p>
-            <a:fld id="{241EB5C9-1307-BA42-ABA2-0BC069CD8E7F}" type="datetimeFigureOut">
-              <a:rPr lang="en-US" smtClean="0"/>
-              <a:t>1/2/22</a:t>
-            </a:fld>
-            <a:endParaRPr lang="en-US"/>
-          </a:p>
-        </p:txBody>
-      </p:sp>
-      <p:sp>
-        <p:nvSpPr>
-          <p:cNvPr id="4" name="Footer Placeholder 3"/>
-          <p:cNvSpPr>
-            <a:spLocks noGrp="1"/>
-          </p:cNvSpPr>
-          <p:nvPr>
-            <p:ph type="ftr" sz="quarter" idx="11"/>
-          </p:nvPr>
-        </p:nvSpPr>
-        <p:spPr/>
-        <p:txBody>
-          <a:bodyPr/>
-          <a:lstStyle/>
-          <a:p>
-            <a:endParaRPr lang="en-US"/>
-          </a:p>
-        </p:txBody>
-      </p:sp>
-      <p:sp>
-        <p:nvSpPr>
-          <p:cNvPr id="5" name="Slide Number Placeholder 4"/>
-          <p:cNvSpPr>
-            <a:spLocks noGrp="1"/>
-          </p:cNvSpPr>
-          <p:nvPr>
-            <p:ph type="sldNum" sz="quarter" idx="12"/>
-          </p:nvPr>
-        </p:nvSpPr>
-        <p:spPr/>
-        <p:txBody>
-          <a:bodyPr/>
-          <a:lstStyle/>
-          <a:p>
-            <a:fld id="{C5EF2332-01BF-834F-8236-50238282D533}" type="slidenum">
-              <a:rPr lang="en-US" smtClean="0"/>
-              <a:t>‹#›</a:t>
-            </a:fld>
-            <a:endParaRPr lang="en-US"/>
-          </a:p>
-        </p:txBody>
-      </p:sp>
-    </p:spTree>
-    <p:extLst>
-      <p:ext uri="{BB962C8B-B14F-4D97-AF65-F5344CB8AC3E}">
-        <p14:creationId xmlns:p14="http://schemas.microsoft.com/office/powerpoint/2010/main" val="3472721253"/>
-      </p:ext>
-    </p:extLst>
-  </p:cSld>
-  <p:clrMapOvr>
-    <a:masterClrMapping/>
-  </p:clrMapOvr>
-</p:sldLayout>
-</file>
-
-<file path=ppt/slideLayouts/slideLayout7.xml><?xml version="1.0" encoding="utf-8"?>
 <p:sldLayout xmlns:a="http://schemas.openxmlformats.org/drawingml/2006/main" xmlns:r="http://schemas.openxmlformats.org/officeDocument/2006/relationships" xmlns:p="http://schemas.openxmlformats.org/presentationml/2006/main" type="blank" preserve="1">
   <p:cSld name="Blank">
     <p:spTree>
@@ -2686,7 +2476,13 @@
       </p:grpSpPr>
       <p:sp>
         <p:nvSpPr>
-          <p:cNvPr id="2" name="Date Placeholder 1"/>
+          <p:cNvPr id="2" name="Datumsplatzhalter 1">
+            <a:extLst>
+              <a:ext uri="{FF2B5EF4-FFF2-40B4-BE49-F238E27FC236}">
+                <a16:creationId xmlns:a16="http://schemas.microsoft.com/office/drawing/2014/main" id="{9F5EA8C9-78ED-A058-2796-7C4EA4F7EC65}"/>
+              </a:ext>
+            </a:extLst>
+          </p:cNvPr>
           <p:cNvSpPr>
             <a:spLocks noGrp="1"/>
           </p:cNvSpPr>
@@ -2694,14 +2490,22 @@
             <p:ph type="dt" sz="half" idx="10"/>
           </p:nvPr>
         </p:nvSpPr>
-        <p:spPr/>
-        <p:txBody>
-          <a:bodyPr/>
-          <a:lstStyle/>
-          <a:p>
-            <a:fld id="{241EB5C9-1307-BA42-ABA2-0BC069CD8E7F}" type="datetimeFigureOut">
+        <p:spPr>
+          <a:xfrm>
+            <a:off x="838200" y="6356350"/>
+            <a:ext cx="2743200" cy="365125"/>
+          </a:xfrm>
+          <a:prstGeom prst="rect">
+            <a:avLst/>
+          </a:prstGeom>
+        </p:spPr>
+        <p:txBody>
+          <a:bodyPr/>
+          <a:lstStyle/>
+          <a:p>
+            <a:fld id="{328E3756-62D3-4A5B-81A9-A38E252C8A34}" type="datetimeFigureOut">
               <a:rPr lang="en-US" smtClean="0"/>
-              <a:t>1/2/22</a:t>
+              <a:t>8/4/2025</a:t>
             </a:fld>
             <a:endParaRPr lang="en-US"/>
           </a:p>
@@ -2709,7 +2513,13 @@
       </p:sp>
       <p:sp>
         <p:nvSpPr>
-          <p:cNvPr id="3" name="Footer Placeholder 2"/>
+          <p:cNvPr id="3" name="Fußzeilenplatzhalter 2">
+            <a:extLst>
+              <a:ext uri="{FF2B5EF4-FFF2-40B4-BE49-F238E27FC236}">
+                <a16:creationId xmlns:a16="http://schemas.microsoft.com/office/drawing/2014/main" id="{2BAF4F9E-3FD4-3989-9A27-EEE4D9EF0798}"/>
+              </a:ext>
+            </a:extLst>
+          </p:cNvPr>
           <p:cNvSpPr>
             <a:spLocks noGrp="1"/>
           </p:cNvSpPr>
@@ -2728,7 +2538,13 @@
       </p:sp>
       <p:sp>
         <p:nvSpPr>
-          <p:cNvPr id="4" name="Slide Number Placeholder 3"/>
+          <p:cNvPr id="4" name="Foliennummernplatzhalter 3">
+            <a:extLst>
+              <a:ext uri="{FF2B5EF4-FFF2-40B4-BE49-F238E27FC236}">
+                <a16:creationId xmlns:a16="http://schemas.microsoft.com/office/drawing/2014/main" id="{F2C76D7C-DA52-2EC4-A5D3-8C05047478E4}"/>
+              </a:ext>
+            </a:extLst>
+          </p:cNvPr>
           <p:cNvSpPr>
             <a:spLocks noGrp="1"/>
           </p:cNvSpPr>
@@ -2741,9 +2557,9 @@
           <a:bodyPr/>
           <a:lstStyle/>
           <a:p>
-            <a:fld id="{C5EF2332-01BF-834F-8236-50238282D533}" type="slidenum">
+            <a:fld id="{8B250AD1-D749-4DA0-AC4A-500BF02A1CF6}" type="slidenum">
               <a:rPr lang="en-US" smtClean="0"/>
-              <a:t>‹#›</a:t>
+              <a:t>‹Nr.›</a:t>
             </a:fld>
             <a:endParaRPr lang="en-US"/>
           </a:p>
@@ -2752,7 +2568,299 @@
     </p:spTree>
     <p:extLst>
       <p:ext uri="{BB962C8B-B14F-4D97-AF65-F5344CB8AC3E}">
-        <p14:creationId xmlns:p14="http://schemas.microsoft.com/office/powerpoint/2010/main" val="2130901097"/>
+        <p14:creationId xmlns:p14="http://schemas.microsoft.com/office/powerpoint/2010/main" val="1079192629"/>
+      </p:ext>
+    </p:extLst>
+  </p:cSld>
+  <p:clrMapOvr>
+    <a:masterClrMapping/>
+  </p:clrMapOvr>
+</p:sldLayout>
+</file>
+
+<file path=ppt/slideLayouts/slideLayout7.xml><?xml version="1.0" encoding="utf-8"?>
+<p:sldLayout xmlns:a="http://schemas.openxmlformats.org/drawingml/2006/main" xmlns:r="http://schemas.openxmlformats.org/officeDocument/2006/relationships" xmlns:p="http://schemas.openxmlformats.org/presentationml/2006/main" type="objTx" preserve="1">
+  <p:cSld name="Content with Caption">
+    <p:spTree>
+      <p:nvGrpSpPr>
+        <p:cNvPr id="1" name=""/>
+        <p:cNvGrpSpPr/>
+        <p:nvPr/>
+      </p:nvGrpSpPr>
+      <p:grpSpPr>
+        <a:xfrm>
+          <a:off x="0" y="0"/>
+          <a:ext cx="0" cy="0"/>
+          <a:chOff x="0" y="0"/>
+          <a:chExt cx="0" cy="0"/>
+        </a:xfrm>
+      </p:grpSpPr>
+      <p:sp>
+        <p:nvSpPr>
+          <p:cNvPr id="2" name="Titel 1">
+            <a:extLst>
+              <a:ext uri="{FF2B5EF4-FFF2-40B4-BE49-F238E27FC236}">
+                <a16:creationId xmlns:a16="http://schemas.microsoft.com/office/drawing/2014/main" id="{1FC02DB4-53F7-381D-0681-92FDED50E85F}"/>
+              </a:ext>
+            </a:extLst>
+          </p:cNvPr>
+          <p:cNvSpPr>
+            <a:spLocks noGrp="1"/>
+          </p:cNvSpPr>
+          <p:nvPr>
+            <p:ph type="title"/>
+          </p:nvPr>
+        </p:nvSpPr>
+        <p:spPr>
+          <a:xfrm>
+            <a:off x="839788" y="457200"/>
+            <a:ext cx="3932237" cy="1600200"/>
+          </a:xfrm>
+        </p:spPr>
+        <p:txBody>
+          <a:bodyPr anchor="b"/>
+          <a:lstStyle>
+            <a:lvl1pPr>
+              <a:defRPr sz="3200"/>
+            </a:lvl1pPr>
+          </a:lstStyle>
+          <a:p>
+            <a:r>
+              <a:rPr lang="de-DE"/>
+              <a:t>Mastertitelformat bearbeiten</a:t>
+            </a:r>
+            <a:endParaRPr lang="en-US"/>
+          </a:p>
+        </p:txBody>
+      </p:sp>
+      <p:sp>
+        <p:nvSpPr>
+          <p:cNvPr id="3" name="Inhaltsplatzhalter 2">
+            <a:extLst>
+              <a:ext uri="{FF2B5EF4-FFF2-40B4-BE49-F238E27FC236}">
+                <a16:creationId xmlns:a16="http://schemas.microsoft.com/office/drawing/2014/main" id="{79EFE58B-F259-AEEF-D048-DDB40A72FF2F}"/>
+              </a:ext>
+            </a:extLst>
+          </p:cNvPr>
+          <p:cNvSpPr>
+            <a:spLocks noGrp="1"/>
+          </p:cNvSpPr>
+          <p:nvPr>
+            <p:ph idx="1"/>
+          </p:nvPr>
+        </p:nvSpPr>
+        <p:spPr>
+          <a:xfrm>
+            <a:off x="5183188" y="987425"/>
+            <a:ext cx="6172200" cy="4873625"/>
+          </a:xfrm>
+        </p:spPr>
+        <p:txBody>
+          <a:bodyPr/>
+          <a:lstStyle>
+            <a:lvl1pPr>
+              <a:defRPr sz="3200"/>
+            </a:lvl1pPr>
+            <a:lvl2pPr>
+              <a:defRPr sz="2800"/>
+            </a:lvl2pPr>
+            <a:lvl3pPr>
+              <a:defRPr sz="2400"/>
+            </a:lvl3pPr>
+            <a:lvl4pPr>
+              <a:defRPr sz="2000"/>
+            </a:lvl4pPr>
+            <a:lvl5pPr>
+              <a:defRPr sz="2000"/>
+            </a:lvl5pPr>
+            <a:lvl6pPr>
+              <a:defRPr sz="2000"/>
+            </a:lvl6pPr>
+            <a:lvl7pPr>
+              <a:defRPr sz="2000"/>
+            </a:lvl7pPr>
+            <a:lvl8pPr>
+              <a:defRPr sz="2000"/>
+            </a:lvl8pPr>
+            <a:lvl9pPr>
+              <a:defRPr sz="2000"/>
+            </a:lvl9pPr>
+          </a:lstStyle>
+          <a:p>
+            <a:pPr lvl="0"/>
+            <a:r>
+              <a:rPr lang="de-DE"/>
+              <a:t>Mastertextformat bearbeiten</a:t>
+            </a:r>
+          </a:p>
+          <a:p>
+            <a:pPr lvl="1"/>
+            <a:r>
+              <a:rPr lang="de-DE"/>
+              <a:t>Zweite Ebene</a:t>
+            </a:r>
+          </a:p>
+          <a:p>
+            <a:pPr lvl="2"/>
+            <a:r>
+              <a:rPr lang="de-DE"/>
+              <a:t>Dritte Ebene</a:t>
+            </a:r>
+          </a:p>
+          <a:p>
+            <a:pPr lvl="3"/>
+            <a:r>
+              <a:rPr lang="de-DE"/>
+              <a:t>Vierte Ebene</a:t>
+            </a:r>
+          </a:p>
+          <a:p>
+            <a:pPr lvl="4"/>
+            <a:r>
+              <a:rPr lang="de-DE"/>
+              <a:t>Fünfte Ebene</a:t>
+            </a:r>
+            <a:endParaRPr lang="en-US"/>
+          </a:p>
+        </p:txBody>
+      </p:sp>
+      <p:sp>
+        <p:nvSpPr>
+          <p:cNvPr id="4" name="Textplatzhalter 3">
+            <a:extLst>
+              <a:ext uri="{FF2B5EF4-FFF2-40B4-BE49-F238E27FC236}">
+                <a16:creationId xmlns:a16="http://schemas.microsoft.com/office/drawing/2014/main" id="{02CC977F-5CE5-02EF-48D6-C4C7EAC9D437}"/>
+              </a:ext>
+            </a:extLst>
+          </p:cNvPr>
+          <p:cNvSpPr>
+            <a:spLocks noGrp="1"/>
+          </p:cNvSpPr>
+          <p:nvPr>
+            <p:ph type="body" sz="half" idx="2"/>
+          </p:nvPr>
+        </p:nvSpPr>
+        <p:spPr>
+          <a:xfrm>
+            <a:off x="839788" y="2057400"/>
+            <a:ext cx="3932237" cy="3811588"/>
+          </a:xfrm>
+        </p:spPr>
+        <p:txBody>
+          <a:bodyPr/>
+          <a:lstStyle>
+            <a:lvl1pPr marL="0" indent="0">
+              <a:buNone/>
+              <a:defRPr sz="1600"/>
+            </a:lvl1pPr>
+            <a:lvl2pPr marL="457200" indent="0">
+              <a:buNone/>
+              <a:defRPr sz="1400"/>
+            </a:lvl2pPr>
+            <a:lvl3pPr marL="914400" indent="0">
+              <a:buNone/>
+              <a:defRPr sz="1200"/>
+            </a:lvl3pPr>
+            <a:lvl4pPr marL="1371600" indent="0">
+              <a:buNone/>
+              <a:defRPr sz="1000"/>
+            </a:lvl4pPr>
+            <a:lvl5pPr marL="1828800" indent="0">
+              <a:buNone/>
+              <a:defRPr sz="1000"/>
+            </a:lvl5pPr>
+            <a:lvl6pPr marL="2286000" indent="0">
+              <a:buNone/>
+              <a:defRPr sz="1000"/>
+            </a:lvl6pPr>
+            <a:lvl7pPr marL="2743200" indent="0">
+              <a:buNone/>
+              <a:defRPr sz="1000"/>
+            </a:lvl7pPr>
+            <a:lvl8pPr marL="3200400" indent="0">
+              <a:buNone/>
+              <a:defRPr sz="1000"/>
+            </a:lvl8pPr>
+            <a:lvl9pPr marL="3657600" indent="0">
+              <a:buNone/>
+              <a:defRPr sz="1000"/>
+            </a:lvl9pPr>
+          </a:lstStyle>
+          <a:p>
+            <a:pPr lvl="0"/>
+            <a:r>
+              <a:rPr lang="de-DE"/>
+              <a:t>Mastertextformat bearbeiten</a:t>
+            </a:r>
+          </a:p>
+        </p:txBody>
+      </p:sp>
+      <p:sp>
+        <p:nvSpPr>
+          <p:cNvPr id="6" name="Fußzeilenplatzhalter 5">
+            <a:extLst>
+              <a:ext uri="{FF2B5EF4-FFF2-40B4-BE49-F238E27FC236}">
+                <a16:creationId xmlns:a16="http://schemas.microsoft.com/office/drawing/2014/main" id="{4A6B5DDB-FBB2-1F7F-F15A-9134CC72E3BF}"/>
+              </a:ext>
+            </a:extLst>
+          </p:cNvPr>
+          <p:cNvSpPr>
+            <a:spLocks noGrp="1"/>
+          </p:cNvSpPr>
+          <p:nvPr>
+            <p:ph type="ftr" sz="quarter" idx="11"/>
+          </p:nvPr>
+        </p:nvSpPr>
+        <p:spPr/>
+        <p:txBody>
+          <a:bodyPr/>
+          <a:lstStyle/>
+          <a:p>
+            <a:r>
+              <a:rPr lang="en-US" dirty="0"/>
+              <a:t>LMU Open Science Center</a:t>
+            </a:r>
+          </a:p>
+        </p:txBody>
+      </p:sp>
+      <p:sp>
+        <p:nvSpPr>
+          <p:cNvPr id="7" name="Foliennummernplatzhalter 6">
+            <a:extLst>
+              <a:ext uri="{FF2B5EF4-FFF2-40B4-BE49-F238E27FC236}">
+                <a16:creationId xmlns:a16="http://schemas.microsoft.com/office/drawing/2014/main" id="{3C5FD523-904C-0711-1CA0-9F39E4DB2A30}"/>
+              </a:ext>
+            </a:extLst>
+          </p:cNvPr>
+          <p:cNvSpPr>
+            <a:spLocks noGrp="1"/>
+          </p:cNvSpPr>
+          <p:nvPr>
+            <p:ph type="sldNum" sz="quarter" idx="12"/>
+          </p:nvPr>
+        </p:nvSpPr>
+        <p:spPr>
+          <a:xfrm>
+            <a:off x="839788" y="6356349"/>
+            <a:ext cx="2743200" cy="365125"/>
+          </a:xfrm>
+        </p:spPr>
+        <p:txBody>
+          <a:bodyPr/>
+          <a:lstStyle/>
+          <a:p>
+            <a:fld id="{8B250AD1-D749-4DA0-AC4A-500BF02A1CF6}" type="slidenum">
+              <a:rPr lang="en-US" smtClean="0"/>
+              <a:t>‹Nr.›</a:t>
+            </a:fld>
+            <a:endParaRPr lang="en-US"/>
+          </a:p>
+        </p:txBody>
+      </p:sp>
+    </p:spTree>
+    <p:extLst>
+      <p:ext uri="{BB962C8B-B14F-4D97-AF65-F5344CB8AC3E}">
+        <p14:creationId xmlns:p14="http://schemas.microsoft.com/office/powerpoint/2010/main" val="2562945723"/>
       </p:ext>
     </p:extLst>
   </p:cSld>
@@ -3313,7 +3421,13 @@
       </p:grpSpPr>
       <p:sp>
         <p:nvSpPr>
-          <p:cNvPr id="2" name="Title Placeholder 1"/>
+          <p:cNvPr id="2" name="Titelplatzhalter 1">
+            <a:extLst>
+              <a:ext uri="{FF2B5EF4-FFF2-40B4-BE49-F238E27FC236}">
+                <a16:creationId xmlns:a16="http://schemas.microsoft.com/office/drawing/2014/main" id="{17B51715-B9F2-1A39-D5BA-0FC6F0BE717F}"/>
+              </a:ext>
+            </a:extLst>
+          </p:cNvPr>
           <p:cNvSpPr>
             <a:spLocks noGrp="1"/>
           </p:cNvSpPr>
@@ -3323,101 +3437,164 @@
         </p:nvSpPr>
         <p:spPr>
           <a:xfrm>
-            <a:off x="457200" y="205979"/>
-            <a:ext cx="8229600" cy="857250"/>
+            <a:off x="838200" y="365125"/>
+            <a:ext cx="10515600" cy="1325563"/>
+          </a:xfrm>
+          <a:prstGeom prst="roundRect">
+            <a:avLst/>
+          </a:prstGeom>
+          <a:solidFill>
+            <a:srgbClr val="00883A"/>
+          </a:solidFill>
+        </p:spPr>
+        <p:txBody>
+          <a:bodyPr anchor="ctr" bIns="45720" lIns="91440" rIns="91440" rtlCol="0" tIns="45720" vert="horz">
+            <a:normAutofit/>
+          </a:bodyPr>
+          <a:lstStyle/>
+          <a:p>
+            <a:r>
+              <a:rPr dirty="0" lang="de-DE"/>
+              <a:t>Mastertitelformat bearbeiten</a:t>
+            </a:r>
+            <a:endParaRPr dirty="0" lang="en-US"/>
+          </a:p>
+        </p:txBody>
+      </p:sp>
+      <p:sp>
+        <p:nvSpPr>
+          <p:cNvPr id="3" name="Textplatzhalter 2">
+            <a:extLst>
+              <a:ext uri="{FF2B5EF4-FFF2-40B4-BE49-F238E27FC236}">
+                <a16:creationId xmlns:a16="http://schemas.microsoft.com/office/drawing/2014/main" id="{3EDFB7E4-A001-1A98-2FE0-932D9A56D3E1}"/>
+              </a:ext>
+            </a:extLst>
+          </p:cNvPr>
+          <p:cNvSpPr>
+            <a:spLocks noGrp="1"/>
+          </p:cNvSpPr>
+          <p:nvPr>
+            <p:ph idx="1" type="body"/>
+          </p:nvPr>
+        </p:nvSpPr>
+        <p:spPr>
+          <a:xfrm>
+            <a:off x="838200" y="1825625"/>
+            <a:ext cx="10515600" cy="4351338"/>
           </a:xfrm>
           <a:prstGeom prst="rect">
             <a:avLst/>
           </a:prstGeom>
         </p:spPr>
         <p:txBody>
-          <a:bodyPr anchor="ctr" bIns="45720" lIns="91440" rIns="91440" rtlCol="0" tIns="45720" vert="horz">
+          <a:bodyPr bIns="45720" lIns="91440" rIns="91440" rtlCol="0" tIns="45720" vert="horz">
             <a:normAutofit/>
           </a:bodyPr>
           <a:lstStyle/>
           <a:p>
-            <a:r>
-              <a:rPr lang="en-US"/>
-              <a:t>Click to edit Master title style</a:t>
-            </a:r>
-          </a:p>
-        </p:txBody>
-      </p:sp>
-      <p:sp>
-        <p:nvSpPr>
-          <p:cNvPr id="3" name="Text Placeholder 2"/>
-          <p:cNvSpPr>
-            <a:spLocks noGrp="1"/>
-          </p:cNvSpPr>
-          <p:nvPr>
-            <p:ph idx="1" type="body"/>
+            <a:pPr lvl="0"/>
+            <a:r>
+              <a:rPr lang="de-DE"/>
+              <a:t>Mastertextformat bearbeiten</a:t>
+            </a:r>
+          </a:p>
+          <a:p>
+            <a:pPr lvl="1"/>
+            <a:r>
+              <a:rPr lang="de-DE"/>
+              <a:t>Zweite Ebene</a:t>
+            </a:r>
+          </a:p>
+          <a:p>
+            <a:pPr lvl="2"/>
+            <a:r>
+              <a:rPr lang="de-DE"/>
+              <a:t>Dritte Ebene</a:t>
+            </a:r>
+          </a:p>
+          <a:p>
+            <a:pPr lvl="3"/>
+            <a:r>
+              <a:rPr lang="de-DE"/>
+              <a:t>Vierte Ebene</a:t>
+            </a:r>
+          </a:p>
+          <a:p>
+            <a:pPr lvl="4"/>
+            <a:r>
+              <a:rPr lang="de-DE"/>
+              <a:t>Fünfte Ebene</a:t>
+            </a:r>
+            <a:endParaRPr lang="en-US"/>
+          </a:p>
+        </p:txBody>
+      </p:sp>
+      <p:sp>
+        <p:nvSpPr>
+          <p:cNvPr id="5" name="Fußzeilenplatzhalter 4">
+            <a:extLst>
+              <a:ext uri="{FF2B5EF4-FFF2-40B4-BE49-F238E27FC236}">
+                <a16:creationId xmlns:a16="http://schemas.microsoft.com/office/drawing/2014/main" id="{22BED59B-3F54-9B1B-CA78-F96C4B0DDA08}"/>
+              </a:ext>
+            </a:extLst>
+          </p:cNvPr>
+          <p:cNvSpPr>
+            <a:spLocks noGrp="1"/>
+          </p:cNvSpPr>
+          <p:nvPr>
+            <p:ph idx="3" sz="quarter" type="ftr"/>
           </p:nvPr>
         </p:nvSpPr>
         <p:spPr>
           <a:xfrm>
-            <a:off x="457200" y="1200151"/>
-            <a:ext cx="8229600" cy="3394472"/>
+            <a:off x="4038600" y="6356350"/>
+            <a:ext cx="4114800" cy="365125"/>
           </a:xfrm>
           <a:prstGeom prst="rect">
             <a:avLst/>
           </a:prstGeom>
         </p:spPr>
         <p:txBody>
-          <a:bodyPr bIns="45720" lIns="91440" rIns="91440" rtlCol="0" tIns="45720" vert="horz">
-            <a:normAutofit/>
-          </a:bodyPr>
-          <a:lstStyle/>
-          <a:p>
-            <a:pPr lvl="0"/>
-            <a:r>
-              <a:rPr lang="en-US"/>
-              <a:t>Click to edit Master text styles</a:t>
-            </a:r>
-          </a:p>
-          <a:p>
-            <a:pPr lvl="1"/>
-            <a:r>
-              <a:rPr lang="en-US"/>
-              <a:t>Second level</a:t>
-            </a:r>
-          </a:p>
-          <a:p>
-            <a:pPr lvl="2"/>
-            <a:r>
-              <a:rPr lang="en-US"/>
-              <a:t>Third level</a:t>
-            </a:r>
-          </a:p>
-          <a:p>
-            <a:pPr lvl="3"/>
-            <a:r>
-              <a:rPr lang="en-US"/>
-              <a:t>Fourth level</a:t>
-            </a:r>
-          </a:p>
-          <a:p>
-            <a:pPr lvl="4"/>
-            <a:r>
-              <a:rPr lang="en-US"/>
-              <a:t>Fifth level</a:t>
-            </a:r>
-          </a:p>
-        </p:txBody>
-      </p:sp>
-      <p:sp>
-        <p:nvSpPr>
-          <p:cNvPr id="4" name="Date Placeholder 3"/>
-          <p:cNvSpPr>
-            <a:spLocks noGrp="1"/>
-          </p:cNvSpPr>
-          <p:nvPr>
-            <p:ph idx="2" sz="half" type="dt"/>
+          <a:bodyPr anchor="ctr" bIns="45720" lIns="91440" rIns="91440" rtlCol="0" tIns="45720" vert="horz"/>
+          <a:lstStyle>
+            <a:lvl1pPr algn="ctr">
+              <a:defRPr sz="1200">
+                <a:solidFill>
+                  <a:schemeClr val="tx1">
+                    <a:tint val="82000"/>
+                  </a:schemeClr>
+                </a:solidFill>
+              </a:defRPr>
+            </a:lvl1pPr>
+          </a:lstStyle>
+          <a:p>
+            <a:r>
+              <a:rPr dirty="0" lang="en-US"/>
+              <a:t>LMU Open Science Center</a:t>
+            </a:r>
+          </a:p>
+        </p:txBody>
+      </p:sp>
+      <p:sp>
+        <p:nvSpPr>
+          <p:cNvPr id="6" name="Foliennummernplatzhalter 5">
+            <a:extLst>
+              <a:ext uri="{FF2B5EF4-FFF2-40B4-BE49-F238E27FC236}">
+                <a16:creationId xmlns:a16="http://schemas.microsoft.com/office/drawing/2014/main" id="{7EE4BBC5-4746-0188-6FDA-3394CE8B2FA9}"/>
+              </a:ext>
+            </a:extLst>
+          </p:cNvPr>
+          <p:cNvSpPr>
+            <a:spLocks noGrp="1"/>
+          </p:cNvSpPr>
+          <p:nvPr>
+            <p:ph idx="4" sz="quarter" type="sldNum"/>
           </p:nvPr>
         </p:nvSpPr>
         <p:spPr>
           <a:xfrm>
-            <a:off x="457200" y="4767263"/>
-            <a:ext cx="2133600" cy="273844"/>
+            <a:off x="838200" y="6356350"/>
+            <a:ext cx="2743200" cy="365125"/>
           </a:xfrm>
           <a:prstGeom prst="rect">
             <a:avLst/>
@@ -3427,106 +3604,65 @@
           <a:bodyPr anchor="ctr" bIns="45720" lIns="91440" rIns="91440" rtlCol="0" tIns="45720" vert="horz"/>
           <a:lstStyle>
             <a:lvl1pPr algn="l">
-              <a:defRPr sz="900">
+              <a:defRPr sz="1200">
                 <a:solidFill>
                   <a:schemeClr val="tx1">
-                    <a:tint val="75000"/>
+                    <a:tint val="82000"/>
                   </a:schemeClr>
                 </a:solidFill>
               </a:defRPr>
             </a:lvl1pPr>
           </a:lstStyle>
           <a:p>
-            <a:fld id="{241EB5C9-1307-BA42-ABA2-0BC069CD8E7F}" type="datetimeFigureOut">
+            <a:fld id="{8B250AD1-D749-4DA0-AC4A-500BF02A1CF6}" type="slidenum">
               <a:rPr lang="en-US" smtClean="0"/>
-              <a:t>1/2/22</a:t>
+              <a:pPr/>
+              <a:t>‹Nr.›</a:t>
             </a:fld>
             <a:endParaRPr lang="en-US"/>
           </a:p>
         </p:txBody>
       </p:sp>
-      <p:sp>
-        <p:nvSpPr>
-          <p:cNvPr id="5" name="Footer Placeholder 4"/>
-          <p:cNvSpPr>
-            <a:spLocks noGrp="1"/>
-          </p:cNvSpPr>
-          <p:nvPr>
-            <p:ph idx="3" sz="quarter" type="ftr"/>
-          </p:nvPr>
-        </p:nvSpPr>
+      <p:pic>
+        <p:nvPicPr>
+          <p:cNvPr descr="Ein Bild, das Text, Schrift, Logo, Grafiken enthält.  KI-generierte Inhalte können fehlerhaft sein." id="7" name="Grafik 6">
+            <a:extLst>
+              <a:ext uri="{FF2B5EF4-FFF2-40B4-BE49-F238E27FC236}">
+                <a16:creationId xmlns:a16="http://schemas.microsoft.com/office/drawing/2014/main" id="{171BA0CE-895E-0319-6294-42727D9B83EA}"/>
+              </a:ext>
+            </a:extLst>
+          </p:cNvPr>
+          <p:cNvPicPr>
+            <a:picLocks noChangeAspect="1"/>
+          </p:cNvPicPr>
+          <p:nvPr userDrawn="1"/>
+        </p:nvPicPr>
+        <p:blipFill>
+          <a:blip r:embed="rId9">
+            <a:extLst>
+              <a:ext uri="{28A0092B-C50C-407E-A947-70E740481C1C}">
+                <a14:useLocalDpi xmlns:a14="http://schemas.microsoft.com/office/drawing/2010/main" val="0"/>
+              </a:ext>
+            </a:extLst>
+          </a:blip>
+          <a:stretch>
+            <a:fillRect/>
+          </a:stretch>
+        </p:blipFill>
         <p:spPr>
           <a:xfrm>
-            <a:off x="3124200" y="4767263"/>
-            <a:ext cx="2895600" cy="273844"/>
+            <a:off x="10999434" y="6428181"/>
+            <a:ext cx="1091954" cy="346965"/>
           </a:xfrm>
           <a:prstGeom prst="rect">
             <a:avLst/>
           </a:prstGeom>
         </p:spPr>
-        <p:txBody>
-          <a:bodyPr anchor="ctr" bIns="45720" lIns="91440" rIns="91440" rtlCol="0" tIns="45720" vert="horz"/>
-          <a:lstStyle>
-            <a:lvl1pPr algn="ctr">
-              <a:defRPr sz="900">
-                <a:solidFill>
-                  <a:schemeClr val="tx1">
-                    <a:tint val="75000"/>
-                  </a:schemeClr>
-                </a:solidFill>
-              </a:defRPr>
-            </a:lvl1pPr>
-          </a:lstStyle>
-          <a:p>
-            <a:endParaRPr lang="en-US"/>
-          </a:p>
-        </p:txBody>
-      </p:sp>
-      <p:sp>
-        <p:nvSpPr>
-          <p:cNvPr id="6" name="Slide Number Placeholder 5"/>
-          <p:cNvSpPr>
-            <a:spLocks noGrp="1"/>
-          </p:cNvSpPr>
-          <p:nvPr>
-            <p:ph idx="4" sz="quarter" type="sldNum"/>
-          </p:nvPr>
-        </p:nvSpPr>
-        <p:spPr>
-          <a:xfrm>
-            <a:off x="6553200" y="4767263"/>
-            <a:ext cx="2133600" cy="273844"/>
-          </a:xfrm>
-          <a:prstGeom prst="rect">
-            <a:avLst/>
-          </a:prstGeom>
-        </p:spPr>
-        <p:txBody>
-          <a:bodyPr anchor="ctr" bIns="45720" lIns="91440" rIns="91440" rtlCol="0" tIns="45720" vert="horz"/>
-          <a:lstStyle>
-            <a:lvl1pPr algn="r">
-              <a:defRPr sz="900">
-                <a:solidFill>
-                  <a:schemeClr val="tx1">
-                    <a:tint val="75000"/>
-                  </a:schemeClr>
-                </a:solidFill>
-              </a:defRPr>
-            </a:lvl1pPr>
-          </a:lstStyle>
-          <a:p>
-            <a:fld id="{C5EF2332-01BF-834F-8236-50238282D533}" type="slidenum">
-              <a:rPr lang="en-US" smtClean="0"/>
-              <a:t>‹#›</a:t>
-            </a:fld>
-            <a:endParaRPr lang="en-US"/>
-          </a:p>
-        </p:txBody>
-      </p:sp>
+      </p:pic>
     </p:spTree>
     <p:extLst>
       <p:ext uri="{BB962C8B-B14F-4D97-AF65-F5344CB8AC3E}">
-        <p14:creationId xmlns:p14="http://schemas.microsoft.com/office/powerpoint/2010/main" val="3676200875"/>
+        <p14:creationId xmlns:p14="http://schemas.microsoft.com/office/powerpoint/2010/main" val="611071100"/>
       </p:ext>
     </p:extLst>
   </p:cSld>
@@ -3537,23 +3673,22 @@
     <p:sldLayoutId id="2147483651" r:id="rId3"/>
     <p:sldLayoutId id="2147483652" r:id="rId4"/>
     <p:sldLayoutId id="2147483653" r:id="rId5"/>
-    <p:sldLayoutId id="2147483654" r:id="rId6"/>
-    <p:sldLayoutId id="2147483655" r:id="rId7"/>
-    <p:sldLayoutId id="2147483656" r:id="rId8"/>
-    <p:sldLayoutId id="2147483657" r:id="rId9"/>
-    <p:sldLayoutId id="2147483658" r:id="rId10"/>
-    <p:sldLayoutId id="2147483659" r:id="rId11"/>
+    <p:sldLayoutId id="2147483655" r:id="rId6"/>
+    <p:sldLayoutId id="2147483656" r:id="rId7"/>
   </p:sldLayoutIdLst>
   <p:txStyles>
     <p:titleStyle>
-      <a:lvl1pPr algn="ctr" defTabSz="342900" eaLnBrk="1" hangingPunct="1" latinLnBrk="0" rtl="0">
+      <a:lvl1pPr algn="l" defTabSz="914400" eaLnBrk="1" hangingPunct="1" latinLnBrk="0" rtl="0">
+        <a:lnSpc>
+          <a:spcPct val="90000"/>
+        </a:lnSpc>
         <a:spcBef>
           <a:spcPct val="0"/>
         </a:spcBef>
         <a:buNone/>
-        <a:defRPr kern="1200" sz="3300">
+        <a:defRPr kern="1200" sz="4400">
           <a:solidFill>
-            <a:schemeClr val="tx1"/>
+            <a:schemeClr val="bg1"/>
           </a:solidFill>
           <a:latin typeface="+mj-lt"/>
           <a:ea typeface="+mj-ea"/>
@@ -3562,11 +3697,32 @@
       </a:lvl1pPr>
     </p:titleStyle>
     <p:bodyStyle>
-      <a:lvl1pPr algn="l" defTabSz="342900" eaLnBrk="1" hangingPunct="1" indent="-342900" latinLnBrk="0" marL="342900" rtl="0">
+      <a:lvl1pPr algn="l" defTabSz="914400" eaLnBrk="1" hangingPunct="1" indent="-228600" latinLnBrk="0" marL="228600" rtl="0">
+        <a:lnSpc>
+          <a:spcPct val="90000"/>
+        </a:lnSpc>
         <a:spcBef>
-          <a:spcPct val="20000"/>
+          <a:spcPts val="1000"/>
         </a:spcBef>
-        <a:buFont typeface="Arial"/>
+        <a:buFont charset="0" panose="020B0604020202020204" pitchFamily="34" typeface="Arial"/>
+        <a:buChar char="•"/>
+        <a:defRPr kern="1200" sz="2800">
+          <a:solidFill>
+            <a:schemeClr val="tx1"/>
+          </a:solidFill>
+          <a:latin typeface="+mn-lt"/>
+          <a:ea typeface="+mn-ea"/>
+          <a:cs typeface="+mn-cs"/>
+        </a:defRPr>
+      </a:lvl1pPr>
+      <a:lvl2pPr algn="l" defTabSz="914400" eaLnBrk="1" hangingPunct="1" indent="-228600" latinLnBrk="0" marL="685800" rtl="0">
+        <a:lnSpc>
+          <a:spcPct val="90000"/>
+        </a:lnSpc>
+        <a:spcBef>
+          <a:spcPts val="500"/>
+        </a:spcBef>
+        <a:buFont charset="0" panose="020B0604020202020204" pitchFamily="34" typeface="Arial"/>
         <a:buChar char="•"/>
         <a:defRPr kern="1200" sz="2400">
           <a:solidFill>
@@ -3576,14 +3732,17 @@
           <a:ea typeface="+mn-ea"/>
           <a:cs typeface="+mn-cs"/>
         </a:defRPr>
-      </a:lvl1pPr>
-      <a:lvl2pPr algn="l" defTabSz="342900" eaLnBrk="1" hangingPunct="1" indent="-342900" latinLnBrk="0" marL="685800" rtl="0">
+      </a:lvl2pPr>
+      <a:lvl3pPr algn="l" defTabSz="914400" eaLnBrk="1" hangingPunct="1" indent="-228600" latinLnBrk="0" marL="1143000" rtl="0">
+        <a:lnSpc>
+          <a:spcPct val="90000"/>
+        </a:lnSpc>
         <a:spcBef>
-          <a:spcPct val="20000"/>
+          <a:spcPts val="500"/>
         </a:spcBef>
-        <a:buFont typeface="Arial"/>
-        <a:buChar char="–"/>
-        <a:defRPr kern="1200" sz="2100">
+        <a:buFont charset="0" panose="020B0604020202020204" pitchFamily="34" typeface="Arial"/>
+        <a:buChar char="•"/>
+        <a:defRPr kern="1200" sz="2000">
           <a:solidFill>
             <a:schemeClr val="tx1"/>
           </a:solidFill>
@@ -3591,12 +3750,15 @@
           <a:ea typeface="+mn-ea"/>
           <a:cs typeface="+mn-cs"/>
         </a:defRPr>
-      </a:lvl2pPr>
-      <a:lvl3pPr algn="l" defTabSz="342900" eaLnBrk="1" hangingPunct="1" indent="-342900" latinLnBrk="0" marL="1028700" rtl="0">
+      </a:lvl3pPr>
+      <a:lvl4pPr algn="l" defTabSz="914400" eaLnBrk="1" hangingPunct="1" indent="-228600" latinLnBrk="0" marL="1600200" rtl="0">
+        <a:lnSpc>
+          <a:spcPct val="90000"/>
+        </a:lnSpc>
         <a:spcBef>
-          <a:spcPct val="20000"/>
+          <a:spcPts val="500"/>
         </a:spcBef>
-        <a:buFont typeface="Arial"/>
+        <a:buFont charset="0" panose="020B0604020202020204" pitchFamily="34" typeface="Arial"/>
         <a:buChar char="•"/>
         <a:defRPr kern="1200" sz="1800">
           <a:solidFill>
@@ -3606,29 +3768,17 @@
           <a:ea typeface="+mn-ea"/>
           <a:cs typeface="+mn-cs"/>
         </a:defRPr>
-      </a:lvl3pPr>
-      <a:lvl4pPr algn="l" defTabSz="342900" eaLnBrk="1" hangingPunct="1" indent="-342900" latinLnBrk="0" marL="1371600" rtl="0">
+      </a:lvl4pPr>
+      <a:lvl5pPr algn="l" defTabSz="914400" eaLnBrk="1" hangingPunct="1" indent="-228600" latinLnBrk="0" marL="2057400" rtl="0">
+        <a:lnSpc>
+          <a:spcPct val="90000"/>
+        </a:lnSpc>
         <a:spcBef>
-          <a:spcPct val="20000"/>
+          <a:spcPts val="500"/>
         </a:spcBef>
-        <a:buFont typeface="Arial"/>
-        <a:buChar char="–"/>
-        <a:defRPr kern="1200" sz="1500">
-          <a:solidFill>
-            <a:schemeClr val="tx1"/>
-          </a:solidFill>
-          <a:latin typeface="+mn-lt"/>
-          <a:ea typeface="+mn-ea"/>
-          <a:cs typeface="+mn-cs"/>
-        </a:defRPr>
-      </a:lvl4pPr>
-      <a:lvl5pPr algn="l" defTabSz="342900" eaLnBrk="1" hangingPunct="1" indent="-342900" latinLnBrk="0" marL="1714500" rtl="0">
-        <a:spcBef>
-          <a:spcPct val="20000"/>
-        </a:spcBef>
-        <a:buFont typeface="Arial"/>
-        <a:buChar char="»"/>
-        <a:defRPr kern="1200" sz="1500">
+        <a:buFont charset="0" panose="020B0604020202020204" pitchFamily="34" typeface="Arial"/>
+        <a:buChar char="•"/>
+        <a:defRPr kern="1200" sz="1800">
           <a:solidFill>
             <a:schemeClr val="tx1"/>
           </a:solidFill>
@@ -3637,13 +3787,16 @@
           <a:cs typeface="+mn-cs"/>
         </a:defRPr>
       </a:lvl5pPr>
-      <a:lvl6pPr algn="l" defTabSz="342900" eaLnBrk="1" hangingPunct="1" indent="-342900" latinLnBrk="0" marL="2057400" rtl="0">
+      <a:lvl6pPr algn="l" defTabSz="914400" eaLnBrk="1" hangingPunct="1" indent="-228600" latinLnBrk="0" marL="2514600" rtl="0">
+        <a:lnSpc>
+          <a:spcPct val="90000"/>
+        </a:lnSpc>
         <a:spcBef>
-          <a:spcPct val="20000"/>
+          <a:spcPts val="500"/>
         </a:spcBef>
-        <a:buFont typeface="Arial"/>
+        <a:buFont charset="0" panose="020B0604020202020204" pitchFamily="34" typeface="Arial"/>
         <a:buChar char="•"/>
-        <a:defRPr kern="1200" sz="1500">
+        <a:defRPr kern="1200" sz="1800">
           <a:solidFill>
             <a:schemeClr val="tx1"/>
           </a:solidFill>
@@ -3652,13 +3805,16 @@
           <a:cs typeface="+mn-cs"/>
         </a:defRPr>
       </a:lvl6pPr>
-      <a:lvl7pPr algn="l" defTabSz="342900" eaLnBrk="1" hangingPunct="1" indent="-342900" latinLnBrk="0" marL="2400300" rtl="0">
+      <a:lvl7pPr algn="l" defTabSz="914400" eaLnBrk="1" hangingPunct="1" indent="-228600" latinLnBrk="0" marL="2971800" rtl="0">
+        <a:lnSpc>
+          <a:spcPct val="90000"/>
+        </a:lnSpc>
         <a:spcBef>
-          <a:spcPct val="20000"/>
+          <a:spcPts val="500"/>
         </a:spcBef>
-        <a:buFont typeface="Arial"/>
+        <a:buFont charset="0" panose="020B0604020202020204" pitchFamily="34" typeface="Arial"/>
         <a:buChar char="•"/>
-        <a:defRPr kern="1200" sz="1500">
+        <a:defRPr kern="1200" sz="1800">
           <a:solidFill>
             <a:schemeClr val="tx1"/>
           </a:solidFill>
@@ -3667,13 +3823,16 @@
           <a:cs typeface="+mn-cs"/>
         </a:defRPr>
       </a:lvl7pPr>
-      <a:lvl8pPr algn="l" defTabSz="342900" eaLnBrk="1" hangingPunct="1" indent="-342900" latinLnBrk="0" marL="2743200" rtl="0">
+      <a:lvl8pPr algn="l" defTabSz="914400" eaLnBrk="1" hangingPunct="1" indent="-228600" latinLnBrk="0" marL="3429000" rtl="0">
+        <a:lnSpc>
+          <a:spcPct val="90000"/>
+        </a:lnSpc>
         <a:spcBef>
-          <a:spcPct val="20000"/>
+          <a:spcPts val="500"/>
         </a:spcBef>
-        <a:buFont typeface="Arial"/>
+        <a:buFont charset="0" panose="020B0604020202020204" pitchFamily="34" typeface="Arial"/>
         <a:buChar char="•"/>
-        <a:defRPr kern="1200" sz="1500">
+        <a:defRPr kern="1200" sz="1800">
           <a:solidFill>
             <a:schemeClr val="tx1"/>
           </a:solidFill>
@@ -3682,13 +3841,16 @@
           <a:cs typeface="+mn-cs"/>
         </a:defRPr>
       </a:lvl8pPr>
-      <a:lvl9pPr algn="l" defTabSz="342900" eaLnBrk="1" hangingPunct="1" indent="-342900" latinLnBrk="0" marL="3086100" rtl="0">
+      <a:lvl9pPr algn="l" defTabSz="914400" eaLnBrk="1" hangingPunct="1" indent="-228600" latinLnBrk="0" marL="3886200" rtl="0">
+        <a:lnSpc>
+          <a:spcPct val="90000"/>
+        </a:lnSpc>
         <a:spcBef>
-          <a:spcPct val="20000"/>
+          <a:spcPts val="500"/>
         </a:spcBef>
-        <a:buFont typeface="Arial"/>
+        <a:buFont charset="0" panose="020B0604020202020204" pitchFamily="34" typeface="Arial"/>
         <a:buChar char="•"/>
-        <a:defRPr kern="1200" sz="1500">
+        <a:defRPr kern="1200" sz="1800">
           <a:solidFill>
             <a:schemeClr val="tx1"/>
           </a:solidFill>
@@ -3702,8 +3864,8 @@
       <a:defPPr>
         <a:defRPr lang="en-US"/>
       </a:defPPr>
-      <a:lvl1pPr algn="l" defTabSz="342900" eaLnBrk="1" hangingPunct="1" latinLnBrk="0" marL="0" rtl="0">
-        <a:defRPr kern="1200" sz="1350">
+      <a:lvl1pPr algn="l" defTabSz="914400" eaLnBrk="1" hangingPunct="1" latinLnBrk="0" marL="0" rtl="0">
+        <a:defRPr kern="1200" sz="1800">
           <a:solidFill>
             <a:schemeClr val="tx1"/>
           </a:solidFill>
@@ -3712,8 +3874,8 @@
           <a:cs typeface="+mn-cs"/>
         </a:defRPr>
       </a:lvl1pPr>
-      <a:lvl2pPr algn="l" defTabSz="342900" eaLnBrk="1" hangingPunct="1" latinLnBrk="0" marL="342900" rtl="0">
-        <a:defRPr kern="1200" sz="1350">
+      <a:lvl2pPr algn="l" defTabSz="914400" eaLnBrk="1" hangingPunct="1" latinLnBrk="0" marL="457200" rtl="0">
+        <a:defRPr kern="1200" sz="1800">
           <a:solidFill>
             <a:schemeClr val="tx1"/>
           </a:solidFill>
@@ -3722,8 +3884,8 @@
           <a:cs typeface="+mn-cs"/>
         </a:defRPr>
       </a:lvl2pPr>
-      <a:lvl3pPr algn="l" defTabSz="342900" eaLnBrk="1" hangingPunct="1" latinLnBrk="0" marL="685800" rtl="0">
-        <a:defRPr kern="1200" sz="1350">
+      <a:lvl3pPr algn="l" defTabSz="914400" eaLnBrk="1" hangingPunct="1" latinLnBrk="0" marL="914400" rtl="0">
+        <a:defRPr kern="1200" sz="1800">
           <a:solidFill>
             <a:schemeClr val="tx1"/>
           </a:solidFill>
@@ -3732,8 +3894,8 @@
           <a:cs typeface="+mn-cs"/>
         </a:defRPr>
       </a:lvl3pPr>
-      <a:lvl4pPr algn="l" defTabSz="342900" eaLnBrk="1" hangingPunct="1" latinLnBrk="0" marL="1028700" rtl="0">
-        <a:defRPr kern="1200" sz="1350">
+      <a:lvl4pPr algn="l" defTabSz="914400" eaLnBrk="1" hangingPunct="1" latinLnBrk="0" marL="1371600" rtl="0">
+        <a:defRPr kern="1200" sz="1800">
           <a:solidFill>
             <a:schemeClr val="tx1"/>
           </a:solidFill>
@@ -3742,8 +3904,8 @@
           <a:cs typeface="+mn-cs"/>
         </a:defRPr>
       </a:lvl4pPr>
-      <a:lvl5pPr algn="l" defTabSz="342900" eaLnBrk="1" hangingPunct="1" latinLnBrk="0" marL="1371600" rtl="0">
-        <a:defRPr kern="1200" sz="1350">
+      <a:lvl5pPr algn="l" defTabSz="914400" eaLnBrk="1" hangingPunct="1" latinLnBrk="0" marL="1828800" rtl="0">
+        <a:defRPr kern="1200" sz="1800">
           <a:solidFill>
             <a:schemeClr val="tx1"/>
           </a:solidFill>
@@ -3752,8 +3914,8 @@
           <a:cs typeface="+mn-cs"/>
         </a:defRPr>
       </a:lvl5pPr>
-      <a:lvl6pPr algn="l" defTabSz="342900" eaLnBrk="1" hangingPunct="1" latinLnBrk="0" marL="1714500" rtl="0">
-        <a:defRPr kern="1200" sz="1350">
+      <a:lvl6pPr algn="l" defTabSz="914400" eaLnBrk="1" hangingPunct="1" latinLnBrk="0" marL="2286000" rtl="0">
+        <a:defRPr kern="1200" sz="1800">
           <a:solidFill>
             <a:schemeClr val="tx1"/>
           </a:solidFill>
@@ -3762,8 +3924,8 @@
           <a:cs typeface="+mn-cs"/>
         </a:defRPr>
       </a:lvl6pPr>
-      <a:lvl7pPr algn="l" defTabSz="342900" eaLnBrk="1" hangingPunct="1" latinLnBrk="0" marL="2057400" rtl="0">
-        <a:defRPr kern="1200" sz="1350">
+      <a:lvl7pPr algn="l" defTabSz="914400" eaLnBrk="1" hangingPunct="1" latinLnBrk="0" marL="2743200" rtl="0">
+        <a:defRPr kern="1200" sz="1800">
           <a:solidFill>
             <a:schemeClr val="tx1"/>
           </a:solidFill>
@@ -3772,8 +3934,8 @@
           <a:cs typeface="+mn-cs"/>
         </a:defRPr>
       </a:lvl7pPr>
-      <a:lvl8pPr algn="l" defTabSz="342900" eaLnBrk="1" hangingPunct="1" latinLnBrk="0" marL="2400300" rtl="0">
-        <a:defRPr kern="1200" sz="1350">
+      <a:lvl8pPr algn="l" defTabSz="914400" eaLnBrk="1" hangingPunct="1" latinLnBrk="0" marL="3200400" rtl="0">
+        <a:defRPr kern="1200" sz="1800">
           <a:solidFill>
             <a:schemeClr val="tx1"/>
           </a:solidFill>
@@ -3782,8 +3944,8 @@
           <a:cs typeface="+mn-cs"/>
         </a:defRPr>
       </a:lvl8pPr>
-      <a:lvl9pPr algn="l" defTabSz="342900" eaLnBrk="1" hangingPunct="1" latinLnBrk="0" marL="2743200" rtl="0">
-        <a:defRPr kern="1200" sz="1350">
+      <a:lvl9pPr algn="l" defTabSz="914400" eaLnBrk="1" hangingPunct="1" latinLnBrk="0" marL="3657600" rtl="0">
+        <a:defRPr kern="1200" sz="1800">
           <a:solidFill>
             <a:schemeClr val="tx1"/>
           </a:solidFill>
@@ -3816,7 +3978,13 @@
       </p:grpSpPr>
       <p:sp>
         <p:nvSpPr>
-          <p:cNvPr id="2" name="Title 1"/>
+          <p:cNvPr id="2" name="Titel 1">
+            <a:extLst>
+              <a:ext uri="{FF2B5EF4-FFF2-40B4-BE49-F238E27FC236}">
+                <a16:creationId xmlns:a16="http://schemas.microsoft.com/office/drawing/2014/main" id="{5BA8CCF6-F57A-42B5-ECBC-B5D1C9B01F71}"/>
+              </a:ext>
+            </a:extLst>
+          </p:cNvPr>
           <p:cNvSpPr>
             <a:spLocks noGrp="1"/>
           </p:cNvSpPr>
@@ -3826,8 +3994,50 @@
         </p:nvSpPr>
         <p:spPr>
           <a:xfrm>
-            <a:off x="685800" y="1597819"/>
-            <a:ext cx="7772400" cy="1102519"/>
+            <a:off x="1524000" y="1122363"/>
+            <a:ext cx="9144000" cy="2387600"/>
+          </a:xfrm>
+          <a:prstGeom prst="roundRect">
+            <a:avLst/>
+          </a:prstGeom>
+          <a:solidFill>
+            <a:srgbClr val="00883A"/>
+          </a:solidFill>
+        </p:spPr>
+        <p:txBody>
+          <a:bodyPr/>
+          <a:lstStyle/>
+          <a:p>
+            <a:pPr lvl="0" indent="0" marL="0">
+              <a:buNone/>
+            </a:pPr>
+            <a:r>
+              <a:rPr/>
+              <a:t>Template Slides: Title of Submodule</a:t>
+            </a:r>
+          </a:p>
+        </p:txBody>
+      </p:sp>
+      <p:sp>
+        <p:nvSpPr>
+          <p:cNvPr id="3" name="Untertitel 2">
+            <a:extLst>
+              <a:ext uri="{FF2B5EF4-FFF2-40B4-BE49-F238E27FC236}">
+                <a16:creationId xmlns:a16="http://schemas.microsoft.com/office/drawing/2014/main" id="{1CB92922-5421-ED0A-332E-7B0368BD017E}"/>
+              </a:ext>
+            </a:extLst>
+          </p:cNvPr>
+          <p:cNvSpPr>
+            <a:spLocks noGrp="1"/>
+          </p:cNvSpPr>
+          <p:nvPr>
+            <p:ph idx="1" type="subTitle"/>
+          </p:nvPr>
+        </p:nvSpPr>
+        <p:spPr>
+          <a:xfrm>
+            <a:off x="1524000" y="3602038"/>
+            <a:ext cx="9144000" cy="1655762"/>
           </a:xfrm>
         </p:spPr>
         <p:txBody>
@@ -3837,36 +4047,6 @@
             <a:pPr lvl="0" indent="0" marL="0">
               <a:buNone/>
             </a:pPr>
-            <a:r>
-              <a:rPr/>
-              <a:t>Template Slides: Title of Submodule</a:t>
-            </a:r>
-          </a:p>
-        </p:txBody>
-      </p:sp>
-      <p:sp>
-        <p:nvSpPr>
-          <p:cNvPr id="3" name="Subtitle 2"/>
-          <p:cNvSpPr>
-            <a:spLocks noGrp="1"/>
-          </p:cNvSpPr>
-          <p:nvPr>
-            <p:ph idx="1" type="subTitle"/>
-          </p:nvPr>
-        </p:nvSpPr>
-        <p:spPr>
-          <a:xfrm>
-            <a:off x="1371600" y="2914650"/>
-            <a:ext cx="6400800" cy="1314450"/>
-          </a:xfrm>
-        </p:spPr>
-        <p:txBody>
-          <a:bodyPr/>
-          <a:lstStyle/>
-          <a:p>
-            <a:pPr lvl="0" indent="0" marL="0">
-              <a:buNone/>
-            </a:pPr>
             <a:br/>
             <a:br/>
             <a:r>
@@ -3876,31 +4056,7 @@
           </a:p>
         </p:txBody>
       </p:sp>
-      <p:sp>
-        <p:nvSpPr>
-          <p:cNvPr id="4" name="Date Placeholder 3"/>
-          <p:cNvSpPr>
-            <a:spLocks noGrp="1"/>
-          </p:cNvSpPr>
-          <p:nvPr>
-            <p:ph idx="10" sz="half" type="dt"/>
-          </p:nvPr>
-        </p:nvSpPr>
-        <p:spPr/>
-        <p:txBody>
-          <a:bodyPr/>
-          <a:lstStyle/>
-          <a:p>
-            <a:pPr lvl="0" indent="0" marL="0">
-              <a:buNone/>
-            </a:pPr>
-            <a:r>
-              <a:rPr/>
-              <a:t>26/06/2025</a:t>
-            </a:r>
-          </a:p>
-        </p:txBody>
-      </p:sp>
+      <p:sp/>
     </p:spTree>
   </p:cSld>
 </p:sld>
@@ -3925,7 +4081,13 @@
       </p:grpSpPr>
       <p:sp>
         <p:nvSpPr>
-          <p:cNvPr id="3" name="Content Placeholder 2"/>
+          <p:cNvPr id="3" name="Inhaltsplatzhalter 2">
+            <a:extLst>
+              <a:ext uri="{FF2B5EF4-FFF2-40B4-BE49-F238E27FC236}">
+                <a16:creationId xmlns:a16="http://schemas.microsoft.com/office/drawing/2014/main" id="{C0D7E480-32AD-8371-070E-ADF49C060185}"/>
+              </a:ext>
+            </a:extLst>
+          </p:cNvPr>
           <p:cNvSpPr>
             <a:spLocks noGrp="1"/>
           </p:cNvSpPr>
@@ -4019,7 +4181,13 @@
       </p:grpSpPr>
       <p:sp>
         <p:nvSpPr>
-          <p:cNvPr id="3" name="Content Placeholder 2"/>
+          <p:cNvPr id="3" name="Inhaltsplatzhalter 2">
+            <a:extLst>
+              <a:ext uri="{FF2B5EF4-FFF2-40B4-BE49-F238E27FC236}">
+                <a16:creationId xmlns:a16="http://schemas.microsoft.com/office/drawing/2014/main" id="{C0D7E480-32AD-8371-070E-ADF49C060185}"/>
+              </a:ext>
+            </a:extLst>
+          </p:cNvPr>
           <p:cNvSpPr>
             <a:spLocks noGrp="1"/>
           </p:cNvSpPr>
@@ -4094,7 +4262,13 @@
       </p:grpSpPr>
       <p:sp>
         <p:nvSpPr>
-          <p:cNvPr id="3" name="Content Placeholder 2"/>
+          <p:cNvPr id="3" name="Inhaltsplatzhalter 2">
+            <a:extLst>
+              <a:ext uri="{FF2B5EF4-FFF2-40B4-BE49-F238E27FC236}">
+                <a16:creationId xmlns:a16="http://schemas.microsoft.com/office/drawing/2014/main" id="{C0D7E480-32AD-8371-070E-ADF49C060185}"/>
+              </a:ext>
+            </a:extLst>
+          </p:cNvPr>
           <p:cNvSpPr>
             <a:spLocks noGrp="1"/>
           </p:cNvSpPr>
@@ -4198,7 +4372,13 @@
       </p:grpSpPr>
       <p:sp>
         <p:nvSpPr>
-          <p:cNvPr id="3" name="Content Placeholder 2"/>
+          <p:cNvPr id="3" name="Inhaltsplatzhalter 2">
+            <a:extLst>
+              <a:ext uri="{FF2B5EF4-FFF2-40B4-BE49-F238E27FC236}">
+                <a16:creationId xmlns:a16="http://schemas.microsoft.com/office/drawing/2014/main" id="{C0D7E480-32AD-8371-070E-ADF49C060185}"/>
+              </a:ext>
+            </a:extLst>
+          </p:cNvPr>
           <p:cNvSpPr>
             <a:spLocks noGrp="1"/>
           </p:cNvSpPr>
@@ -4259,7 +4439,7 @@
             </a:r>
           </a:p>
           <a:p>
-            <a:pPr lvl="0" indent="-342900" marL="342900">
+            <a:pPr lvl="0" indent="-457200" marL="457200">
               <a:buAutoNum type="alphaLcPeriod"/>
             </a:pPr>
             <a:r>
@@ -4268,7 +4448,7 @@
             </a:r>
           </a:p>
           <a:p>
-            <a:pPr lvl="0" indent="-342900" marL="342900">
+            <a:pPr lvl="0" indent="-457200" marL="457200">
               <a:buAutoNum type="alphaLcPeriod"/>
             </a:pPr>
             <a:r>
@@ -4277,7 +4457,7 @@
             </a:r>
           </a:p>
           <a:p>
-            <a:pPr lvl="0" indent="-342900" marL="342900">
+            <a:pPr lvl="0" indent="-457200" marL="457200">
               <a:buAutoNum type="alphaLcPeriod"/>
             </a:pPr>
             <a:r>
@@ -4286,7 +4466,7 @@
             </a:r>
           </a:p>
           <a:p>
-            <a:pPr lvl="0" indent="-342900" marL="342900">
+            <a:pPr lvl="0" indent="-457200" marL="457200">
               <a:buAutoNum type="alphaLcPeriod"/>
             </a:pPr>
             <a:r>
@@ -4320,7 +4500,13 @@
       </p:grpSpPr>
       <p:sp>
         <p:nvSpPr>
-          <p:cNvPr id="3" name="Content Placeholder 2"/>
+          <p:cNvPr id="3" name="Inhaltsplatzhalter 2">
+            <a:extLst>
+              <a:ext uri="{FF2B5EF4-FFF2-40B4-BE49-F238E27FC236}">
+                <a16:creationId xmlns:a16="http://schemas.microsoft.com/office/drawing/2014/main" id="{C0D7E480-32AD-8371-070E-ADF49C060185}"/>
+              </a:ext>
+            </a:extLst>
+          </p:cNvPr>
           <p:cNvSpPr>
             <a:spLocks noGrp="1"/>
           </p:cNvSpPr>
@@ -4342,7 +4528,7 @@
             </a:r>
           </a:p>
           <a:p>
-            <a:pPr lvl="0" indent="-342900" marL="342900">
+            <a:pPr lvl="0" indent="-457200" marL="457200">
               <a:buAutoNum type="alphaLcPeriod"/>
             </a:pPr>
             <a:r>
@@ -4351,7 +4537,7 @@
             </a:r>
           </a:p>
           <a:p>
-            <a:pPr lvl="0" indent="-342900" marL="342900">
+            <a:pPr lvl="0" indent="-457200" marL="457200">
               <a:buAutoNum type="alphaLcPeriod"/>
             </a:pPr>
             <a:r>
@@ -4360,7 +4546,7 @@
             </a:r>
           </a:p>
           <a:p>
-            <a:pPr lvl="0" indent="-342900" marL="342900">
+            <a:pPr lvl="0" indent="-457200" marL="457200">
               <a:buAutoNum type="alphaLcPeriod"/>
             </a:pPr>
             <a:r>
@@ -4369,7 +4555,7 @@
             </a:r>
           </a:p>
           <a:p>
-            <a:pPr lvl="0" indent="-342900" marL="342900">
+            <a:pPr lvl="0" indent="-457200" marL="457200">
               <a:buAutoNum type="alphaLcPeriod"/>
             </a:pPr>
             <a:r>
@@ -4403,7 +4589,13 @@
       </p:grpSpPr>
       <p:sp>
         <p:nvSpPr>
-          <p:cNvPr id="2" name="Title 1"/>
+          <p:cNvPr id="2" name="Titel 1">
+            <a:extLst>
+              <a:ext uri="{FF2B5EF4-FFF2-40B4-BE49-F238E27FC236}">
+                <a16:creationId xmlns:a16="http://schemas.microsoft.com/office/drawing/2014/main" id="{34D58E66-C3AC-4E3C-F75B-4EED53F80251}"/>
+              </a:ext>
+            </a:extLst>
+          </p:cNvPr>
           <p:cNvSpPr>
             <a:spLocks noGrp="1"/>
           </p:cNvSpPr>
@@ -4450,7 +4642,13 @@
       </p:grpSpPr>
       <p:sp>
         <p:nvSpPr>
-          <p:cNvPr id="3" name="Content Placeholder 2"/>
+          <p:cNvPr id="3" name="Inhaltsplatzhalter 2">
+            <a:extLst>
+              <a:ext uri="{FF2B5EF4-FFF2-40B4-BE49-F238E27FC236}">
+                <a16:creationId xmlns:a16="http://schemas.microsoft.com/office/drawing/2014/main" id="{C0D7E480-32AD-8371-070E-ADF49C060185}"/>
+              </a:ext>
+            </a:extLst>
+          </p:cNvPr>
           <p:cNvSpPr>
             <a:spLocks noGrp="1"/>
           </p:cNvSpPr>
@@ -4518,7 +4716,13 @@
       </p:grpSpPr>
       <p:sp>
         <p:nvSpPr>
-          <p:cNvPr id="3" name="Content Placeholder 2"/>
+          <p:cNvPr id="3" name="Inhaltsplatzhalter 2">
+            <a:extLst>
+              <a:ext uri="{FF2B5EF4-FFF2-40B4-BE49-F238E27FC236}">
+                <a16:creationId xmlns:a16="http://schemas.microsoft.com/office/drawing/2014/main" id="{C0D7E480-32AD-8371-070E-ADF49C060185}"/>
+              </a:ext>
+            </a:extLst>
+          </p:cNvPr>
           <p:cNvSpPr>
             <a:spLocks noGrp="1"/>
           </p:cNvSpPr>
@@ -4586,7 +4790,13 @@
       </p:grpSpPr>
       <p:sp>
         <p:nvSpPr>
-          <p:cNvPr id="3" name="Content Placeholder 2"/>
+          <p:cNvPr id="3" name="Inhaltsplatzhalter 2">
+            <a:extLst>
+              <a:ext uri="{FF2B5EF4-FFF2-40B4-BE49-F238E27FC236}">
+                <a16:creationId xmlns:a16="http://schemas.microsoft.com/office/drawing/2014/main" id="{C0D7E480-32AD-8371-070E-ADF49C060185}"/>
+              </a:ext>
+            </a:extLst>
+          </p:cNvPr>
           <p:cNvSpPr>
             <a:spLocks noGrp="1"/>
           </p:cNvSpPr>
@@ -4661,7 +4871,13 @@
       </p:grpSpPr>
       <p:sp>
         <p:nvSpPr>
-          <p:cNvPr id="3" name="Content Placeholder 2"/>
+          <p:cNvPr id="3" name="Inhaltsplatzhalter 2">
+            <a:extLst>
+              <a:ext uri="{FF2B5EF4-FFF2-40B4-BE49-F238E27FC236}">
+                <a16:creationId xmlns:a16="http://schemas.microsoft.com/office/drawing/2014/main" id="{C0D7E480-32AD-8371-070E-ADF49C060185}"/>
+              </a:ext>
+            </a:extLst>
+          </p:cNvPr>
           <p:cNvSpPr>
             <a:spLocks noGrp="1"/>
           </p:cNvSpPr>
@@ -4742,7 +4958,13 @@
       </p:grpSpPr>
       <p:sp>
         <p:nvSpPr>
-          <p:cNvPr id="3" name="Content Placeholder 2"/>
+          <p:cNvPr id="3" name="Inhaltsplatzhalter 2">
+            <a:extLst>
+              <a:ext uri="{FF2B5EF4-FFF2-40B4-BE49-F238E27FC236}">
+                <a16:creationId xmlns:a16="http://schemas.microsoft.com/office/drawing/2014/main" id="{C0D7E480-32AD-8371-070E-ADF49C060185}"/>
+              </a:ext>
+            </a:extLst>
+          </p:cNvPr>
           <p:cNvSpPr>
             <a:spLocks noGrp="1"/>
           </p:cNvSpPr>
@@ -4824,7 +5046,13 @@
       </p:grpSpPr>
       <p:sp>
         <p:nvSpPr>
-          <p:cNvPr id="3" name="Content Placeholder 2"/>
+          <p:cNvPr id="3" name="Inhaltsplatzhalter 2">
+            <a:extLst>
+              <a:ext uri="{FF2B5EF4-FFF2-40B4-BE49-F238E27FC236}">
+                <a16:creationId xmlns:a16="http://schemas.microsoft.com/office/drawing/2014/main" id="{C0D7E480-32AD-8371-070E-ADF49C060185}"/>
+              </a:ext>
+            </a:extLst>
+          </p:cNvPr>
           <p:cNvSpPr>
             <a:spLocks noGrp="1"/>
           </p:cNvSpPr>
@@ -4906,7 +5134,13 @@
       </p:grpSpPr>
       <p:sp>
         <p:nvSpPr>
-          <p:cNvPr id="3" name="Content Placeholder 2"/>
+          <p:cNvPr id="3" name="Inhaltsplatzhalter 2">
+            <a:extLst>
+              <a:ext uri="{FF2B5EF4-FFF2-40B4-BE49-F238E27FC236}">
+                <a16:creationId xmlns:a16="http://schemas.microsoft.com/office/drawing/2014/main" id="{C0D7E480-32AD-8371-070E-ADF49C060185}"/>
+              </a:ext>
+            </a:extLst>
+          </p:cNvPr>
           <p:cNvSpPr>
             <a:spLocks noGrp="1"/>
           </p:cNvSpPr>
@@ -4974,7 +5208,13 @@
       </p:grpSpPr>
       <p:sp>
         <p:nvSpPr>
-          <p:cNvPr id="3" name="Content Placeholder 2"/>
+          <p:cNvPr id="3" name="Inhaltsplatzhalter 2">
+            <a:extLst>
+              <a:ext uri="{FF2B5EF4-FFF2-40B4-BE49-F238E27FC236}">
+                <a16:creationId xmlns:a16="http://schemas.microsoft.com/office/drawing/2014/main" id="{C0D7E480-32AD-8371-070E-ADF49C060185}"/>
+              </a:ext>
+            </a:extLst>
+          </p:cNvPr>
           <p:cNvSpPr>
             <a:spLocks noGrp="1"/>
           </p:cNvSpPr>
@@ -4996,7 +5236,7 @@
             </a:r>
           </a:p>
           <a:p>
-            <a:pPr lvl="0" indent="-342900" marL="342900">
+            <a:pPr lvl="0" indent="-457200" marL="457200">
               <a:buAutoNum type="alphaLcPeriod"/>
             </a:pPr>
             <a:r>
@@ -5005,7 +5245,7 @@
             </a:r>
           </a:p>
           <a:p>
-            <a:pPr lvl="0" indent="-342900" marL="342900">
+            <a:pPr lvl="0" indent="-457200" marL="457200">
               <a:buAutoNum type="alphaLcPeriod"/>
             </a:pPr>
             <a:r>
@@ -5014,7 +5254,7 @@
             </a:r>
           </a:p>
           <a:p>
-            <a:pPr lvl="0" indent="-342900" marL="342900">
+            <a:pPr lvl="0" indent="-457200" marL="457200">
               <a:buAutoNum type="alphaLcPeriod"/>
             </a:pPr>
             <a:r>
@@ -5023,7 +5263,7 @@
             </a:r>
           </a:p>
           <a:p>
-            <a:pPr lvl="0" indent="-342900" marL="342900">
+            <a:pPr lvl="0" indent="-457200" marL="457200">
               <a:buAutoNum type="alphaLcPeriod"/>
             </a:pPr>
             <a:r>
@@ -5057,7 +5297,13 @@
       </p:grpSpPr>
       <p:sp>
         <p:nvSpPr>
-          <p:cNvPr id="3" name="Content Placeholder 2"/>
+          <p:cNvPr id="3" name="Inhaltsplatzhalter 2">
+            <a:extLst>
+              <a:ext uri="{FF2B5EF4-FFF2-40B4-BE49-F238E27FC236}">
+                <a16:creationId xmlns:a16="http://schemas.microsoft.com/office/drawing/2014/main" id="{C0D7E480-32AD-8371-070E-ADF49C060185}"/>
+              </a:ext>
+            </a:extLst>
+          </p:cNvPr>
           <p:cNvSpPr>
             <a:spLocks noGrp="1"/>
           </p:cNvSpPr>
@@ -5079,7 +5325,7 @@
             </a:r>
           </a:p>
           <a:p>
-            <a:pPr lvl="0" indent="-342900" marL="342900">
+            <a:pPr lvl="0" indent="-457200" marL="457200">
               <a:buAutoNum type="alphaLcPeriod"/>
             </a:pPr>
             <a:r>
@@ -5088,7 +5334,7 @@
             </a:r>
           </a:p>
           <a:p>
-            <a:pPr lvl="0" indent="-342900" marL="342900">
+            <a:pPr lvl="0" indent="-457200" marL="457200">
               <a:buAutoNum type="alphaLcPeriod"/>
             </a:pPr>
             <a:r>
@@ -5097,7 +5343,7 @@
             </a:r>
           </a:p>
           <a:p>
-            <a:pPr lvl="0" indent="-342900" marL="342900">
+            <a:pPr lvl="0" indent="-457200" marL="457200">
               <a:buAutoNum type="alphaLcPeriod"/>
             </a:pPr>
             <a:r>
@@ -5106,7 +5352,7 @@
             </a:r>
           </a:p>
           <a:p>
-            <a:pPr lvl="0" indent="-342900" marL="342900">
+            <a:pPr lvl="0" indent="-457200" marL="457200">
               <a:buAutoNum type="alphaLcPeriod"/>
             </a:pPr>
             <a:r>
@@ -5115,7 +5361,7 @@
             </a:r>
           </a:p>
           <a:p>
-            <a:pPr lvl="0" indent="-342900" marL="342900">
+            <a:pPr lvl="0" indent="-457200" marL="457200">
               <a:buAutoNum type="alphaLcPeriod"/>
             </a:pPr>
             <a:r>
@@ -5149,7 +5395,13 @@
       </p:grpSpPr>
       <p:sp>
         <p:nvSpPr>
-          <p:cNvPr id="3" name="Content Placeholder 2"/>
+          <p:cNvPr id="3" name="Inhaltsplatzhalter 2">
+            <a:extLst>
+              <a:ext uri="{FF2B5EF4-FFF2-40B4-BE49-F238E27FC236}">
+                <a16:creationId xmlns:a16="http://schemas.microsoft.com/office/drawing/2014/main" id="{C0D7E480-32AD-8371-070E-ADF49C060185}"/>
+              </a:ext>
+            </a:extLst>
+          </p:cNvPr>
           <p:cNvSpPr>
             <a:spLocks noGrp="1"/>
           </p:cNvSpPr>
@@ -5171,7 +5423,7 @@
             </a:r>
           </a:p>
           <a:p>
-            <a:pPr lvl="0" indent="-342900" marL="342900">
+            <a:pPr lvl="0" indent="-457200" marL="457200">
               <a:buAutoNum type="alphaLcPeriod"/>
             </a:pPr>
             <a:r>
@@ -5180,7 +5432,7 @@
             </a:r>
           </a:p>
           <a:p>
-            <a:pPr lvl="0" indent="-342900" marL="342900">
+            <a:pPr lvl="0" indent="-457200" marL="457200">
               <a:buAutoNum type="alphaLcPeriod"/>
             </a:pPr>
             <a:r>
@@ -5189,7 +5441,7 @@
             </a:r>
           </a:p>
           <a:p>
-            <a:pPr lvl="0" indent="-342900" marL="342900">
+            <a:pPr lvl="0" indent="-457200" marL="457200">
               <a:buAutoNum type="alphaLcPeriod"/>
             </a:pPr>
             <a:r>
@@ -5198,7 +5450,7 @@
             </a:r>
           </a:p>
           <a:p>
-            <a:pPr lvl="0" indent="-342900" marL="342900">
+            <a:pPr lvl="0" indent="-457200" marL="457200">
               <a:buAutoNum type="alphaLcPeriod"/>
             </a:pPr>
             <a:r>
@@ -5207,7 +5459,7 @@
             </a:r>
           </a:p>
           <a:p>
-            <a:pPr lvl="0" indent="-342900" marL="342900">
+            <a:pPr lvl="0" indent="-457200" marL="457200">
               <a:buAutoNum type="alphaLcPeriod"/>
             </a:pPr>
             <a:r>
@@ -5241,7 +5493,13 @@
       </p:grpSpPr>
       <p:sp>
         <p:nvSpPr>
-          <p:cNvPr id="3" name="Content Placeholder 2"/>
+          <p:cNvPr id="3" name="Inhaltsplatzhalter 2">
+            <a:extLst>
+              <a:ext uri="{FF2B5EF4-FFF2-40B4-BE49-F238E27FC236}">
+                <a16:creationId xmlns:a16="http://schemas.microsoft.com/office/drawing/2014/main" id="{C0D7E480-32AD-8371-070E-ADF49C060185}"/>
+              </a:ext>
+            </a:extLst>
+          </p:cNvPr>
           <p:cNvSpPr>
             <a:spLocks noGrp="1"/>
           </p:cNvSpPr>
@@ -5309,7 +5567,13 @@
       </p:grpSpPr>
       <p:sp>
         <p:nvSpPr>
-          <p:cNvPr id="3" name="Content Placeholder 2"/>
+          <p:cNvPr id="3" name="Inhaltsplatzhalter 2">
+            <a:extLst>
+              <a:ext uri="{FF2B5EF4-FFF2-40B4-BE49-F238E27FC236}">
+                <a16:creationId xmlns:a16="http://schemas.microsoft.com/office/drawing/2014/main" id="{C0D7E480-32AD-8371-070E-ADF49C060185}"/>
+              </a:ext>
+            </a:extLst>
+          </p:cNvPr>
           <p:cNvSpPr>
             <a:spLocks noGrp="1"/>
           </p:cNvSpPr>
@@ -5366,7 +5630,13 @@
       </p:grpSpPr>
       <p:sp>
         <p:nvSpPr>
-          <p:cNvPr id="2" name="Title 1"/>
+          <p:cNvPr id="2" name="Titel 1">
+            <a:extLst>
+              <a:ext uri="{FF2B5EF4-FFF2-40B4-BE49-F238E27FC236}">
+                <a16:creationId xmlns:a16="http://schemas.microsoft.com/office/drawing/2014/main" id="{34D58E66-C3AC-4E3C-F75B-4EED53F80251}"/>
+              </a:ext>
+            </a:extLst>
+          </p:cNvPr>
           <p:cNvSpPr>
             <a:spLocks noGrp="1"/>
           </p:cNvSpPr>
@@ -5391,7 +5661,13 @@
       </p:sp>
       <p:sp>
         <p:nvSpPr>
-          <p:cNvPr id="3" name="Content Placeholder 2"/>
+          <p:cNvPr id="3" name="Inhaltsplatzhalter 2">
+            <a:extLst>
+              <a:ext uri="{FF2B5EF4-FFF2-40B4-BE49-F238E27FC236}">
+                <a16:creationId xmlns:a16="http://schemas.microsoft.com/office/drawing/2014/main" id="{C0D7E480-32AD-8371-070E-ADF49C060185}"/>
+              </a:ext>
+            </a:extLst>
+          </p:cNvPr>
           <p:cNvSpPr>
             <a:spLocks noGrp="1"/>
           </p:cNvSpPr>
@@ -5438,7 +5714,13 @@
       </p:grpSpPr>
       <p:sp>
         <p:nvSpPr>
-          <p:cNvPr id="3" name="Content Placeholder 2"/>
+          <p:cNvPr id="3" name="Inhaltsplatzhalter 2">
+            <a:extLst>
+              <a:ext uri="{FF2B5EF4-FFF2-40B4-BE49-F238E27FC236}">
+                <a16:creationId xmlns:a16="http://schemas.microsoft.com/office/drawing/2014/main" id="{C0D7E480-32AD-8371-070E-ADF49C060185}"/>
+              </a:ext>
+            </a:extLst>
+          </p:cNvPr>
           <p:cNvSpPr>
             <a:spLocks noGrp="1"/>
           </p:cNvSpPr>
@@ -5516,7 +5798,13 @@
       </p:grpSpPr>
       <p:sp>
         <p:nvSpPr>
-          <p:cNvPr id="3" name="Content Placeholder 2"/>
+          <p:cNvPr id="3" name="Inhaltsplatzhalter 2">
+            <a:extLst>
+              <a:ext uri="{FF2B5EF4-FFF2-40B4-BE49-F238E27FC236}">
+                <a16:creationId xmlns:a16="http://schemas.microsoft.com/office/drawing/2014/main" id="{C0D7E480-32AD-8371-070E-ADF49C060185}"/>
+              </a:ext>
+            </a:extLst>
+          </p:cNvPr>
           <p:cNvSpPr>
             <a:spLocks noGrp="1"/>
           </p:cNvSpPr>
@@ -5588,7 +5876,13 @@
       </p:grpSpPr>
       <p:sp>
         <p:nvSpPr>
-          <p:cNvPr id="3" name="Content Placeholder 2"/>
+          <p:cNvPr id="3" name="Inhaltsplatzhalter 2">
+            <a:extLst>
+              <a:ext uri="{FF2B5EF4-FFF2-40B4-BE49-F238E27FC236}">
+                <a16:creationId xmlns:a16="http://schemas.microsoft.com/office/drawing/2014/main" id="{C0D7E480-32AD-8371-070E-ADF49C060185}"/>
+              </a:ext>
+            </a:extLst>
+          </p:cNvPr>
           <p:cNvSpPr>
             <a:spLocks noGrp="1"/>
           </p:cNvSpPr>
@@ -5656,7 +5950,13 @@
       </p:grpSpPr>
       <p:sp>
         <p:nvSpPr>
-          <p:cNvPr id="2" name="Title 1"/>
+          <p:cNvPr id="2" name="Titel 1">
+            <a:extLst>
+              <a:ext uri="{FF2B5EF4-FFF2-40B4-BE49-F238E27FC236}">
+                <a16:creationId xmlns:a16="http://schemas.microsoft.com/office/drawing/2014/main" id="{34D58E66-C3AC-4E3C-F75B-4EED53F80251}"/>
+              </a:ext>
+            </a:extLst>
+          </p:cNvPr>
           <p:cNvSpPr>
             <a:spLocks noGrp="1"/>
           </p:cNvSpPr>
@@ -5681,7 +5981,13 @@
       </p:sp>
       <p:sp>
         <p:nvSpPr>
-          <p:cNvPr id="3" name="Content Placeholder 2"/>
+          <p:cNvPr id="3" name="Inhaltsplatzhalter 2">
+            <a:extLst>
+              <a:ext uri="{FF2B5EF4-FFF2-40B4-BE49-F238E27FC236}">
+                <a16:creationId xmlns:a16="http://schemas.microsoft.com/office/drawing/2014/main" id="{C0D7E480-32AD-8371-070E-ADF49C060185}"/>
+              </a:ext>
+            </a:extLst>
+          </p:cNvPr>
           <p:cNvSpPr>
             <a:spLocks noGrp="1"/>
           </p:cNvSpPr>
@@ -5730,7 +6036,13 @@
       </p:grpSpPr>
       <p:sp>
         <p:nvSpPr>
-          <p:cNvPr id="3" name="Content Placeholder 2"/>
+          <p:cNvPr id="3" name="Inhaltsplatzhalter 2">
+            <a:extLst>
+              <a:ext uri="{FF2B5EF4-FFF2-40B4-BE49-F238E27FC236}">
+                <a16:creationId xmlns:a16="http://schemas.microsoft.com/office/drawing/2014/main" id="{C0D7E480-32AD-8371-070E-ADF49C060185}"/>
+              </a:ext>
+            </a:extLst>
+          </p:cNvPr>
           <p:cNvSpPr>
             <a:spLocks noGrp="1"/>
           </p:cNvSpPr>
@@ -5816,7 +6128,13 @@
       </p:grpSpPr>
       <p:sp>
         <p:nvSpPr>
-          <p:cNvPr id="3" name="Content Placeholder 2"/>
+          <p:cNvPr id="3" name="Inhaltsplatzhalter 2">
+            <a:extLst>
+              <a:ext uri="{FF2B5EF4-FFF2-40B4-BE49-F238E27FC236}">
+                <a16:creationId xmlns:a16="http://schemas.microsoft.com/office/drawing/2014/main" id="{C0D7E480-32AD-8371-070E-ADF49C060185}"/>
+              </a:ext>
+            </a:extLst>
+          </p:cNvPr>
           <p:cNvSpPr>
             <a:spLocks noGrp="1"/>
           </p:cNvSpPr>
@@ -5992,7 +6310,13 @@
       </p:grpSpPr>
       <p:sp>
         <p:nvSpPr>
-          <p:cNvPr id="3" name="Content Placeholder 2"/>
+          <p:cNvPr id="3" name="Inhaltsplatzhalter 2">
+            <a:extLst>
+              <a:ext uri="{FF2B5EF4-FFF2-40B4-BE49-F238E27FC236}">
+                <a16:creationId xmlns:a16="http://schemas.microsoft.com/office/drawing/2014/main" id="{C0D7E480-32AD-8371-070E-ADF49C060185}"/>
+              </a:ext>
+            </a:extLst>
+          </p:cNvPr>
           <p:cNvSpPr>
             <a:spLocks noGrp="1"/>
           </p:cNvSpPr>
@@ -6063,7 +6387,13 @@
       </p:grpSpPr>
       <p:sp>
         <p:nvSpPr>
-          <p:cNvPr id="3" name="Content Placeholder 2"/>
+          <p:cNvPr id="3" name="Inhaltsplatzhalter 2">
+            <a:extLst>
+              <a:ext uri="{FF2B5EF4-FFF2-40B4-BE49-F238E27FC236}">
+                <a16:creationId xmlns:a16="http://schemas.microsoft.com/office/drawing/2014/main" id="{C0D7E480-32AD-8371-070E-ADF49C060185}"/>
+              </a:ext>
+            </a:extLst>
+          </p:cNvPr>
           <p:cNvSpPr>
             <a:spLocks noGrp="1"/>
           </p:cNvSpPr>
@@ -6139,7 +6469,13 @@
       </p:grpSpPr>
       <p:sp>
         <p:nvSpPr>
-          <p:cNvPr id="3" name="Content Placeholder 2"/>
+          <p:cNvPr id="3" name="Inhaltsplatzhalter 2">
+            <a:extLst>
+              <a:ext uri="{FF2B5EF4-FFF2-40B4-BE49-F238E27FC236}">
+                <a16:creationId xmlns:a16="http://schemas.microsoft.com/office/drawing/2014/main" id="{C0D7E480-32AD-8371-070E-ADF49C060185}"/>
+              </a:ext>
+            </a:extLst>
+          </p:cNvPr>
           <p:cNvSpPr>
             <a:spLocks noGrp="1"/>
           </p:cNvSpPr>
@@ -6189,7 +6525,13 @@
       </p:grpSpPr>
       <p:sp>
         <p:nvSpPr>
-          <p:cNvPr id="3" name="Content Placeholder 2"/>
+          <p:cNvPr id="3" name="Inhaltsplatzhalter 2">
+            <a:extLst>
+              <a:ext uri="{FF2B5EF4-FFF2-40B4-BE49-F238E27FC236}">
+                <a16:creationId xmlns:a16="http://schemas.microsoft.com/office/drawing/2014/main" id="{C0D7E480-32AD-8371-070E-ADF49C060185}"/>
+              </a:ext>
+            </a:extLst>
+          </p:cNvPr>
           <p:cNvSpPr>
             <a:spLocks noGrp="1"/>
           </p:cNvSpPr>
@@ -6265,7 +6607,13 @@
       </p:grpSpPr>
       <p:sp>
         <p:nvSpPr>
-          <p:cNvPr id="3" name="Content Placeholder 2"/>
+          <p:cNvPr id="3" name="Inhaltsplatzhalter 2">
+            <a:extLst>
+              <a:ext uri="{FF2B5EF4-FFF2-40B4-BE49-F238E27FC236}">
+                <a16:creationId xmlns:a16="http://schemas.microsoft.com/office/drawing/2014/main" id="{C0D7E480-32AD-8371-070E-ADF49C060185}"/>
+              </a:ext>
+            </a:extLst>
+          </p:cNvPr>
           <p:cNvSpPr>
             <a:spLocks noGrp="1"/>
           </p:cNvSpPr>
@@ -6366,7 +6714,13 @@
       </p:grpSpPr>
       <p:sp>
         <p:nvSpPr>
-          <p:cNvPr id="3" name="Content Placeholder 2"/>
+          <p:cNvPr id="3" name="Inhaltsplatzhalter 2">
+            <a:extLst>
+              <a:ext uri="{FF2B5EF4-FFF2-40B4-BE49-F238E27FC236}">
+                <a16:creationId xmlns:a16="http://schemas.microsoft.com/office/drawing/2014/main" id="{C0D7E480-32AD-8371-070E-ADF49C060185}"/>
+              </a:ext>
+            </a:extLst>
+          </p:cNvPr>
           <p:cNvSpPr>
             <a:spLocks noGrp="1"/>
           </p:cNvSpPr>
@@ -6480,7 +6834,13 @@
       </p:grpSpPr>
       <p:sp>
         <p:nvSpPr>
-          <p:cNvPr id="4" name="Text Placeholder 3"/>
+          <p:cNvPr id="4" name="Textplatzhalter 3">
+            <a:extLst>
+              <a:ext uri="{FF2B5EF4-FFF2-40B4-BE49-F238E27FC236}">
+                <a16:creationId xmlns:a16="http://schemas.microsoft.com/office/drawing/2014/main" id="{02CC977F-5CE5-02EF-48D6-C4C7EAC9D437}"/>
+              </a:ext>
+            </a:extLst>
+          </p:cNvPr>
           <p:cNvSpPr>
             <a:spLocks noGrp="1"/>
           </p:cNvSpPr>
@@ -6517,8 +6877,8 @@
           </p:nvPr>
         </p:nvGraphicFramePr>
         <p:xfrm>
-          <a:off x="3568700" y="203200"/>
-          <a:ext cx="5105400" cy="4381500"/>
+          <a:off x="5181600" y="977900"/>
+          <a:ext cx="6172200" cy="4864100"/>
         </p:xfrm>
         <a:graphic>
           <a:graphicData uri="http://schemas.openxmlformats.org/drawingml/2006/table">
@@ -6527,9 +6887,9 @@
                 <a:tableStyleId>{5C22544A-7EE6-4342-B048-85BDC9FD1C3A}</a:tableStyleId>
               </a:tblPr>
               <a:tblGrid>
-                <a:gridCol w="1701800"/>
-                <a:gridCol w="1701800"/>
-                <a:gridCol w="1701800"/>
+                <a:gridCol w="2057400"/>
+                <a:gridCol w="2057400"/>
+                <a:gridCol w="2057400"/>
               </a:tblGrid>
               <a:tr h="0">
                 <a:tc>
@@ -6797,7 +7157,13 @@
       </p:grpSpPr>
       <p:sp>
         <p:nvSpPr>
-          <p:cNvPr id="3" name="Content Placeholder 2"/>
+          <p:cNvPr id="3" name="Inhaltsplatzhalter 2">
+            <a:extLst>
+              <a:ext uri="{FF2B5EF4-FFF2-40B4-BE49-F238E27FC236}">
+                <a16:creationId xmlns:a16="http://schemas.microsoft.com/office/drawing/2014/main" id="{C0D7E480-32AD-8371-070E-ADF49C060185}"/>
+              </a:ext>
+            </a:extLst>
+          </p:cNvPr>
           <p:cNvSpPr>
             <a:spLocks noGrp="1"/>
           </p:cNvSpPr>
@@ -6819,7 +7185,7 @@
             </a:r>
           </a:p>
           <a:p>
-            <a:pPr lvl="0" indent="-342900" marL="342900">
+            <a:pPr lvl="0" indent="-457200" marL="457200">
               <a:buAutoNum type="alphaLcPeriod"/>
             </a:pPr>
             <a:r>
@@ -6828,7 +7194,7 @@
             </a:r>
           </a:p>
           <a:p>
-            <a:pPr lvl="0" indent="-342900" marL="342900">
+            <a:pPr lvl="0" indent="-457200" marL="457200">
               <a:buAutoNum type="alphaLcPeriod"/>
             </a:pPr>
             <a:r>
@@ -6837,7 +7203,7 @@
             </a:r>
           </a:p>
           <a:p>
-            <a:pPr lvl="0" indent="-342900" marL="342900">
+            <a:pPr lvl="0" indent="-457200" marL="457200">
               <a:buAutoNum type="alphaLcPeriod"/>
             </a:pPr>
             <a:r>
@@ -6846,7 +7212,7 @@
             </a:r>
           </a:p>
           <a:p>
-            <a:pPr lvl="0" indent="-342900" marL="342900">
+            <a:pPr lvl="0" indent="-457200" marL="457200">
               <a:buAutoNum type="alphaLcPeriod"/>
             </a:pPr>
             <a:r>
@@ -6880,7 +7246,13 @@
       </p:grpSpPr>
       <p:sp>
         <p:nvSpPr>
-          <p:cNvPr id="4" name="Text Placeholder 3"/>
+          <p:cNvPr id="4" name="Textplatzhalter 3">
+            <a:extLst>
+              <a:ext uri="{FF2B5EF4-FFF2-40B4-BE49-F238E27FC236}">
+                <a16:creationId xmlns:a16="http://schemas.microsoft.com/office/drawing/2014/main" id="{02CC977F-5CE5-02EF-48D6-C4C7EAC9D437}"/>
+              </a:ext>
+            </a:extLst>
+          </p:cNvPr>
           <p:cNvSpPr>
             <a:spLocks noGrp="1"/>
           </p:cNvSpPr>
@@ -6917,8 +7289,8 @@
           </p:nvPr>
         </p:nvGraphicFramePr>
         <p:xfrm>
-          <a:off x="3568700" y="203200"/>
-          <a:ext cx="5105400" cy="4381500"/>
+          <a:off x="5181600" y="977900"/>
+          <a:ext cx="6172200" cy="4864100"/>
         </p:xfrm>
         <a:graphic>
           <a:graphicData uri="http://schemas.openxmlformats.org/drawingml/2006/table">
@@ -6927,9 +7299,9 @@
                 <a:tableStyleId>{5C22544A-7EE6-4342-B048-85BDC9FD1C3A}</a:tableStyleId>
               </a:tblPr>
               <a:tblGrid>
-                <a:gridCol w="1701800"/>
-                <a:gridCol w="1701800"/>
-                <a:gridCol w="1701800"/>
+                <a:gridCol w="2057400"/>
+                <a:gridCol w="2057400"/>
+                <a:gridCol w="2057400"/>
               </a:tblGrid>
               <a:tr h="0">
                 <a:tc>
@@ -7197,7 +7569,13 @@
       </p:grpSpPr>
       <p:sp>
         <p:nvSpPr>
-          <p:cNvPr id="3" name="Content Placeholder 2"/>
+          <p:cNvPr id="3" name="Inhaltsplatzhalter 2">
+            <a:extLst>
+              <a:ext uri="{FF2B5EF4-FFF2-40B4-BE49-F238E27FC236}">
+                <a16:creationId xmlns:a16="http://schemas.microsoft.com/office/drawing/2014/main" id="{C0D7E480-32AD-8371-070E-ADF49C060185}"/>
+              </a:ext>
+            </a:extLst>
+          </p:cNvPr>
           <p:cNvSpPr>
             <a:spLocks noGrp="1"/>
           </p:cNvSpPr>
@@ -7261,7 +7639,13 @@
       </p:grpSpPr>
       <p:sp>
         <p:nvSpPr>
-          <p:cNvPr id="3" name="Content Placeholder 2"/>
+          <p:cNvPr id="3" name="Inhaltsplatzhalter 2">
+            <a:extLst>
+              <a:ext uri="{FF2B5EF4-FFF2-40B4-BE49-F238E27FC236}">
+                <a16:creationId xmlns:a16="http://schemas.microsoft.com/office/drawing/2014/main" id="{C0D7E480-32AD-8371-070E-ADF49C060185}"/>
+              </a:ext>
+            </a:extLst>
+          </p:cNvPr>
           <p:cNvSpPr>
             <a:spLocks noGrp="1"/>
           </p:cNvSpPr>
@@ -7320,7 +7704,13 @@
       </p:grpSpPr>
       <p:sp>
         <p:nvSpPr>
-          <p:cNvPr id="4" name="Text Placeholder 3"/>
+          <p:cNvPr id="4" name="Textplatzhalter 3">
+            <a:extLst>
+              <a:ext uri="{FF2B5EF4-FFF2-40B4-BE49-F238E27FC236}">
+                <a16:creationId xmlns:a16="http://schemas.microsoft.com/office/drawing/2014/main" id="{02CC977F-5CE5-02EF-48D6-C4C7EAC9D437}"/>
+              </a:ext>
+            </a:extLst>
+          </p:cNvPr>
           <p:cNvSpPr>
             <a:spLocks noGrp="1"/>
           </p:cNvSpPr>
@@ -7548,8 +7938,8 @@
         </p:blipFill>
         <p:spPr bwMode="auto">
           <a:xfrm>
-            <a:off x="3568700" y="1117600"/>
-            <a:ext cx="5105400" cy="2552700"/>
+            <a:off x="5181600" y="1866900"/>
+            <a:ext cx="6172200" cy="3086100"/>
           </a:xfrm>
           <a:prstGeom prst="rect">
             <a:avLst/>
@@ -7586,7 +7976,13 @@
       </p:grpSpPr>
       <p:sp>
         <p:nvSpPr>
-          <p:cNvPr id="3" name="Content Placeholder 2"/>
+          <p:cNvPr id="3" name="Inhaltsplatzhalter 2">
+            <a:extLst>
+              <a:ext uri="{FF2B5EF4-FFF2-40B4-BE49-F238E27FC236}">
+                <a16:creationId xmlns:a16="http://schemas.microsoft.com/office/drawing/2014/main" id="{C0D7E480-32AD-8371-070E-ADF49C060185}"/>
+              </a:ext>
+            </a:extLst>
+          </p:cNvPr>
           <p:cNvSpPr>
             <a:spLocks noGrp="1"/>
           </p:cNvSpPr>
@@ -7744,7 +8140,13 @@
       </p:grpSpPr>
       <p:sp>
         <p:nvSpPr>
-          <p:cNvPr id="3" name="Content Placeholder 2"/>
+          <p:cNvPr id="3" name="Inhaltsplatzhalter 2">
+            <a:extLst>
+              <a:ext uri="{FF2B5EF4-FFF2-40B4-BE49-F238E27FC236}">
+                <a16:creationId xmlns:a16="http://schemas.microsoft.com/office/drawing/2014/main" id="{C0D7E480-32AD-8371-070E-ADF49C060185}"/>
+              </a:ext>
+            </a:extLst>
+          </p:cNvPr>
           <p:cNvSpPr>
             <a:spLocks noGrp="1"/>
           </p:cNvSpPr>
@@ -7823,7 +8225,13 @@
       </p:grpSpPr>
       <p:sp>
         <p:nvSpPr>
-          <p:cNvPr id="3" name="Content Placeholder 2"/>
+          <p:cNvPr id="3" name="Inhaltsplatzhalter 2">
+            <a:extLst>
+              <a:ext uri="{FF2B5EF4-FFF2-40B4-BE49-F238E27FC236}">
+                <a16:creationId xmlns:a16="http://schemas.microsoft.com/office/drawing/2014/main" id="{C0D7E480-32AD-8371-070E-ADF49C060185}"/>
+              </a:ext>
+            </a:extLst>
+          </p:cNvPr>
           <p:cNvSpPr>
             <a:spLocks noGrp="1"/>
           </p:cNvSpPr>
@@ -7845,7 +8253,7 @@
             </a:r>
           </a:p>
           <a:p>
-            <a:pPr lvl="0" indent="-342900" marL="342900">
+            <a:pPr lvl="0" indent="-457200" marL="457200">
               <a:buAutoNum type="alphaLcPeriod"/>
             </a:pPr>
             <a:r>
@@ -7854,7 +8262,7 @@
             </a:r>
           </a:p>
           <a:p>
-            <a:pPr lvl="0" indent="-342900" marL="342900">
+            <a:pPr lvl="0" indent="-457200" marL="457200">
               <a:buAutoNum type="alphaLcPeriod"/>
             </a:pPr>
             <a:r>
@@ -7863,7 +8271,7 @@
             </a:r>
           </a:p>
           <a:p>
-            <a:pPr lvl="0" indent="-342900" marL="342900">
+            <a:pPr lvl="0" indent="-457200" marL="457200">
               <a:buAutoNum type="alphaLcPeriod"/>
             </a:pPr>
             <a:r>
@@ -7872,7 +8280,7 @@
             </a:r>
           </a:p>
           <a:p>
-            <a:pPr lvl="0" indent="-342900" marL="342900">
+            <a:pPr lvl="0" indent="-457200" marL="457200">
               <a:buAutoNum type="alphaLcPeriod"/>
             </a:pPr>
             <a:r>
@@ -7881,7 +8289,7 @@
             </a:r>
           </a:p>
           <a:p>
-            <a:pPr lvl="0" indent="-342900" marL="342900">
+            <a:pPr lvl="0" indent="-457200" marL="457200">
               <a:buAutoNum type="alphaLcPeriod"/>
             </a:pPr>
             <a:r>
@@ -7915,7 +8323,13 @@
       </p:grpSpPr>
       <p:sp>
         <p:nvSpPr>
-          <p:cNvPr id="3" name="Content Placeholder 2"/>
+          <p:cNvPr id="3" name="Inhaltsplatzhalter 2">
+            <a:extLst>
+              <a:ext uri="{FF2B5EF4-FFF2-40B4-BE49-F238E27FC236}">
+                <a16:creationId xmlns:a16="http://schemas.microsoft.com/office/drawing/2014/main" id="{C0D7E480-32AD-8371-070E-ADF49C060185}"/>
+              </a:ext>
+            </a:extLst>
+          </p:cNvPr>
           <p:cNvSpPr>
             <a:spLocks noGrp="1"/>
           </p:cNvSpPr>
@@ -7937,7 +8351,7 @@
             </a:r>
           </a:p>
           <a:p>
-            <a:pPr lvl="0" indent="-342900" marL="342900">
+            <a:pPr lvl="0" indent="-457200" marL="457200">
               <a:buAutoNum type="alphaLcPeriod"/>
             </a:pPr>
             <a:r>
@@ -7946,7 +8360,7 @@
             </a:r>
           </a:p>
           <a:p>
-            <a:pPr lvl="0" indent="-342900" marL="342900">
+            <a:pPr lvl="0" indent="-457200" marL="457200">
               <a:buAutoNum type="alphaLcPeriod"/>
             </a:pPr>
             <a:r>
@@ -7955,7 +8369,7 @@
             </a:r>
           </a:p>
           <a:p>
-            <a:pPr lvl="0" indent="-342900" marL="342900">
+            <a:pPr lvl="0" indent="-457200" marL="457200">
               <a:buAutoNum type="alphaLcPeriod"/>
             </a:pPr>
             <a:r>
@@ -7964,7 +8378,7 @@
             </a:r>
           </a:p>
           <a:p>
-            <a:pPr lvl="0" indent="-342900" marL="342900">
+            <a:pPr lvl="0" indent="-457200" marL="457200">
               <a:buAutoNum type="alphaLcPeriod"/>
             </a:pPr>
             <a:r>
@@ -7973,7 +8387,7 @@
             </a:r>
           </a:p>
           <a:p>
-            <a:pPr lvl="0" indent="-342900" marL="342900">
+            <a:pPr lvl="0" indent="-457200" marL="457200">
               <a:buAutoNum type="alphaLcPeriod"/>
             </a:pPr>
             <a:r>
@@ -8007,7 +8421,13 @@
       </p:grpSpPr>
       <p:sp>
         <p:nvSpPr>
-          <p:cNvPr id="3" name="Content Placeholder 2"/>
+          <p:cNvPr id="3" name="Inhaltsplatzhalter 2">
+            <a:extLst>
+              <a:ext uri="{FF2B5EF4-FFF2-40B4-BE49-F238E27FC236}">
+                <a16:creationId xmlns:a16="http://schemas.microsoft.com/office/drawing/2014/main" id="{C0D7E480-32AD-8371-070E-ADF49C060185}"/>
+              </a:ext>
+            </a:extLst>
+          </p:cNvPr>
           <p:cNvSpPr>
             <a:spLocks noGrp="1"/>
           </p:cNvSpPr>
@@ -8075,7 +8495,13 @@
       </p:grpSpPr>
       <p:sp>
         <p:nvSpPr>
-          <p:cNvPr id="3" name="Content Placeholder 2"/>
+          <p:cNvPr id="3" name="Inhaltsplatzhalter 2">
+            <a:extLst>
+              <a:ext uri="{FF2B5EF4-FFF2-40B4-BE49-F238E27FC236}">
+                <a16:creationId xmlns:a16="http://schemas.microsoft.com/office/drawing/2014/main" id="{C0D7E480-32AD-8371-070E-ADF49C060185}"/>
+              </a:ext>
+            </a:extLst>
+          </p:cNvPr>
           <p:cNvSpPr>
             <a:spLocks noGrp="1"/>
           </p:cNvSpPr>
@@ -8143,7 +8569,13 @@
       </p:grpSpPr>
       <p:sp>
         <p:nvSpPr>
-          <p:cNvPr id="3" name="Content Placeholder 2"/>
+          <p:cNvPr id="3" name="Inhaltsplatzhalter 2">
+            <a:extLst>
+              <a:ext uri="{FF2B5EF4-FFF2-40B4-BE49-F238E27FC236}">
+                <a16:creationId xmlns:a16="http://schemas.microsoft.com/office/drawing/2014/main" id="{C0D7E480-32AD-8371-070E-ADF49C060185}"/>
+              </a:ext>
+            </a:extLst>
+          </p:cNvPr>
           <p:cNvSpPr>
             <a:spLocks noGrp="1"/>
           </p:cNvSpPr>
@@ -8238,7 +8670,7 @@
 </file>
 
 <file path=ppt/theme/theme1.xml><?xml version="1.0" encoding="utf-8"?>
-<a:theme xmlns:a="http://schemas.openxmlformats.org/drawingml/2006/main" name="Office Theme">
+<a:theme xmlns:a="http://schemas.openxmlformats.org/drawingml/2006/main" name="Office">
   <a:themeElements>
     <a:clrScheme name="Office">
       <a:dk1>
@@ -8248,44 +8680,44 @@
         <a:sysClr val="window" lastClr="FFFFFF"/>
       </a:lt1>
       <a:dk2>
-        <a:srgbClr val="1F497D"/>
+        <a:srgbClr val="0E2841"/>
       </a:dk2>
       <a:lt2>
-        <a:srgbClr val="EEECE1"/>
+        <a:srgbClr val="E8E8E8"/>
       </a:lt2>
       <a:accent1>
-        <a:srgbClr val="4F81BD"/>
+        <a:srgbClr val="156082"/>
       </a:accent1>
       <a:accent2>
-        <a:srgbClr val="C0504D"/>
+        <a:srgbClr val="E97132"/>
       </a:accent2>
       <a:accent3>
-        <a:srgbClr val="9BBB59"/>
+        <a:srgbClr val="196B24"/>
       </a:accent3>
       <a:accent4>
-        <a:srgbClr val="8064A2"/>
+        <a:srgbClr val="0F9ED5"/>
       </a:accent4>
       <a:accent5>
-        <a:srgbClr val="4BACC6"/>
+        <a:srgbClr val="A02B93"/>
       </a:accent5>
       <a:accent6>
-        <a:srgbClr val="F79646"/>
+        <a:srgbClr val="4EA72E"/>
       </a:accent6>
       <a:hlink>
-        <a:srgbClr val="0000FF"/>
+        <a:srgbClr val="467886"/>
       </a:hlink>
       <a:folHlink>
-        <a:srgbClr val="800080"/>
+        <a:srgbClr val="96607D"/>
       </a:folHlink>
     </a:clrScheme>
     <a:fontScheme name="Office">
       <a:majorFont>
-        <a:latin typeface="Calibri"/>
+        <a:latin typeface="Aptos Display" panose="02110004020202020204"/>
         <a:ea typeface=""/>
         <a:cs typeface=""/>
-        <a:font script="Jpan" typeface="ＭＳ Ｐゴシック"/>
+        <a:font script="Jpan" typeface="游ゴシック Light"/>
         <a:font script="Hang" typeface="맑은 고딕"/>
-        <a:font script="Hans" typeface="宋体"/>
+        <a:font script="Hans" typeface="等线 Light"/>
         <a:font script="Hant" typeface="新細明體"/>
         <a:font script="Arab" typeface="Times New Roman"/>
         <a:font script="Hebr" typeface="Times New Roman"/>
@@ -8313,14 +8745,31 @@
         <a:font script="Viet" typeface="Times New Roman"/>
         <a:font script="Uigh" typeface="Microsoft Uighur"/>
         <a:font script="Geor" typeface="Sylfaen"/>
+        <a:font script="Armn" typeface="Arial"/>
+        <a:font script="Bugi" typeface="Leelawadee UI"/>
+        <a:font script="Bopo" typeface="Microsoft JhengHei"/>
+        <a:font script="Java" typeface="Javanese Text"/>
+        <a:font script="Lisu" typeface="Segoe UI"/>
+        <a:font script="Mymr" typeface="Myanmar Text"/>
+        <a:font script="Nkoo" typeface="Ebrima"/>
+        <a:font script="Olck" typeface="Nirmala UI"/>
+        <a:font script="Osma" typeface="Ebrima"/>
+        <a:font script="Phag" typeface="Phagspa"/>
+        <a:font script="Syrn" typeface="Estrangelo Edessa"/>
+        <a:font script="Syrj" typeface="Estrangelo Edessa"/>
+        <a:font script="Syre" typeface="Estrangelo Edessa"/>
+        <a:font script="Sora" typeface="Nirmala UI"/>
+        <a:font script="Tale" typeface="Microsoft Tai Le"/>
+        <a:font script="Talu" typeface="Microsoft New Tai Lue"/>
+        <a:font script="Tfng" typeface="Ebrima"/>
       </a:majorFont>
       <a:minorFont>
-        <a:latin typeface="Calibri"/>
+        <a:latin typeface="Aptos" panose="02110004020202020204"/>
         <a:ea typeface=""/>
         <a:cs typeface=""/>
-        <a:font script="Jpan" typeface="ＭＳ Ｐゴシック"/>
+        <a:font script="Jpan" typeface="游ゴシック"/>
         <a:font script="Hang" typeface="맑은 고딕"/>
-        <a:font script="Hans" typeface="宋体"/>
+        <a:font script="Hans" typeface="等线"/>
         <a:font script="Hant" typeface="新細明體"/>
         <a:font script="Arab" typeface="Arial"/>
         <a:font script="Hebr" typeface="Arial"/>
@@ -8348,6 +8797,23 @@
         <a:font script="Viet" typeface="Arial"/>
         <a:font script="Uigh" typeface="Microsoft Uighur"/>
         <a:font script="Geor" typeface="Sylfaen"/>
+        <a:font script="Armn" typeface="Arial"/>
+        <a:font script="Bugi" typeface="Leelawadee UI"/>
+        <a:font script="Bopo" typeface="Microsoft JhengHei"/>
+        <a:font script="Java" typeface="Javanese Text"/>
+        <a:font script="Lisu" typeface="Segoe UI"/>
+        <a:font script="Mymr" typeface="Myanmar Text"/>
+        <a:font script="Nkoo" typeface="Ebrima"/>
+        <a:font script="Olck" typeface="Nirmala UI"/>
+        <a:font script="Osma" typeface="Ebrima"/>
+        <a:font script="Phag" typeface="Phagspa"/>
+        <a:font script="Syrn" typeface="Estrangelo Edessa"/>
+        <a:font script="Syrj" typeface="Estrangelo Edessa"/>
+        <a:font script="Syre" typeface="Estrangelo Edessa"/>
+        <a:font script="Sora" typeface="Nirmala UI"/>
+        <a:font script="Tale" typeface="Microsoft Tai Le"/>
+        <a:font script="Talu" typeface="Microsoft New Tai Lue"/>
+        <a:font script="Tfng" typeface="Ebrima"/>
       </a:minorFont>
     </a:fontScheme>
     <a:fmtScheme name="Office">
@@ -8359,180 +8825,136 @@
           <a:gsLst>
             <a:gs pos="0">
               <a:schemeClr val="phClr">
-                <a:tint val="50000"/>
-                <a:satMod val="300000"/>
+                <a:lumMod val="110000"/>
+                <a:satMod val="105000"/>
+                <a:tint val="67000"/>
               </a:schemeClr>
             </a:gs>
-            <a:gs pos="35000">
+            <a:gs pos="50000">
               <a:schemeClr val="phClr">
-                <a:tint val="37000"/>
-                <a:satMod val="300000"/>
+                <a:lumMod val="105000"/>
+                <a:satMod val="103000"/>
+                <a:tint val="73000"/>
               </a:schemeClr>
             </a:gs>
             <a:gs pos="100000">
               <a:schemeClr val="phClr">
-                <a:tint val="15000"/>
-                <a:satMod val="350000"/>
+                <a:lumMod val="105000"/>
+                <a:satMod val="109000"/>
+                <a:tint val="81000"/>
               </a:schemeClr>
             </a:gs>
           </a:gsLst>
-          <a:lin ang="16200000" scaled="1"/>
+          <a:lin ang="5400000" scaled="0"/>
         </a:gradFill>
         <a:gradFill rotWithShape="1">
           <a:gsLst>
             <a:gs pos="0">
               <a:schemeClr val="phClr">
-                <a:tint val="100000"/>
+                <a:satMod val="103000"/>
+                <a:lumMod val="102000"/>
+                <a:tint val="94000"/>
+              </a:schemeClr>
+            </a:gs>
+            <a:gs pos="50000">
+              <a:schemeClr val="phClr">
+                <a:satMod val="110000"/>
+                <a:lumMod val="100000"/>
                 <a:shade val="100000"/>
-                <a:satMod val="130000"/>
               </a:schemeClr>
             </a:gs>
             <a:gs pos="100000">
               <a:schemeClr val="phClr">
-                <a:tint val="50000"/>
-                <a:shade val="100000"/>
-                <a:satMod val="350000"/>
+                <a:lumMod val="99000"/>
+                <a:satMod val="120000"/>
+                <a:shade val="78000"/>
               </a:schemeClr>
             </a:gs>
           </a:gsLst>
-          <a:lin ang="16200000" scaled="0"/>
+          <a:lin ang="5400000" scaled="0"/>
         </a:gradFill>
       </a:fillStyleLst>
       <a:lnStyleLst>
-        <a:ln w="9525" cap="flat" cmpd="sng" algn="ctr">
+        <a:ln w="12700" cap="flat" cmpd="sng" algn="ctr">
           <a:solidFill>
-            <a:schemeClr val="phClr">
-              <a:shade val="95000"/>
-              <a:satMod val="105000"/>
-            </a:schemeClr>
+            <a:schemeClr val="phClr"/>
           </a:solidFill>
           <a:prstDash val="solid"/>
+          <a:miter lim="800000"/>
+        </a:ln>
+        <a:ln w="19050" cap="flat" cmpd="sng" algn="ctr">
+          <a:solidFill>
+            <a:schemeClr val="phClr"/>
+          </a:solidFill>
+          <a:prstDash val="solid"/>
+          <a:miter lim="800000"/>
         </a:ln>
         <a:ln w="25400" cap="flat" cmpd="sng" algn="ctr">
           <a:solidFill>
             <a:schemeClr val="phClr"/>
           </a:solidFill>
           <a:prstDash val="solid"/>
-        </a:ln>
-        <a:ln w="38100" cap="flat" cmpd="sng" algn="ctr">
-          <a:solidFill>
-            <a:schemeClr val="phClr"/>
-          </a:solidFill>
-          <a:prstDash val="solid"/>
+          <a:miter lim="800000"/>
         </a:ln>
       </a:lnStyleLst>
       <a:effectStyleLst>
         <a:effectStyle>
+          <a:effectLst/>
+        </a:effectStyle>
+        <a:effectStyle>
+          <a:effectLst/>
+        </a:effectStyle>
+        <a:effectStyle>
           <a:effectLst>
-            <a:outerShdw blurRad="40000" dist="20000" dir="5400000" rotWithShape="0">
+            <a:outerShdw blurRad="57150" dist="19050" dir="5400000" algn="ctr" rotWithShape="0">
               <a:srgbClr val="000000">
-                <a:alpha val="38000"/>
+                <a:alpha val="63000"/>
               </a:srgbClr>
             </a:outerShdw>
           </a:effectLst>
-        </a:effectStyle>
-        <a:effectStyle>
-          <a:effectLst>
-            <a:outerShdw blurRad="40000" dist="23000" dir="5400000" rotWithShape="0">
-              <a:srgbClr val="000000">
-                <a:alpha val="35000"/>
-              </a:srgbClr>
-            </a:outerShdw>
-          </a:effectLst>
-        </a:effectStyle>
-        <a:effectStyle>
-          <a:effectLst>
-            <a:outerShdw blurRad="40000" dist="23000" dir="5400000" rotWithShape="0">
-              <a:srgbClr val="000000">
-                <a:alpha val="35000"/>
-              </a:srgbClr>
-            </a:outerShdw>
-          </a:effectLst>
-          <a:scene3d>
-            <a:camera prst="orthographicFront">
-              <a:rot lat="0" lon="0" rev="0"/>
-            </a:camera>
-            <a:lightRig rig="threePt" dir="t">
-              <a:rot lat="0" lon="0" rev="1200000"/>
-            </a:lightRig>
-          </a:scene3d>
-          <a:sp3d>
-            <a:bevelT w="63500" h="25400"/>
-          </a:sp3d>
         </a:effectStyle>
       </a:effectStyleLst>
       <a:bgFillStyleLst>
         <a:solidFill>
           <a:schemeClr val="phClr"/>
         </a:solidFill>
+        <a:solidFill>
+          <a:schemeClr val="phClr">
+            <a:tint val="95000"/>
+            <a:satMod val="170000"/>
+          </a:schemeClr>
+        </a:solidFill>
         <a:gradFill rotWithShape="1">
           <a:gsLst>
             <a:gs pos="0">
               <a:schemeClr val="phClr">
-                <a:tint val="40000"/>
-                <a:satMod val="350000"/>
+                <a:tint val="93000"/>
+                <a:satMod val="150000"/>
+                <a:shade val="98000"/>
+                <a:lumMod val="102000"/>
               </a:schemeClr>
             </a:gs>
-            <a:gs pos="40000">
+            <a:gs pos="50000">
               <a:schemeClr val="phClr">
-                <a:tint val="45000"/>
-                <a:shade val="99000"/>
-                <a:satMod val="350000"/>
+                <a:tint val="98000"/>
+                <a:satMod val="130000"/>
+                <a:shade val="90000"/>
+                <a:lumMod val="103000"/>
               </a:schemeClr>
             </a:gs>
             <a:gs pos="100000">
               <a:schemeClr val="phClr">
-                <a:shade val="20000"/>
-                <a:satMod val="255000"/>
+                <a:shade val="63000"/>
+                <a:satMod val="120000"/>
               </a:schemeClr>
             </a:gs>
           </a:gsLst>
-          <a:path path="circle">
-            <a:fillToRect l="50000" t="-80000" r="50000" b="180000"/>
-          </a:path>
-        </a:gradFill>
-        <a:gradFill rotWithShape="1">
-          <a:gsLst>
-            <a:gs pos="0">
-              <a:schemeClr val="phClr">
-                <a:tint val="80000"/>
-                <a:satMod val="300000"/>
-              </a:schemeClr>
-            </a:gs>
-            <a:gs pos="100000">
-              <a:schemeClr val="phClr">
-                <a:shade val="30000"/>
-                <a:satMod val="200000"/>
-              </a:schemeClr>
-            </a:gs>
-          </a:gsLst>
-          <a:path path="circle">
-            <a:fillToRect l="50000" t="50000" r="50000" b="50000"/>
-          </a:path>
+          <a:lin ang="5400000" scaled="0"/>
         </a:gradFill>
       </a:bgFillStyleLst>
     </a:fmtScheme>
   </a:themeElements>
   <a:objectDefaults>
-    <a:spDef>
-      <a:spPr/>
-      <a:bodyPr/>
-      <a:lstStyle/>
-      <a:style>
-        <a:lnRef idx="1">
-          <a:schemeClr val="accent1"/>
-        </a:lnRef>
-        <a:fillRef idx="3">
-          <a:schemeClr val="accent1"/>
-        </a:fillRef>
-        <a:effectRef idx="2">
-          <a:schemeClr val="accent1"/>
-        </a:effectRef>
-        <a:fontRef idx="minor">
-          <a:schemeClr val="lt1"/>
-        </a:fontRef>
-      </a:style>
-    </a:spDef>
     <a:lnDef>
       <a:spPr/>
       <a:bodyPr/>
@@ -8554,6 +8976,11 @@
     </a:lnDef>
   </a:objectDefaults>
   <a:extraClrSchemeLst/>
+  <a:extLst>
+    <a:ext uri="{05A4C25C-085E-4340-85A3-A5531E510DB2}">
+      <thm15:themeFamily xmlns:thm15="http://schemas.microsoft.com/office/thememl/2012/main" name="Office Theme" id="{2E142A2C-CD16-42D6-873A-C26D2A0506FA}" vid="{1BDDFF52-6CD6-40A5-AB3C-68EB2F1E4D0A}"/>
+    </a:ext>
+  </a:extLst>
 </a:theme>
 </file>
 

</xml_diff>